<commit_message>
Citations slide and citation
</commit_message>
<xml_diff>
--- a/Archive project.pptx
+++ b/Archive project.pptx
@@ -7994,7 +7994,11 @@
           <a:bodyPr/>
           <a:lstStyle/>
           <a:p>
-            <a:endParaRPr lang="en-US"/>
+            <a:r>
+              <a:rPr lang="en-US" dirty="0" smtClean="0"/>
+              <a:t>Citations</a:t>
+            </a:r>
+            <a:endParaRPr lang="en-US" dirty="0"/>
           </a:p>
         </p:txBody>
       </p:sp>
@@ -8013,7 +8017,16 @@
           <a:bodyPr/>
           <a:lstStyle/>
           <a:p>
-            <a:endParaRPr lang="en-US"/>
+            <a:r>
+              <a:rPr lang="en-US" dirty="0" smtClean="0">
+                <a:hlinkClick r:id="rId2"/>
+              </a:rPr>
+              <a:t>www.nps.gov/gett/learn/historyculture/civil-war-timeline.htm</a:t>
+            </a:r>
+            <a:endParaRPr lang="en-US" dirty="0" smtClean="0"/>
+          </a:p>
+          <a:p>
+            <a:endParaRPr lang="en-US" dirty="0"/>
           </a:p>
         </p:txBody>
       </p:sp>

</xml_diff>

<commit_message>
Finished Orginazational structure and stuff
yolo
</commit_message>
<xml_diff>
--- a/Archive project.pptx
+++ b/Archive project.pptx
@@ -7,10 +7,34 @@
   <p:sldIdLst>
     <p:sldId id="256" r:id="rId2"/>
     <p:sldId id="258" r:id="rId3"/>
-    <p:sldId id="259" r:id="rId4"/>
-    <p:sldId id="260" r:id="rId5"/>
-    <p:sldId id="261" r:id="rId6"/>
-    <p:sldId id="257" r:id="rId7"/>
+    <p:sldId id="263" r:id="rId4"/>
+    <p:sldId id="264" r:id="rId5"/>
+    <p:sldId id="265" r:id="rId6"/>
+    <p:sldId id="266" r:id="rId7"/>
+    <p:sldId id="259" r:id="rId8"/>
+    <p:sldId id="267" r:id="rId9"/>
+    <p:sldId id="268" r:id="rId10"/>
+    <p:sldId id="269" r:id="rId11"/>
+    <p:sldId id="270" r:id="rId12"/>
+    <p:sldId id="271" r:id="rId13"/>
+    <p:sldId id="260" r:id="rId14"/>
+    <p:sldId id="272" r:id="rId15"/>
+    <p:sldId id="273" r:id="rId16"/>
+    <p:sldId id="274" r:id="rId17"/>
+    <p:sldId id="275" r:id="rId18"/>
+    <p:sldId id="276" r:id="rId19"/>
+    <p:sldId id="261" r:id="rId20"/>
+    <p:sldId id="277" r:id="rId21"/>
+    <p:sldId id="278" r:id="rId22"/>
+    <p:sldId id="279" r:id="rId23"/>
+    <p:sldId id="280" r:id="rId24"/>
+    <p:sldId id="262" r:id="rId25"/>
+    <p:sldId id="281" r:id="rId26"/>
+    <p:sldId id="282" r:id="rId27"/>
+    <p:sldId id="283" r:id="rId28"/>
+    <p:sldId id="284" r:id="rId29"/>
+    <p:sldId id="285" r:id="rId30"/>
+    <p:sldId id="257" r:id="rId31"/>
   </p:sldIdLst>
   <p:sldSz cx="9144000" cy="6858000" type="screen4x3"/>
   <p:notesSz cx="6858000" cy="9144000"/>
@@ -7949,6 +7973,36 @@
           </a:p>
         </p:txBody>
       </p:sp>
+      <p:sp>
+        <p:nvSpPr>
+          <p:cNvPr id="4" name="TextBox 3"/>
+          <p:cNvSpPr txBox="1"/>
+          <p:nvPr/>
+        </p:nvSpPr>
+        <p:spPr>
+          <a:xfrm>
+            <a:off x="6191250" y="2719917"/>
+            <a:ext cx="2846917" cy="369332"/>
+          </a:xfrm>
+          <a:prstGeom prst="rect">
+            <a:avLst/>
+          </a:prstGeom>
+          <a:noFill/>
+        </p:spPr>
+        <p:txBody>
+          <a:bodyPr wrap="square" rtlCol="0">
+            <a:spAutoFit/>
+          </a:bodyPr>
+          <a:lstStyle/>
+          <a:p>
+            <a:r>
+              <a:rPr lang="en-US" dirty="0" smtClean="0"/>
+              <a:t>* - Battles researched</a:t>
+            </a:r>
+            <a:endParaRPr lang="en-US" dirty="0"/>
+          </a:p>
+        </p:txBody>
+      </p:sp>
     </p:spTree>
     <p:extLst>
       <p:ext uri="{BB962C8B-B14F-4D97-AF65-F5344CB8AC3E}">
@@ -7959,10 +8013,17 @@
   <p:clrMapOvr>
     <a:masterClrMapping/>
   </p:clrMapOvr>
+  <p:timing>
+    <p:tnLst>
+      <p:par>
+        <p:cTn xmlns:p14="http://schemas.microsoft.com/office/powerpoint/2010/main" id="1" dur="indefinite" restart="never" nodeType="tmRoot"/>
+      </p:par>
+    </p:tnLst>
+  </p:timing>
 </p:sld>
 </file>
 
-<file path=ppt/slides/slide2.xml><?xml version="1.0" encoding="utf-8"?>
+<file path=ppt/slides/slide10.xml><?xml version="1.0" encoding="utf-8"?>
 <p:sld xmlns:a="http://schemas.openxmlformats.org/drawingml/2006/main" xmlns:r="http://schemas.openxmlformats.org/officeDocument/2006/relationships" xmlns:p="http://schemas.openxmlformats.org/presentationml/2006/main">
   <p:cSld>
     <p:spTree>
@@ -7995,10 +8056,9 @@
           <a:lstStyle/>
           <a:p>
             <a:r>
-              <a:rPr lang="en-US" dirty="0" smtClean="0"/>
-              <a:t>Battles in 1861</a:t>
-            </a:r>
-            <a:endParaRPr lang="en-US" dirty="0"/>
+              <a:rPr lang="en-US" dirty="0"/>
+              <a:t>Second Bull Run</a:t>
+            </a:r>
           </a:p>
         </p:txBody>
       </p:sp>
@@ -8017,66 +8077,35 @@
           <a:bodyPr/>
           <a:lstStyle/>
           <a:p>
-            <a:pPr>
-              <a:lnSpc>
-                <a:spcPct val="150000"/>
-              </a:lnSpc>
-            </a:pPr>
-            <a:r>
-              <a:rPr lang="en-US" dirty="0" smtClean="0"/>
-              <a:t>Fort Sumter* -Vinay</a:t>
-            </a:r>
-          </a:p>
-          <a:p>
-            <a:pPr>
-              <a:lnSpc>
-                <a:spcPct val="150000"/>
-              </a:lnSpc>
-            </a:pPr>
-            <a:r>
-              <a:rPr lang="en-US" dirty="0" smtClean="0"/>
-              <a:t>Bull run/</a:t>
-            </a:r>
-            <a:r>
-              <a:rPr lang="en-US" dirty="0"/>
-              <a:t>F</a:t>
-            </a:r>
-            <a:r>
-              <a:rPr lang="en-US" dirty="0" smtClean="0"/>
-              <a:t>irst Manassas* - Rohan</a:t>
-            </a:r>
-          </a:p>
-          <a:p>
-            <a:pPr>
-              <a:lnSpc>
-                <a:spcPct val="150000"/>
-              </a:lnSpc>
-            </a:pPr>
-            <a:r>
-              <a:rPr lang="en-US" dirty="0" smtClean="0"/>
-              <a:t>Fort Washington* -Neel</a:t>
-            </a:r>
-          </a:p>
-          <a:p>
-            <a:pPr>
-              <a:lnSpc>
-                <a:spcPct val="150000"/>
-              </a:lnSpc>
-            </a:pPr>
-            <a:r>
-              <a:rPr lang="en-US" dirty="0" smtClean="0"/>
-              <a:t>Wilson Creek</a:t>
-            </a:r>
-          </a:p>
-          <a:p>
-            <a:pPr>
-              <a:lnSpc>
-                <a:spcPct val="150000"/>
-              </a:lnSpc>
-            </a:pPr>
-            <a:r>
-              <a:rPr lang="en-US" dirty="0" smtClean="0"/>
-              <a:t>Lexington* -Vinay</a:t>
+            <a:endParaRPr lang="en-US"/>
+          </a:p>
+        </p:txBody>
+      </p:sp>
+      <p:sp>
+        <p:nvSpPr>
+          <p:cNvPr id="4" name="TextBox 3"/>
+          <p:cNvSpPr txBox="1"/>
+          <p:nvPr/>
+        </p:nvSpPr>
+        <p:spPr>
+          <a:xfrm>
+            <a:off x="6829248" y="194369"/>
+            <a:ext cx="1671675" cy="369332"/>
+          </a:xfrm>
+          <a:prstGeom prst="rect">
+            <a:avLst/>
+          </a:prstGeom>
+          <a:noFill/>
+        </p:spPr>
+        <p:txBody>
+          <a:bodyPr wrap="square" rtlCol="0">
+            <a:spAutoFit/>
+          </a:bodyPr>
+          <a:lstStyle/>
+          <a:p>
+            <a:r>
+              <a:rPr lang="en-US" dirty="0" smtClean="0"/>
+              <a:t>-Rohan</a:t>
             </a:r>
             <a:endParaRPr lang="en-US" dirty="0"/>
           </a:p>
@@ -8085,17 +8114,24 @@
     </p:spTree>
     <p:extLst>
       <p:ext uri="{BB962C8B-B14F-4D97-AF65-F5344CB8AC3E}">
-        <p14:creationId xmlns:p14="http://schemas.microsoft.com/office/powerpoint/2010/main" val="3915159450"/>
+        <p14:creationId xmlns:p14="http://schemas.microsoft.com/office/powerpoint/2010/main" val="1598801575"/>
       </p:ext>
     </p:extLst>
   </p:cSld>
   <p:clrMapOvr>
     <a:masterClrMapping/>
   </p:clrMapOvr>
+  <p:timing>
+    <p:tnLst>
+      <p:par>
+        <p:cTn xmlns:p14="http://schemas.microsoft.com/office/powerpoint/2010/main" id="1" dur="indefinite" restart="never" nodeType="tmRoot"/>
+      </p:par>
+    </p:tnLst>
+  </p:timing>
 </p:sld>
 </file>
 
-<file path=ppt/slides/slide3.xml><?xml version="1.0" encoding="utf-8"?>
+<file path=ppt/slides/slide11.xml><?xml version="1.0" encoding="utf-8"?>
 <p:sld xmlns:a="http://schemas.openxmlformats.org/drawingml/2006/main" xmlns:r="http://schemas.openxmlformats.org/officeDocument/2006/relationships" xmlns:p="http://schemas.openxmlformats.org/presentationml/2006/main">
   <p:cSld>
     <p:spTree>
@@ -8129,7 +8165,7 @@
           <a:p>
             <a:r>
               <a:rPr lang="en-US" dirty="0" smtClean="0"/>
-              <a:t>Battles 1862</a:t>
+              <a:t>Antietam</a:t>
             </a:r>
             <a:endParaRPr lang="en-US" dirty="0"/>
           </a:p>
@@ -8147,64 +8183,38 @@
         </p:nvSpPr>
         <p:spPr/>
         <p:txBody>
-          <a:bodyPr>
-            <a:normAutofit fontScale="92500" lnSpcReduction="20000"/>
+          <a:bodyPr/>
+          <a:lstStyle/>
+          <a:p>
+            <a:endParaRPr lang="en-US"/>
+          </a:p>
+        </p:txBody>
+      </p:sp>
+      <p:sp>
+        <p:nvSpPr>
+          <p:cNvPr id="4" name="TextBox 3"/>
+          <p:cNvSpPr txBox="1"/>
+          <p:nvPr/>
+        </p:nvSpPr>
+        <p:spPr>
+          <a:xfrm>
+            <a:off x="6246105" y="103664"/>
+            <a:ext cx="2280736" cy="369332"/>
+          </a:xfrm>
+          <a:prstGeom prst="rect">
+            <a:avLst/>
+          </a:prstGeom>
+          <a:noFill/>
+        </p:spPr>
+        <p:txBody>
+          <a:bodyPr wrap="square" rtlCol="0">
+            <a:spAutoFit/>
           </a:bodyPr>
           <a:lstStyle/>
           <a:p>
             <a:r>
               <a:rPr lang="en-US" dirty="0" smtClean="0"/>
-              <a:t>Battle of </a:t>
-            </a:r>
-            <a:r>
-              <a:rPr lang="en-US" dirty="0" err="1" smtClean="0"/>
-              <a:t>Ronake</a:t>
-            </a:r>
-            <a:r>
-              <a:rPr lang="en-US" dirty="0" smtClean="0"/>
-              <a:t> Island</a:t>
-            </a:r>
-          </a:p>
-          <a:p>
-            <a:r>
-              <a:rPr lang="en-US" dirty="0" smtClean="0"/>
-              <a:t>Fort Donaldson* - Neel</a:t>
-            </a:r>
-          </a:p>
-          <a:p>
-            <a:r>
-              <a:rPr lang="en-US" dirty="0" smtClean="0"/>
-              <a:t>Battle of Pea Ridge</a:t>
-            </a:r>
-          </a:p>
-          <a:p>
-            <a:r>
-              <a:rPr lang="en-US" dirty="0" smtClean="0"/>
-              <a:t>Shiloh* -Rohan</a:t>
-            </a:r>
-          </a:p>
-          <a:p>
-            <a:r>
-              <a:rPr lang="en-US" dirty="0" smtClean="0"/>
-              <a:t>Battle of seven Pines</a:t>
-            </a:r>
-          </a:p>
-          <a:p>
-            <a:r>
-              <a:rPr lang="en-US" dirty="0" smtClean="0"/>
-              <a:t>Second Bull Run* - Rohan</a:t>
-            </a:r>
-          </a:p>
-          <a:p>
-            <a:r>
-              <a:rPr lang="en-US" dirty="0" smtClean="0"/>
-              <a:t>Antietam* -Vinay</a:t>
-            </a:r>
-          </a:p>
-          <a:p>
-            <a:r>
-              <a:rPr lang="en-US" dirty="0" smtClean="0"/>
-              <a:t>Fredericksburg* - Neel</a:t>
+              <a:t>-Vinay</a:t>
             </a:r>
             <a:endParaRPr lang="en-US" dirty="0"/>
           </a:p>
@@ -8213,17 +8223,24 @@
     </p:spTree>
     <p:extLst>
       <p:ext uri="{BB962C8B-B14F-4D97-AF65-F5344CB8AC3E}">
-        <p14:creationId xmlns:p14="http://schemas.microsoft.com/office/powerpoint/2010/main" val="2782731645"/>
+        <p14:creationId xmlns:p14="http://schemas.microsoft.com/office/powerpoint/2010/main" val="1885916568"/>
       </p:ext>
     </p:extLst>
   </p:cSld>
   <p:clrMapOvr>
     <a:masterClrMapping/>
   </p:clrMapOvr>
+  <p:timing>
+    <p:tnLst>
+      <p:par>
+        <p:cTn xmlns:p14="http://schemas.microsoft.com/office/powerpoint/2010/main" id="1" dur="indefinite" restart="never" nodeType="tmRoot"/>
+      </p:par>
+    </p:tnLst>
+  </p:timing>
 </p:sld>
 </file>
 
-<file path=ppt/slides/slide4.xml><?xml version="1.0" encoding="utf-8"?>
+<file path=ppt/slides/slide12.xml><?xml version="1.0" encoding="utf-8"?>
 <p:sld xmlns:a="http://schemas.openxmlformats.org/drawingml/2006/main" xmlns:r="http://schemas.openxmlformats.org/officeDocument/2006/relationships" xmlns:p="http://schemas.openxmlformats.org/presentationml/2006/main">
   <p:cSld>
     <p:spTree>
@@ -8256,10 +8273,9 @@
           <a:lstStyle/>
           <a:p>
             <a:r>
-              <a:rPr lang="en-US" dirty="0" smtClean="0"/>
-              <a:t>Battles of 1863</a:t>
-            </a:r>
-            <a:endParaRPr lang="en-US" dirty="0"/>
+              <a:rPr lang="en-US" dirty="0"/>
+              <a:t>Fredericksburg</a:t>
+            </a:r>
           </a:p>
         </p:txBody>
       </p:sp>
@@ -8275,73 +8291,39 @@
         </p:nvSpPr>
         <p:spPr/>
         <p:txBody>
-          <a:bodyPr>
-            <a:normAutofit fontScale="70000" lnSpcReduction="20000"/>
+          <a:bodyPr/>
+          <a:lstStyle/>
+          <a:p>
+            <a:endParaRPr lang="en-US"/>
+          </a:p>
+        </p:txBody>
+      </p:sp>
+      <p:sp>
+        <p:nvSpPr>
+          <p:cNvPr id="4" name="TextBox 3"/>
+          <p:cNvSpPr txBox="1"/>
+          <p:nvPr/>
+        </p:nvSpPr>
+        <p:spPr>
+          <a:xfrm>
+            <a:off x="7062505" y="207327"/>
+            <a:ext cx="1438418" cy="369332"/>
+          </a:xfrm>
+          <a:prstGeom prst="rect">
+            <a:avLst/>
+          </a:prstGeom>
+          <a:noFill/>
+        </p:spPr>
+        <p:txBody>
+          <a:bodyPr wrap="square" rtlCol="0">
+            <a:spAutoFit/>
           </a:bodyPr>
           <a:lstStyle/>
           <a:p>
             <a:r>
               <a:rPr lang="en-US" dirty="0" smtClean="0"/>
-              <a:t>Emancipation Proclamation* - Vinay</a:t>
-            </a:r>
-          </a:p>
-          <a:p>
-            <a:r>
-              <a:rPr lang="en-US" dirty="0" smtClean="0"/>
-              <a:t>Chancellorsville* - Rohan</a:t>
-            </a:r>
-          </a:p>
-          <a:p>
-            <a:r>
-              <a:rPr lang="en-US" dirty="0" smtClean="0"/>
-              <a:t>Second Winchester</a:t>
-            </a:r>
-          </a:p>
-          <a:p>
-            <a:r>
-              <a:rPr lang="en-US" dirty="0" smtClean="0"/>
-              <a:t>Gettysburg* - Neel</a:t>
-            </a:r>
-          </a:p>
-          <a:p>
-            <a:r>
-              <a:rPr lang="en-US" dirty="0" smtClean="0"/>
-              <a:t>Vicksburg Captured July 4</a:t>
-            </a:r>
-            <a:r>
-              <a:rPr lang="en-US" baseline="30000" dirty="0" smtClean="0"/>
-              <a:t>th*</a:t>
-            </a:r>
-            <a:r>
-              <a:rPr lang="en-US" dirty="0" smtClean="0"/>
-              <a:t> - Neel</a:t>
-            </a:r>
-          </a:p>
-          <a:p>
-            <a:r>
-              <a:rPr lang="en-US" dirty="0" smtClean="0"/>
-              <a:t>Draft riots</a:t>
-            </a:r>
-          </a:p>
-          <a:p>
-            <a:r>
-              <a:rPr lang="en-US" dirty="0" smtClean="0"/>
-              <a:t>Chattanooga </a:t>
-            </a:r>
-          </a:p>
-          <a:p>
-            <a:r>
-              <a:rPr lang="en-US" dirty="0" smtClean="0"/>
-              <a:t>Chickamauga* - Vinay</a:t>
-            </a:r>
-          </a:p>
-          <a:p>
-            <a:r>
-              <a:rPr lang="en-US" dirty="0" smtClean="0"/>
-              <a:t>Knoxville </a:t>
-            </a:r>
-          </a:p>
-          <a:p>
+              <a:t>-Neel</a:t>
+            </a:r>
             <a:endParaRPr lang="en-US" dirty="0"/>
           </a:p>
         </p:txBody>
@@ -8349,17 +8331,24 @@
     </p:spTree>
     <p:extLst>
       <p:ext uri="{BB962C8B-B14F-4D97-AF65-F5344CB8AC3E}">
-        <p14:creationId xmlns:p14="http://schemas.microsoft.com/office/powerpoint/2010/main" val="2792614322"/>
+        <p14:creationId xmlns:p14="http://schemas.microsoft.com/office/powerpoint/2010/main" val="1924850588"/>
       </p:ext>
     </p:extLst>
   </p:cSld>
   <p:clrMapOvr>
     <a:masterClrMapping/>
   </p:clrMapOvr>
+  <p:timing>
+    <p:tnLst>
+      <p:par>
+        <p:cTn xmlns:p14="http://schemas.microsoft.com/office/powerpoint/2010/main" id="1" dur="indefinite" restart="never" nodeType="tmRoot"/>
+      </p:par>
+    </p:tnLst>
+  </p:timing>
 </p:sld>
 </file>
 
-<file path=ppt/slides/slide5.xml><?xml version="1.0" encoding="utf-8"?>
+<file path=ppt/slides/slide13.xml><?xml version="1.0" encoding="utf-8"?>
 <p:sld xmlns:a="http://schemas.openxmlformats.org/drawingml/2006/main" xmlns:r="http://schemas.openxmlformats.org/officeDocument/2006/relationships" xmlns:p="http://schemas.openxmlformats.org/presentationml/2006/main">
   <p:cSld>
     <p:spTree>
@@ -8393,6 +8382,660 @@
           <a:p>
             <a:r>
               <a:rPr lang="en-US" dirty="0" smtClean="0"/>
+              <a:t>Battles of 1863</a:t>
+            </a:r>
+            <a:endParaRPr lang="en-US" dirty="0"/>
+          </a:p>
+        </p:txBody>
+      </p:sp>
+      <p:sp>
+        <p:nvSpPr>
+          <p:cNvPr id="3" name="Content Placeholder 2"/>
+          <p:cNvSpPr>
+            <a:spLocks noGrp="1"/>
+          </p:cNvSpPr>
+          <p:nvPr>
+            <p:ph idx="1"/>
+          </p:nvPr>
+        </p:nvSpPr>
+        <p:spPr/>
+        <p:txBody>
+          <a:bodyPr>
+            <a:normAutofit fontScale="70000" lnSpcReduction="20000"/>
+          </a:bodyPr>
+          <a:lstStyle/>
+          <a:p>
+            <a:r>
+              <a:rPr lang="en-US" dirty="0" smtClean="0"/>
+              <a:t>Emancipation Proclamation*</a:t>
+            </a:r>
+          </a:p>
+          <a:p>
+            <a:r>
+              <a:rPr lang="en-US" dirty="0" smtClean="0"/>
+              <a:t>Chancellorsville*</a:t>
+            </a:r>
+          </a:p>
+          <a:p>
+            <a:r>
+              <a:rPr lang="en-US" dirty="0" smtClean="0"/>
+              <a:t>Second Winchester</a:t>
+            </a:r>
+          </a:p>
+          <a:p>
+            <a:r>
+              <a:rPr lang="en-US" dirty="0" smtClean="0"/>
+              <a:t>Gettysburg*</a:t>
+            </a:r>
+          </a:p>
+          <a:p>
+            <a:r>
+              <a:rPr lang="en-US" dirty="0" smtClean="0"/>
+              <a:t>Vicksburg Captured July 4</a:t>
+            </a:r>
+            <a:r>
+              <a:rPr lang="en-US" baseline="30000" dirty="0" smtClean="0"/>
+              <a:t>th*</a:t>
+            </a:r>
+            <a:endParaRPr lang="en-US" dirty="0" smtClean="0"/>
+          </a:p>
+          <a:p>
+            <a:r>
+              <a:rPr lang="en-US" dirty="0" smtClean="0"/>
+              <a:t>Draft riots</a:t>
+            </a:r>
+          </a:p>
+          <a:p>
+            <a:r>
+              <a:rPr lang="en-US" dirty="0" smtClean="0"/>
+              <a:t>Chattanooga </a:t>
+            </a:r>
+          </a:p>
+          <a:p>
+            <a:r>
+              <a:rPr lang="en-US" dirty="0" smtClean="0"/>
+              <a:t>Chickamauga* </a:t>
+            </a:r>
+          </a:p>
+          <a:p>
+            <a:r>
+              <a:rPr lang="en-US" dirty="0" smtClean="0"/>
+              <a:t>Knoxville </a:t>
+            </a:r>
+          </a:p>
+          <a:p>
+            <a:endParaRPr lang="en-US" dirty="0"/>
+          </a:p>
+        </p:txBody>
+      </p:sp>
+    </p:spTree>
+    <p:extLst>
+      <p:ext uri="{BB962C8B-B14F-4D97-AF65-F5344CB8AC3E}">
+        <p14:creationId xmlns:p14="http://schemas.microsoft.com/office/powerpoint/2010/main" val="2792614322"/>
+      </p:ext>
+    </p:extLst>
+  </p:cSld>
+  <p:clrMapOvr>
+    <a:masterClrMapping/>
+  </p:clrMapOvr>
+  <p:timing>
+    <p:tnLst>
+      <p:par>
+        <p:cTn xmlns:p14="http://schemas.microsoft.com/office/powerpoint/2010/main" id="1" dur="indefinite" restart="never" nodeType="tmRoot"/>
+      </p:par>
+    </p:tnLst>
+  </p:timing>
+</p:sld>
+</file>
+
+<file path=ppt/slides/slide14.xml><?xml version="1.0" encoding="utf-8"?>
+<p:sld xmlns:a="http://schemas.openxmlformats.org/drawingml/2006/main" xmlns:r="http://schemas.openxmlformats.org/officeDocument/2006/relationships" xmlns:p="http://schemas.openxmlformats.org/presentationml/2006/main">
+  <p:cSld>
+    <p:spTree>
+      <p:nvGrpSpPr>
+        <p:cNvPr id="1" name=""/>
+        <p:cNvGrpSpPr/>
+        <p:nvPr/>
+      </p:nvGrpSpPr>
+      <p:grpSpPr>
+        <a:xfrm>
+          <a:off x="0" y="0"/>
+          <a:ext cx="0" cy="0"/>
+          <a:chOff x="0" y="0"/>
+          <a:chExt cx="0" cy="0"/>
+        </a:xfrm>
+      </p:grpSpPr>
+      <p:sp>
+        <p:nvSpPr>
+          <p:cNvPr id="2" name="Title 1"/>
+          <p:cNvSpPr>
+            <a:spLocks noGrp="1"/>
+          </p:cNvSpPr>
+          <p:nvPr>
+            <p:ph type="title"/>
+          </p:nvPr>
+        </p:nvSpPr>
+        <p:spPr/>
+        <p:txBody>
+          <a:bodyPr/>
+          <a:lstStyle/>
+          <a:p>
+            <a:r>
+              <a:rPr lang="en-US" dirty="0"/>
+              <a:t>Emancipation Proclamation</a:t>
+            </a:r>
+          </a:p>
+        </p:txBody>
+      </p:sp>
+      <p:sp>
+        <p:nvSpPr>
+          <p:cNvPr id="3" name="Content Placeholder 2"/>
+          <p:cNvSpPr>
+            <a:spLocks noGrp="1"/>
+          </p:cNvSpPr>
+          <p:nvPr>
+            <p:ph idx="1"/>
+          </p:nvPr>
+        </p:nvSpPr>
+        <p:spPr/>
+        <p:txBody>
+          <a:bodyPr/>
+          <a:lstStyle/>
+          <a:p>
+            <a:endParaRPr lang="en-US"/>
+          </a:p>
+        </p:txBody>
+      </p:sp>
+      <p:sp>
+        <p:nvSpPr>
+          <p:cNvPr id="4" name="TextBox 3"/>
+          <p:cNvSpPr txBox="1"/>
+          <p:nvPr/>
+        </p:nvSpPr>
+        <p:spPr>
+          <a:xfrm>
+            <a:off x="6953250" y="95250"/>
+            <a:ext cx="1481667" cy="369332"/>
+          </a:xfrm>
+          <a:prstGeom prst="rect">
+            <a:avLst/>
+          </a:prstGeom>
+          <a:noFill/>
+        </p:spPr>
+        <p:txBody>
+          <a:bodyPr wrap="square" rtlCol="0">
+            <a:spAutoFit/>
+          </a:bodyPr>
+          <a:lstStyle/>
+          <a:p>
+            <a:r>
+              <a:rPr lang="en-US" dirty="0" smtClean="0"/>
+              <a:t>-Vinay</a:t>
+            </a:r>
+            <a:endParaRPr lang="en-US" dirty="0"/>
+          </a:p>
+        </p:txBody>
+      </p:sp>
+    </p:spTree>
+    <p:extLst>
+      <p:ext uri="{BB962C8B-B14F-4D97-AF65-F5344CB8AC3E}">
+        <p14:creationId xmlns:p14="http://schemas.microsoft.com/office/powerpoint/2010/main" val="954385436"/>
+      </p:ext>
+    </p:extLst>
+  </p:cSld>
+  <p:clrMapOvr>
+    <a:masterClrMapping/>
+  </p:clrMapOvr>
+</p:sld>
+</file>
+
+<file path=ppt/slides/slide15.xml><?xml version="1.0" encoding="utf-8"?>
+<p:sld xmlns:a="http://schemas.openxmlformats.org/drawingml/2006/main" xmlns:r="http://schemas.openxmlformats.org/officeDocument/2006/relationships" xmlns:p="http://schemas.openxmlformats.org/presentationml/2006/main">
+  <p:cSld>
+    <p:spTree>
+      <p:nvGrpSpPr>
+        <p:cNvPr id="1" name=""/>
+        <p:cNvGrpSpPr/>
+        <p:nvPr/>
+      </p:nvGrpSpPr>
+      <p:grpSpPr>
+        <a:xfrm>
+          <a:off x="0" y="0"/>
+          <a:ext cx="0" cy="0"/>
+          <a:chOff x="0" y="0"/>
+          <a:chExt cx="0" cy="0"/>
+        </a:xfrm>
+      </p:grpSpPr>
+      <p:sp>
+        <p:nvSpPr>
+          <p:cNvPr id="2" name="Title 1"/>
+          <p:cNvSpPr>
+            <a:spLocks noGrp="1"/>
+          </p:cNvSpPr>
+          <p:nvPr>
+            <p:ph type="title"/>
+          </p:nvPr>
+        </p:nvSpPr>
+        <p:spPr/>
+        <p:txBody>
+          <a:bodyPr/>
+          <a:lstStyle/>
+          <a:p>
+            <a:r>
+              <a:rPr lang="en-US" dirty="0"/>
+              <a:t>Chancellorsville</a:t>
+            </a:r>
+          </a:p>
+        </p:txBody>
+      </p:sp>
+      <p:sp>
+        <p:nvSpPr>
+          <p:cNvPr id="3" name="Content Placeholder 2"/>
+          <p:cNvSpPr>
+            <a:spLocks noGrp="1"/>
+          </p:cNvSpPr>
+          <p:nvPr>
+            <p:ph idx="1"/>
+          </p:nvPr>
+        </p:nvSpPr>
+        <p:spPr/>
+        <p:txBody>
+          <a:bodyPr/>
+          <a:lstStyle/>
+          <a:p>
+            <a:endParaRPr lang="en-US"/>
+          </a:p>
+        </p:txBody>
+      </p:sp>
+      <p:sp>
+        <p:nvSpPr>
+          <p:cNvPr id="4" name="TextBox 3"/>
+          <p:cNvSpPr txBox="1"/>
+          <p:nvPr/>
+        </p:nvSpPr>
+        <p:spPr>
+          <a:xfrm>
+            <a:off x="7239000" y="275167"/>
+            <a:ext cx="1555750" cy="381000"/>
+          </a:xfrm>
+          <a:prstGeom prst="rect">
+            <a:avLst/>
+          </a:prstGeom>
+          <a:noFill/>
+        </p:spPr>
+        <p:txBody>
+          <a:bodyPr wrap="square" rtlCol="0">
+            <a:spAutoFit/>
+          </a:bodyPr>
+          <a:lstStyle/>
+          <a:p>
+            <a:r>
+              <a:rPr lang="en-US" dirty="0" smtClean="0"/>
+              <a:t>-Rohan</a:t>
+            </a:r>
+            <a:endParaRPr lang="en-US" dirty="0"/>
+          </a:p>
+        </p:txBody>
+      </p:sp>
+    </p:spTree>
+    <p:extLst>
+      <p:ext uri="{BB962C8B-B14F-4D97-AF65-F5344CB8AC3E}">
+        <p14:creationId xmlns:p14="http://schemas.microsoft.com/office/powerpoint/2010/main" val="2488087028"/>
+      </p:ext>
+    </p:extLst>
+  </p:cSld>
+  <p:clrMapOvr>
+    <a:masterClrMapping/>
+  </p:clrMapOvr>
+</p:sld>
+</file>
+
+<file path=ppt/slides/slide16.xml><?xml version="1.0" encoding="utf-8"?>
+<p:sld xmlns:a="http://schemas.openxmlformats.org/drawingml/2006/main" xmlns:r="http://schemas.openxmlformats.org/officeDocument/2006/relationships" xmlns:p="http://schemas.openxmlformats.org/presentationml/2006/main">
+  <p:cSld>
+    <p:spTree>
+      <p:nvGrpSpPr>
+        <p:cNvPr id="1" name=""/>
+        <p:cNvGrpSpPr/>
+        <p:nvPr/>
+      </p:nvGrpSpPr>
+      <p:grpSpPr>
+        <a:xfrm>
+          <a:off x="0" y="0"/>
+          <a:ext cx="0" cy="0"/>
+          <a:chOff x="0" y="0"/>
+          <a:chExt cx="0" cy="0"/>
+        </a:xfrm>
+      </p:grpSpPr>
+      <p:sp>
+        <p:nvSpPr>
+          <p:cNvPr id="2" name="Title 1"/>
+          <p:cNvSpPr>
+            <a:spLocks noGrp="1"/>
+          </p:cNvSpPr>
+          <p:nvPr>
+            <p:ph type="title"/>
+          </p:nvPr>
+        </p:nvSpPr>
+        <p:spPr/>
+        <p:txBody>
+          <a:bodyPr/>
+          <a:lstStyle/>
+          <a:p>
+            <a:r>
+              <a:rPr lang="en-US" dirty="0"/>
+              <a:t>Gettysburg</a:t>
+            </a:r>
+          </a:p>
+        </p:txBody>
+      </p:sp>
+      <p:sp>
+        <p:nvSpPr>
+          <p:cNvPr id="3" name="Content Placeholder 2"/>
+          <p:cNvSpPr>
+            <a:spLocks noGrp="1"/>
+          </p:cNvSpPr>
+          <p:nvPr>
+            <p:ph idx="1"/>
+          </p:nvPr>
+        </p:nvSpPr>
+        <p:spPr/>
+        <p:txBody>
+          <a:bodyPr/>
+          <a:lstStyle/>
+          <a:p>
+            <a:endParaRPr lang="en-US"/>
+          </a:p>
+        </p:txBody>
+      </p:sp>
+      <p:sp>
+        <p:nvSpPr>
+          <p:cNvPr id="5" name="TextBox 4"/>
+          <p:cNvSpPr txBox="1"/>
+          <p:nvPr/>
+        </p:nvSpPr>
+        <p:spPr>
+          <a:xfrm>
+            <a:off x="6921500" y="243417"/>
+            <a:ext cx="1672167" cy="369332"/>
+          </a:xfrm>
+          <a:prstGeom prst="rect">
+            <a:avLst/>
+          </a:prstGeom>
+          <a:noFill/>
+        </p:spPr>
+        <p:txBody>
+          <a:bodyPr wrap="square" rtlCol="0">
+            <a:spAutoFit/>
+          </a:bodyPr>
+          <a:lstStyle/>
+          <a:p>
+            <a:r>
+              <a:rPr lang="en-US" dirty="0" smtClean="0"/>
+              <a:t>-Neel</a:t>
+            </a:r>
+            <a:endParaRPr lang="en-US" dirty="0"/>
+          </a:p>
+        </p:txBody>
+      </p:sp>
+    </p:spTree>
+    <p:extLst>
+      <p:ext uri="{BB962C8B-B14F-4D97-AF65-F5344CB8AC3E}">
+        <p14:creationId xmlns:p14="http://schemas.microsoft.com/office/powerpoint/2010/main" val="2470542951"/>
+      </p:ext>
+    </p:extLst>
+  </p:cSld>
+  <p:clrMapOvr>
+    <a:masterClrMapping/>
+  </p:clrMapOvr>
+</p:sld>
+</file>
+
+<file path=ppt/slides/slide17.xml><?xml version="1.0" encoding="utf-8"?>
+<p:sld xmlns:a="http://schemas.openxmlformats.org/drawingml/2006/main" xmlns:r="http://schemas.openxmlformats.org/officeDocument/2006/relationships" xmlns:p="http://schemas.openxmlformats.org/presentationml/2006/main">
+  <p:cSld>
+    <p:spTree>
+      <p:nvGrpSpPr>
+        <p:cNvPr id="1" name=""/>
+        <p:cNvGrpSpPr/>
+        <p:nvPr/>
+      </p:nvGrpSpPr>
+      <p:grpSpPr>
+        <a:xfrm>
+          <a:off x="0" y="0"/>
+          <a:ext cx="0" cy="0"/>
+          <a:chOff x="0" y="0"/>
+          <a:chExt cx="0" cy="0"/>
+        </a:xfrm>
+      </p:grpSpPr>
+      <p:sp>
+        <p:nvSpPr>
+          <p:cNvPr id="2" name="Title 1"/>
+          <p:cNvSpPr>
+            <a:spLocks noGrp="1"/>
+          </p:cNvSpPr>
+          <p:nvPr>
+            <p:ph type="title"/>
+          </p:nvPr>
+        </p:nvSpPr>
+        <p:spPr/>
+        <p:txBody>
+          <a:bodyPr/>
+          <a:lstStyle/>
+          <a:p>
+            <a:r>
+              <a:rPr lang="en-US" dirty="0"/>
+              <a:t>Vicksburg </a:t>
+            </a:r>
+            <a:r>
+              <a:rPr lang="en-US" dirty="0" smtClean="0"/>
+              <a:t>Captured </a:t>
+            </a:r>
+            <a:endParaRPr lang="en-US" dirty="0"/>
+          </a:p>
+        </p:txBody>
+      </p:sp>
+      <p:sp>
+        <p:nvSpPr>
+          <p:cNvPr id="3" name="Content Placeholder 2"/>
+          <p:cNvSpPr>
+            <a:spLocks noGrp="1"/>
+          </p:cNvSpPr>
+          <p:nvPr>
+            <p:ph idx="1"/>
+          </p:nvPr>
+        </p:nvSpPr>
+        <p:spPr/>
+        <p:txBody>
+          <a:bodyPr/>
+          <a:lstStyle/>
+          <a:p>
+            <a:r>
+              <a:rPr lang="en-US" dirty="0" smtClean="0"/>
+              <a:t>Captured July 4th</a:t>
+            </a:r>
+            <a:endParaRPr lang="en-US" dirty="0"/>
+          </a:p>
+        </p:txBody>
+      </p:sp>
+      <p:sp>
+        <p:nvSpPr>
+          <p:cNvPr id="4" name="TextBox 3"/>
+          <p:cNvSpPr txBox="1"/>
+          <p:nvPr/>
+        </p:nvSpPr>
+        <p:spPr>
+          <a:xfrm>
+            <a:off x="7249583" y="169333"/>
+            <a:ext cx="1344084" cy="369332"/>
+          </a:xfrm>
+          <a:prstGeom prst="rect">
+            <a:avLst/>
+          </a:prstGeom>
+          <a:noFill/>
+        </p:spPr>
+        <p:txBody>
+          <a:bodyPr wrap="square" rtlCol="0">
+            <a:spAutoFit/>
+          </a:bodyPr>
+          <a:lstStyle/>
+          <a:p>
+            <a:r>
+              <a:rPr lang="en-US" dirty="0" smtClean="0"/>
+              <a:t>-Neel</a:t>
+            </a:r>
+            <a:endParaRPr lang="en-US" dirty="0"/>
+          </a:p>
+        </p:txBody>
+      </p:sp>
+    </p:spTree>
+    <p:extLst>
+      <p:ext uri="{BB962C8B-B14F-4D97-AF65-F5344CB8AC3E}">
+        <p14:creationId xmlns:p14="http://schemas.microsoft.com/office/powerpoint/2010/main" val="2762890798"/>
+      </p:ext>
+    </p:extLst>
+  </p:cSld>
+  <p:clrMapOvr>
+    <a:masterClrMapping/>
+  </p:clrMapOvr>
+</p:sld>
+</file>
+
+<file path=ppt/slides/slide18.xml><?xml version="1.0" encoding="utf-8"?>
+<p:sld xmlns:a="http://schemas.openxmlformats.org/drawingml/2006/main" xmlns:r="http://schemas.openxmlformats.org/officeDocument/2006/relationships" xmlns:p="http://schemas.openxmlformats.org/presentationml/2006/main">
+  <p:cSld>
+    <p:spTree>
+      <p:nvGrpSpPr>
+        <p:cNvPr id="1" name=""/>
+        <p:cNvGrpSpPr/>
+        <p:nvPr/>
+      </p:nvGrpSpPr>
+      <p:grpSpPr>
+        <a:xfrm>
+          <a:off x="0" y="0"/>
+          <a:ext cx="0" cy="0"/>
+          <a:chOff x="0" y="0"/>
+          <a:chExt cx="0" cy="0"/>
+        </a:xfrm>
+      </p:grpSpPr>
+      <p:sp>
+        <p:nvSpPr>
+          <p:cNvPr id="2" name="Title 1"/>
+          <p:cNvSpPr>
+            <a:spLocks noGrp="1"/>
+          </p:cNvSpPr>
+          <p:nvPr>
+            <p:ph type="title"/>
+          </p:nvPr>
+        </p:nvSpPr>
+        <p:spPr/>
+        <p:txBody>
+          <a:bodyPr/>
+          <a:lstStyle/>
+          <a:p>
+            <a:r>
+              <a:rPr lang="en-US" dirty="0"/>
+              <a:t>Chickamauga</a:t>
+            </a:r>
+          </a:p>
+        </p:txBody>
+      </p:sp>
+      <p:sp>
+        <p:nvSpPr>
+          <p:cNvPr id="3" name="Content Placeholder 2"/>
+          <p:cNvSpPr>
+            <a:spLocks noGrp="1"/>
+          </p:cNvSpPr>
+          <p:nvPr>
+            <p:ph idx="1"/>
+          </p:nvPr>
+        </p:nvSpPr>
+        <p:spPr/>
+        <p:txBody>
+          <a:bodyPr/>
+          <a:lstStyle/>
+          <a:p>
+            <a:endParaRPr lang="en-US"/>
+          </a:p>
+        </p:txBody>
+      </p:sp>
+      <p:sp>
+        <p:nvSpPr>
+          <p:cNvPr id="4" name="TextBox 3"/>
+          <p:cNvSpPr txBox="1"/>
+          <p:nvPr/>
+        </p:nvSpPr>
+        <p:spPr>
+          <a:xfrm>
+            <a:off x="7249583" y="211667"/>
+            <a:ext cx="1555750" cy="369332"/>
+          </a:xfrm>
+          <a:prstGeom prst="rect">
+            <a:avLst/>
+          </a:prstGeom>
+          <a:noFill/>
+        </p:spPr>
+        <p:txBody>
+          <a:bodyPr wrap="square" rtlCol="0">
+            <a:spAutoFit/>
+          </a:bodyPr>
+          <a:lstStyle/>
+          <a:p>
+            <a:r>
+              <a:rPr lang="en-US" dirty="0" smtClean="0"/>
+              <a:t>-Vinay</a:t>
+            </a:r>
+            <a:endParaRPr lang="en-US" dirty="0"/>
+          </a:p>
+        </p:txBody>
+      </p:sp>
+    </p:spTree>
+    <p:extLst>
+      <p:ext uri="{BB962C8B-B14F-4D97-AF65-F5344CB8AC3E}">
+        <p14:creationId xmlns:p14="http://schemas.microsoft.com/office/powerpoint/2010/main" val="2736860543"/>
+      </p:ext>
+    </p:extLst>
+  </p:cSld>
+  <p:clrMapOvr>
+    <a:masterClrMapping/>
+  </p:clrMapOvr>
+</p:sld>
+</file>
+
+<file path=ppt/slides/slide19.xml><?xml version="1.0" encoding="utf-8"?>
+<p:sld xmlns:a="http://schemas.openxmlformats.org/drawingml/2006/main" xmlns:r="http://schemas.openxmlformats.org/officeDocument/2006/relationships" xmlns:p="http://schemas.openxmlformats.org/presentationml/2006/main">
+  <p:cSld>
+    <p:spTree>
+      <p:nvGrpSpPr>
+        <p:cNvPr id="1" name=""/>
+        <p:cNvGrpSpPr/>
+        <p:nvPr/>
+      </p:nvGrpSpPr>
+      <p:grpSpPr>
+        <a:xfrm>
+          <a:off x="0" y="0"/>
+          <a:ext cx="0" cy="0"/>
+          <a:chOff x="0" y="0"/>
+          <a:chExt cx="0" cy="0"/>
+        </a:xfrm>
+      </p:grpSpPr>
+      <p:sp>
+        <p:nvSpPr>
+          <p:cNvPr id="2" name="Title 1"/>
+          <p:cNvSpPr>
+            <a:spLocks noGrp="1"/>
+          </p:cNvSpPr>
+          <p:nvPr>
+            <p:ph type="title"/>
+          </p:nvPr>
+        </p:nvSpPr>
+        <p:spPr/>
+        <p:txBody>
+          <a:bodyPr/>
+          <a:lstStyle/>
+          <a:p>
+            <a:r>
+              <a:rPr lang="en-US" dirty="0" smtClean="0"/>
               <a:t>Battles of 1864</a:t>
             </a:r>
             <a:endParaRPr lang="en-US" dirty="0"/>
@@ -8423,14 +9066,24 @@
           <a:p>
             <a:r>
               <a:rPr lang="en-US" dirty="0"/>
-              <a:t>meridian</a:t>
-            </a:r>
+              <a:t>M</a:t>
+            </a:r>
+            <a:r>
+              <a:rPr lang="en-US" dirty="0" smtClean="0"/>
+              <a:t>eridian</a:t>
+            </a:r>
+            <a:endParaRPr lang="en-US" dirty="0"/>
           </a:p>
           <a:p>
             <a:r>
               <a:rPr lang="en-US" dirty="0"/>
-              <a:t>Charleston: submarine attack</a:t>
-            </a:r>
+              <a:t>Charleston: submarine </a:t>
+            </a:r>
+            <a:r>
+              <a:rPr lang="en-US" dirty="0" smtClean="0"/>
+              <a:t>attack*</a:t>
+            </a:r>
+            <a:endParaRPr lang="en-US" dirty="0"/>
           </a:p>
           <a:p>
             <a:r>
@@ -8456,8 +9109,13 @@
           <a:p>
             <a:r>
               <a:rPr lang="en-US" dirty="0"/>
-              <a:t>Fort pillow</a:t>
-            </a:r>
+              <a:t>Fort </a:t>
+            </a:r>
+            <a:r>
+              <a:rPr lang="en-US" dirty="0" smtClean="0"/>
+              <a:t>pillow*</a:t>
+            </a:r>
+            <a:endParaRPr lang="en-US" dirty="0"/>
           </a:p>
           <a:p>
             <a:r>
@@ -8674,12 +9332,6 @@
           </a:lstStyle>
           <a:p>
             <a:r>
-              <a:rPr lang="en-US" sz="2000" dirty="0"/>
-              <a:t>Petersburg</a:t>
-            </a:r>
-          </a:p>
-          <a:p>
-            <a:r>
               <a:rPr lang="en-US" sz="2000" dirty="0" smtClean="0"/>
               <a:t>Brice's crossroads</a:t>
             </a:r>
@@ -8687,21 +9339,24 @@
           </a:p>
           <a:p>
             <a:r>
+              <a:rPr lang="en-US" sz="2000" dirty="0" smtClean="0"/>
+              <a:t>Mobile </a:t>
+            </a:r>
+            <a:r>
               <a:rPr lang="en-US" sz="2000" dirty="0"/>
-              <a:t>Atlanta</a:t>
+              <a:t>bay</a:t>
             </a:r>
           </a:p>
           <a:p>
             <a:r>
               <a:rPr lang="en-US" sz="2000" dirty="0"/>
-              <a:t>Mobile bay</a:t>
-            </a:r>
-          </a:p>
-          <a:p>
-            <a:r>
-              <a:rPr lang="en-US" sz="2000" dirty="0"/>
-              <a:t>Atlanta falls</a:t>
-            </a:r>
+              <a:t>Atlanta </a:t>
+            </a:r>
+            <a:r>
+              <a:rPr lang="en-US" sz="2000" dirty="0" smtClean="0"/>
+              <a:t>falls*</a:t>
+            </a:r>
+            <a:endParaRPr lang="en-US" sz="2000" dirty="0"/>
           </a:p>
           <a:p>
             <a:r>
@@ -8711,9 +9366,10 @@
           </a:p>
           <a:p>
             <a:r>
-              <a:rPr lang="en-US" sz="2000" dirty="0"/>
-              <a:t>Nashville</a:t>
-            </a:r>
+              <a:rPr lang="en-US" sz="2000" dirty="0" smtClean="0"/>
+              <a:t>Nashville*</a:t>
+            </a:r>
+            <a:endParaRPr lang="en-US" sz="2000" dirty="0"/>
           </a:p>
           <a:p>
             <a:endParaRPr lang="en-US" dirty="0" smtClean="0"/>
@@ -8730,6 +9386,1641 @@
   <p:clrMapOvr>
     <a:masterClrMapping/>
   </p:clrMapOvr>
+  <p:timing>
+    <p:tnLst>
+      <p:par>
+        <p:cTn xmlns:p14="http://schemas.microsoft.com/office/powerpoint/2010/main" id="1" dur="indefinite" restart="never" nodeType="tmRoot"/>
+      </p:par>
+    </p:tnLst>
+  </p:timing>
+</p:sld>
+</file>
+
+<file path=ppt/slides/slide2.xml><?xml version="1.0" encoding="utf-8"?>
+<p:sld xmlns:a="http://schemas.openxmlformats.org/drawingml/2006/main" xmlns:r="http://schemas.openxmlformats.org/officeDocument/2006/relationships" xmlns:p="http://schemas.openxmlformats.org/presentationml/2006/main">
+  <p:cSld>
+    <p:spTree>
+      <p:nvGrpSpPr>
+        <p:cNvPr id="1" name=""/>
+        <p:cNvGrpSpPr/>
+        <p:nvPr/>
+      </p:nvGrpSpPr>
+      <p:grpSpPr>
+        <a:xfrm>
+          <a:off x="0" y="0"/>
+          <a:ext cx="0" cy="0"/>
+          <a:chOff x="0" y="0"/>
+          <a:chExt cx="0" cy="0"/>
+        </a:xfrm>
+      </p:grpSpPr>
+      <p:sp>
+        <p:nvSpPr>
+          <p:cNvPr id="2" name="Title 1"/>
+          <p:cNvSpPr>
+            <a:spLocks noGrp="1"/>
+          </p:cNvSpPr>
+          <p:nvPr>
+            <p:ph type="title"/>
+          </p:nvPr>
+        </p:nvSpPr>
+        <p:spPr/>
+        <p:txBody>
+          <a:bodyPr/>
+          <a:lstStyle/>
+          <a:p>
+            <a:r>
+              <a:rPr lang="en-US" dirty="0" smtClean="0"/>
+              <a:t>Battles in 1861</a:t>
+            </a:r>
+            <a:endParaRPr lang="en-US" dirty="0"/>
+          </a:p>
+        </p:txBody>
+      </p:sp>
+      <p:sp>
+        <p:nvSpPr>
+          <p:cNvPr id="3" name="Content Placeholder 2"/>
+          <p:cNvSpPr>
+            <a:spLocks noGrp="1"/>
+          </p:cNvSpPr>
+          <p:nvPr>
+            <p:ph idx="1"/>
+          </p:nvPr>
+        </p:nvSpPr>
+        <p:spPr/>
+        <p:txBody>
+          <a:bodyPr/>
+          <a:lstStyle/>
+          <a:p>
+            <a:pPr>
+              <a:lnSpc>
+                <a:spcPct val="150000"/>
+              </a:lnSpc>
+            </a:pPr>
+            <a:r>
+              <a:rPr lang="en-US" dirty="0" smtClean="0"/>
+              <a:t>Fort Sumter* </a:t>
+            </a:r>
+          </a:p>
+          <a:p>
+            <a:pPr>
+              <a:lnSpc>
+                <a:spcPct val="150000"/>
+              </a:lnSpc>
+            </a:pPr>
+            <a:r>
+              <a:rPr lang="en-US" dirty="0" smtClean="0"/>
+              <a:t>Bull run/</a:t>
+            </a:r>
+            <a:r>
+              <a:rPr lang="en-US" dirty="0"/>
+              <a:t>F</a:t>
+            </a:r>
+            <a:r>
+              <a:rPr lang="en-US" dirty="0" smtClean="0"/>
+              <a:t>irst Manassas*</a:t>
+            </a:r>
+          </a:p>
+          <a:p>
+            <a:pPr>
+              <a:lnSpc>
+                <a:spcPct val="150000"/>
+              </a:lnSpc>
+            </a:pPr>
+            <a:r>
+              <a:rPr lang="en-US" dirty="0" smtClean="0"/>
+              <a:t>Fort Washington*</a:t>
+            </a:r>
+          </a:p>
+          <a:p>
+            <a:pPr>
+              <a:lnSpc>
+                <a:spcPct val="150000"/>
+              </a:lnSpc>
+            </a:pPr>
+            <a:r>
+              <a:rPr lang="en-US" dirty="0" smtClean="0"/>
+              <a:t>Wilson Creek</a:t>
+            </a:r>
+          </a:p>
+          <a:p>
+            <a:pPr>
+              <a:lnSpc>
+                <a:spcPct val="150000"/>
+              </a:lnSpc>
+            </a:pPr>
+            <a:r>
+              <a:rPr lang="en-US" dirty="0" smtClean="0"/>
+              <a:t>Lexington*</a:t>
+            </a:r>
+            <a:endParaRPr lang="en-US" dirty="0"/>
+          </a:p>
+        </p:txBody>
+      </p:sp>
+    </p:spTree>
+    <p:extLst>
+      <p:ext uri="{BB962C8B-B14F-4D97-AF65-F5344CB8AC3E}">
+        <p14:creationId xmlns:p14="http://schemas.microsoft.com/office/powerpoint/2010/main" val="3915159450"/>
+      </p:ext>
+    </p:extLst>
+  </p:cSld>
+  <p:clrMapOvr>
+    <a:masterClrMapping/>
+  </p:clrMapOvr>
+  <p:timing>
+    <p:tnLst>
+      <p:par>
+        <p:cTn xmlns:p14="http://schemas.microsoft.com/office/powerpoint/2010/main" id="1" dur="indefinite" restart="never" nodeType="tmRoot"/>
+      </p:par>
+    </p:tnLst>
+  </p:timing>
+</p:sld>
+</file>
+
+<file path=ppt/slides/slide20.xml><?xml version="1.0" encoding="utf-8"?>
+<p:sld xmlns:a="http://schemas.openxmlformats.org/drawingml/2006/main" xmlns:r="http://schemas.openxmlformats.org/officeDocument/2006/relationships" xmlns:p="http://schemas.openxmlformats.org/presentationml/2006/main">
+  <p:cSld>
+    <p:spTree>
+      <p:nvGrpSpPr>
+        <p:cNvPr id="1" name=""/>
+        <p:cNvGrpSpPr/>
+        <p:nvPr/>
+      </p:nvGrpSpPr>
+      <p:grpSpPr>
+        <a:xfrm>
+          <a:off x="0" y="0"/>
+          <a:ext cx="0" cy="0"/>
+          <a:chOff x="0" y="0"/>
+          <a:chExt cx="0" cy="0"/>
+        </a:xfrm>
+      </p:grpSpPr>
+      <p:sp>
+        <p:nvSpPr>
+          <p:cNvPr id="2" name="Title 1"/>
+          <p:cNvSpPr>
+            <a:spLocks noGrp="1"/>
+          </p:cNvSpPr>
+          <p:nvPr>
+            <p:ph type="title"/>
+          </p:nvPr>
+        </p:nvSpPr>
+        <p:spPr/>
+        <p:txBody>
+          <a:bodyPr/>
+          <a:lstStyle/>
+          <a:p>
+            <a:r>
+              <a:rPr lang="en-US" dirty="0"/>
+              <a:t>Charleston: submarine attack</a:t>
+            </a:r>
+          </a:p>
+        </p:txBody>
+      </p:sp>
+      <p:sp>
+        <p:nvSpPr>
+          <p:cNvPr id="3" name="Content Placeholder 2"/>
+          <p:cNvSpPr>
+            <a:spLocks noGrp="1"/>
+          </p:cNvSpPr>
+          <p:nvPr>
+            <p:ph idx="1"/>
+          </p:nvPr>
+        </p:nvSpPr>
+        <p:spPr/>
+        <p:txBody>
+          <a:bodyPr/>
+          <a:lstStyle/>
+          <a:p>
+            <a:endParaRPr lang="en-US"/>
+          </a:p>
+        </p:txBody>
+      </p:sp>
+      <p:sp>
+        <p:nvSpPr>
+          <p:cNvPr id="4" name="TextBox 3"/>
+          <p:cNvSpPr txBox="1"/>
+          <p:nvPr/>
+        </p:nvSpPr>
+        <p:spPr>
+          <a:xfrm>
+            <a:off x="7239000" y="285750"/>
+            <a:ext cx="1640417" cy="369332"/>
+          </a:xfrm>
+          <a:prstGeom prst="rect">
+            <a:avLst/>
+          </a:prstGeom>
+          <a:noFill/>
+        </p:spPr>
+        <p:txBody>
+          <a:bodyPr wrap="square" rtlCol="0">
+            <a:spAutoFit/>
+          </a:bodyPr>
+          <a:lstStyle/>
+          <a:p>
+            <a:r>
+              <a:rPr lang="en-US" dirty="0" smtClean="0"/>
+              <a:t>-Neel</a:t>
+            </a:r>
+            <a:endParaRPr lang="en-US" dirty="0"/>
+          </a:p>
+        </p:txBody>
+      </p:sp>
+    </p:spTree>
+    <p:extLst>
+      <p:ext uri="{BB962C8B-B14F-4D97-AF65-F5344CB8AC3E}">
+        <p14:creationId xmlns:p14="http://schemas.microsoft.com/office/powerpoint/2010/main" val="129178598"/>
+      </p:ext>
+    </p:extLst>
+  </p:cSld>
+  <p:clrMapOvr>
+    <a:masterClrMapping/>
+  </p:clrMapOvr>
+</p:sld>
+</file>
+
+<file path=ppt/slides/slide21.xml><?xml version="1.0" encoding="utf-8"?>
+<p:sld xmlns:a="http://schemas.openxmlformats.org/drawingml/2006/main" xmlns:r="http://schemas.openxmlformats.org/officeDocument/2006/relationships" xmlns:p="http://schemas.openxmlformats.org/presentationml/2006/main">
+  <p:cSld>
+    <p:spTree>
+      <p:nvGrpSpPr>
+        <p:cNvPr id="1" name=""/>
+        <p:cNvGrpSpPr/>
+        <p:nvPr/>
+      </p:nvGrpSpPr>
+      <p:grpSpPr>
+        <a:xfrm>
+          <a:off x="0" y="0"/>
+          <a:ext cx="0" cy="0"/>
+          <a:chOff x="0" y="0"/>
+          <a:chExt cx="0" cy="0"/>
+        </a:xfrm>
+      </p:grpSpPr>
+      <p:sp>
+        <p:nvSpPr>
+          <p:cNvPr id="2" name="Title 1"/>
+          <p:cNvSpPr>
+            <a:spLocks noGrp="1"/>
+          </p:cNvSpPr>
+          <p:nvPr>
+            <p:ph type="title"/>
+          </p:nvPr>
+        </p:nvSpPr>
+        <p:spPr/>
+        <p:txBody>
+          <a:bodyPr/>
+          <a:lstStyle/>
+          <a:p>
+            <a:r>
+              <a:rPr lang="en-US" dirty="0"/>
+              <a:t>Fort pillow</a:t>
+            </a:r>
+          </a:p>
+        </p:txBody>
+      </p:sp>
+      <p:sp>
+        <p:nvSpPr>
+          <p:cNvPr id="3" name="Content Placeholder 2"/>
+          <p:cNvSpPr>
+            <a:spLocks noGrp="1"/>
+          </p:cNvSpPr>
+          <p:nvPr>
+            <p:ph idx="1"/>
+          </p:nvPr>
+        </p:nvSpPr>
+        <p:spPr/>
+        <p:txBody>
+          <a:bodyPr/>
+          <a:lstStyle/>
+          <a:p>
+            <a:endParaRPr lang="en-US"/>
+          </a:p>
+        </p:txBody>
+      </p:sp>
+      <p:sp>
+        <p:nvSpPr>
+          <p:cNvPr id="4" name="TextBox 3"/>
+          <p:cNvSpPr txBox="1"/>
+          <p:nvPr/>
+        </p:nvSpPr>
+        <p:spPr>
+          <a:xfrm>
+            <a:off x="7313083" y="243417"/>
+            <a:ext cx="1555750" cy="369332"/>
+          </a:xfrm>
+          <a:prstGeom prst="rect">
+            <a:avLst/>
+          </a:prstGeom>
+          <a:noFill/>
+        </p:spPr>
+        <p:txBody>
+          <a:bodyPr wrap="square" rtlCol="0">
+            <a:spAutoFit/>
+          </a:bodyPr>
+          <a:lstStyle/>
+          <a:p>
+            <a:r>
+              <a:rPr lang="en-US" dirty="0" smtClean="0"/>
+              <a:t>-Rohan</a:t>
+            </a:r>
+            <a:endParaRPr lang="en-US" dirty="0"/>
+          </a:p>
+        </p:txBody>
+      </p:sp>
+    </p:spTree>
+    <p:extLst>
+      <p:ext uri="{BB962C8B-B14F-4D97-AF65-F5344CB8AC3E}">
+        <p14:creationId xmlns:p14="http://schemas.microsoft.com/office/powerpoint/2010/main" val="1032982681"/>
+      </p:ext>
+    </p:extLst>
+  </p:cSld>
+  <p:clrMapOvr>
+    <a:masterClrMapping/>
+  </p:clrMapOvr>
+</p:sld>
+</file>
+
+<file path=ppt/slides/slide22.xml><?xml version="1.0" encoding="utf-8"?>
+<p:sld xmlns:a="http://schemas.openxmlformats.org/drawingml/2006/main" xmlns:r="http://schemas.openxmlformats.org/officeDocument/2006/relationships" xmlns:p="http://schemas.openxmlformats.org/presentationml/2006/main">
+  <p:cSld>
+    <p:spTree>
+      <p:nvGrpSpPr>
+        <p:cNvPr id="1" name=""/>
+        <p:cNvGrpSpPr/>
+        <p:nvPr/>
+      </p:nvGrpSpPr>
+      <p:grpSpPr>
+        <a:xfrm>
+          <a:off x="0" y="0"/>
+          <a:ext cx="0" cy="0"/>
+          <a:chOff x="0" y="0"/>
+          <a:chExt cx="0" cy="0"/>
+        </a:xfrm>
+      </p:grpSpPr>
+      <p:sp>
+        <p:nvSpPr>
+          <p:cNvPr id="2" name="Title 1"/>
+          <p:cNvSpPr>
+            <a:spLocks noGrp="1"/>
+          </p:cNvSpPr>
+          <p:nvPr>
+            <p:ph type="title"/>
+          </p:nvPr>
+        </p:nvSpPr>
+        <p:spPr/>
+        <p:txBody>
+          <a:bodyPr/>
+          <a:lstStyle/>
+          <a:p>
+            <a:r>
+              <a:rPr lang="en-US" sz="4800" dirty="0"/>
+              <a:t>Atlanta falls</a:t>
+            </a:r>
+            <a:endParaRPr lang="en-US" dirty="0"/>
+          </a:p>
+        </p:txBody>
+      </p:sp>
+      <p:sp>
+        <p:nvSpPr>
+          <p:cNvPr id="3" name="Content Placeholder 2"/>
+          <p:cNvSpPr>
+            <a:spLocks noGrp="1"/>
+          </p:cNvSpPr>
+          <p:nvPr>
+            <p:ph idx="1"/>
+          </p:nvPr>
+        </p:nvSpPr>
+        <p:spPr/>
+        <p:txBody>
+          <a:bodyPr/>
+          <a:lstStyle/>
+          <a:p>
+            <a:endParaRPr lang="en-US"/>
+          </a:p>
+        </p:txBody>
+      </p:sp>
+      <p:sp>
+        <p:nvSpPr>
+          <p:cNvPr id="4" name="TextBox 3"/>
+          <p:cNvSpPr txBox="1"/>
+          <p:nvPr/>
+        </p:nvSpPr>
+        <p:spPr>
+          <a:xfrm>
+            <a:off x="7778750" y="169333"/>
+            <a:ext cx="1195917" cy="369332"/>
+          </a:xfrm>
+          <a:prstGeom prst="rect">
+            <a:avLst/>
+          </a:prstGeom>
+          <a:noFill/>
+        </p:spPr>
+        <p:txBody>
+          <a:bodyPr wrap="square" rtlCol="0">
+            <a:spAutoFit/>
+          </a:bodyPr>
+          <a:lstStyle/>
+          <a:p>
+            <a:r>
+              <a:rPr lang="en-US" dirty="0" smtClean="0"/>
+              <a:t>-Vinay</a:t>
+            </a:r>
+            <a:endParaRPr lang="en-US" dirty="0"/>
+          </a:p>
+        </p:txBody>
+      </p:sp>
+    </p:spTree>
+    <p:extLst>
+      <p:ext uri="{BB962C8B-B14F-4D97-AF65-F5344CB8AC3E}">
+        <p14:creationId xmlns:p14="http://schemas.microsoft.com/office/powerpoint/2010/main" val="3140450667"/>
+      </p:ext>
+    </p:extLst>
+  </p:cSld>
+  <p:clrMapOvr>
+    <a:masterClrMapping/>
+  </p:clrMapOvr>
+</p:sld>
+</file>
+
+<file path=ppt/slides/slide23.xml><?xml version="1.0" encoding="utf-8"?>
+<p:sld xmlns:a="http://schemas.openxmlformats.org/drawingml/2006/main" xmlns:r="http://schemas.openxmlformats.org/officeDocument/2006/relationships" xmlns:p="http://schemas.openxmlformats.org/presentationml/2006/main">
+  <p:cSld>
+    <p:spTree>
+      <p:nvGrpSpPr>
+        <p:cNvPr id="1" name=""/>
+        <p:cNvGrpSpPr/>
+        <p:nvPr/>
+      </p:nvGrpSpPr>
+      <p:grpSpPr>
+        <a:xfrm>
+          <a:off x="0" y="0"/>
+          <a:ext cx="0" cy="0"/>
+          <a:chOff x="0" y="0"/>
+          <a:chExt cx="0" cy="0"/>
+        </a:xfrm>
+      </p:grpSpPr>
+      <p:sp>
+        <p:nvSpPr>
+          <p:cNvPr id="2" name="Title 1"/>
+          <p:cNvSpPr>
+            <a:spLocks noGrp="1"/>
+          </p:cNvSpPr>
+          <p:nvPr>
+            <p:ph type="title"/>
+          </p:nvPr>
+        </p:nvSpPr>
+        <p:spPr/>
+        <p:txBody>
+          <a:bodyPr/>
+          <a:lstStyle/>
+          <a:p>
+            <a:r>
+              <a:rPr lang="en-US" sz="4800" dirty="0"/>
+              <a:t>Nashville</a:t>
+            </a:r>
+            <a:endParaRPr lang="en-US" dirty="0"/>
+          </a:p>
+        </p:txBody>
+      </p:sp>
+      <p:sp>
+        <p:nvSpPr>
+          <p:cNvPr id="3" name="Content Placeholder 2"/>
+          <p:cNvSpPr>
+            <a:spLocks noGrp="1"/>
+          </p:cNvSpPr>
+          <p:nvPr>
+            <p:ph idx="1"/>
+          </p:nvPr>
+        </p:nvSpPr>
+        <p:spPr/>
+        <p:txBody>
+          <a:bodyPr/>
+          <a:lstStyle/>
+          <a:p>
+            <a:endParaRPr lang="en-US"/>
+          </a:p>
+        </p:txBody>
+      </p:sp>
+      <p:sp>
+        <p:nvSpPr>
+          <p:cNvPr id="5" name="TextBox 4"/>
+          <p:cNvSpPr txBox="1"/>
+          <p:nvPr/>
+        </p:nvSpPr>
+        <p:spPr>
+          <a:xfrm>
+            <a:off x="6847417" y="201083"/>
+            <a:ext cx="1852083" cy="369332"/>
+          </a:xfrm>
+          <a:prstGeom prst="rect">
+            <a:avLst/>
+          </a:prstGeom>
+          <a:noFill/>
+        </p:spPr>
+        <p:txBody>
+          <a:bodyPr wrap="square" rtlCol="0">
+            <a:spAutoFit/>
+          </a:bodyPr>
+          <a:lstStyle/>
+          <a:p>
+            <a:r>
+              <a:rPr lang="en-US" dirty="0" smtClean="0"/>
+              <a:t>-Rohan</a:t>
+            </a:r>
+            <a:endParaRPr lang="en-US" dirty="0"/>
+          </a:p>
+        </p:txBody>
+      </p:sp>
+    </p:spTree>
+    <p:extLst>
+      <p:ext uri="{BB962C8B-B14F-4D97-AF65-F5344CB8AC3E}">
+        <p14:creationId xmlns:p14="http://schemas.microsoft.com/office/powerpoint/2010/main" val="446644899"/>
+      </p:ext>
+    </p:extLst>
+  </p:cSld>
+  <p:clrMapOvr>
+    <a:masterClrMapping/>
+  </p:clrMapOvr>
+</p:sld>
+</file>
+
+<file path=ppt/slides/slide24.xml><?xml version="1.0" encoding="utf-8"?>
+<p:sld xmlns:a="http://schemas.openxmlformats.org/drawingml/2006/main" xmlns:r="http://schemas.openxmlformats.org/officeDocument/2006/relationships" xmlns:p="http://schemas.openxmlformats.org/presentationml/2006/main">
+  <p:cSld>
+    <p:spTree>
+      <p:nvGrpSpPr>
+        <p:cNvPr id="1" name=""/>
+        <p:cNvGrpSpPr/>
+        <p:nvPr/>
+      </p:nvGrpSpPr>
+      <p:grpSpPr>
+        <a:xfrm>
+          <a:off x="0" y="0"/>
+          <a:ext cx="0" cy="0"/>
+          <a:chOff x="0" y="0"/>
+          <a:chExt cx="0" cy="0"/>
+        </a:xfrm>
+      </p:grpSpPr>
+      <p:sp>
+        <p:nvSpPr>
+          <p:cNvPr id="2" name="Title 1"/>
+          <p:cNvSpPr>
+            <a:spLocks noGrp="1"/>
+          </p:cNvSpPr>
+          <p:nvPr>
+            <p:ph type="title"/>
+          </p:nvPr>
+        </p:nvSpPr>
+        <p:spPr/>
+        <p:txBody>
+          <a:bodyPr/>
+          <a:lstStyle/>
+          <a:p>
+            <a:r>
+              <a:rPr lang="en-US" dirty="0" smtClean="0"/>
+              <a:t>Battles of 1865</a:t>
+            </a:r>
+            <a:endParaRPr lang="en-US" dirty="0"/>
+          </a:p>
+        </p:txBody>
+      </p:sp>
+      <p:sp>
+        <p:nvSpPr>
+          <p:cNvPr id="3" name="Content Placeholder 2"/>
+          <p:cNvSpPr>
+            <a:spLocks noGrp="1"/>
+          </p:cNvSpPr>
+          <p:nvPr>
+            <p:ph idx="1"/>
+          </p:nvPr>
+        </p:nvSpPr>
+        <p:spPr/>
+        <p:txBody>
+          <a:bodyPr>
+            <a:normAutofit fontScale="92500" lnSpcReduction="20000"/>
+          </a:bodyPr>
+          <a:lstStyle/>
+          <a:p>
+            <a:r>
+              <a:rPr lang="en-US" dirty="0"/>
+              <a:t>A</a:t>
+            </a:r>
+            <a:r>
+              <a:rPr lang="en-US" dirty="0" smtClean="0"/>
+              <a:t>ssault </a:t>
+            </a:r>
+            <a:r>
+              <a:rPr lang="en-US" dirty="0"/>
+              <a:t>of fort fisher</a:t>
+            </a:r>
+          </a:p>
+          <a:p>
+            <a:r>
+              <a:rPr lang="en-US" dirty="0"/>
+              <a:t>Columbia south Carolina</a:t>
+            </a:r>
+          </a:p>
+          <a:p>
+            <a:r>
+              <a:rPr lang="en-US" dirty="0" smtClean="0"/>
+              <a:t>Fall of Petersburg*</a:t>
+            </a:r>
+            <a:endParaRPr lang="en-US" dirty="0"/>
+          </a:p>
+          <a:p>
+            <a:r>
+              <a:rPr lang="en-US" dirty="0"/>
+              <a:t>Battle of five forks</a:t>
+            </a:r>
+          </a:p>
+          <a:p>
+            <a:r>
+              <a:rPr lang="en-US" dirty="0"/>
+              <a:t>Fall </a:t>
+            </a:r>
+            <a:r>
+              <a:rPr lang="en-US" dirty="0" smtClean="0"/>
+              <a:t>of Richmond*</a:t>
+            </a:r>
+            <a:endParaRPr lang="en-US" dirty="0"/>
+          </a:p>
+          <a:p>
+            <a:r>
+              <a:rPr lang="en-US" dirty="0"/>
+              <a:t>Lincoln </a:t>
+            </a:r>
+            <a:r>
+              <a:rPr lang="en-US" dirty="0" smtClean="0"/>
+              <a:t>assassinated*</a:t>
+            </a:r>
+            <a:endParaRPr lang="en-US" dirty="0"/>
+          </a:p>
+          <a:p>
+            <a:r>
+              <a:rPr lang="en-US" dirty="0"/>
+              <a:t>Jefferson </a:t>
+            </a:r>
+            <a:r>
+              <a:rPr lang="en-US" dirty="0" smtClean="0"/>
+              <a:t>Davis </a:t>
+            </a:r>
+            <a:r>
+              <a:rPr lang="en-US" dirty="0"/>
+              <a:t>captured</a:t>
+            </a:r>
+          </a:p>
+          <a:p>
+            <a:r>
+              <a:rPr lang="en-US" dirty="0" smtClean="0"/>
+              <a:t>Palmetto ranch*</a:t>
+            </a:r>
+            <a:endParaRPr lang="en-US" dirty="0"/>
+          </a:p>
+          <a:p>
+            <a:endParaRPr lang="en-US" dirty="0"/>
+          </a:p>
+        </p:txBody>
+      </p:sp>
+    </p:spTree>
+    <p:extLst>
+      <p:ext uri="{BB962C8B-B14F-4D97-AF65-F5344CB8AC3E}">
+        <p14:creationId xmlns:p14="http://schemas.microsoft.com/office/powerpoint/2010/main" val="616596551"/>
+      </p:ext>
+    </p:extLst>
+  </p:cSld>
+  <p:clrMapOvr>
+    <a:masterClrMapping/>
+  </p:clrMapOvr>
+</p:sld>
+</file>
+
+<file path=ppt/slides/slide25.xml><?xml version="1.0" encoding="utf-8"?>
+<p:sld xmlns:a="http://schemas.openxmlformats.org/drawingml/2006/main" xmlns:r="http://schemas.openxmlformats.org/officeDocument/2006/relationships" xmlns:p="http://schemas.openxmlformats.org/presentationml/2006/main">
+  <p:cSld>
+    <p:spTree>
+      <p:nvGrpSpPr>
+        <p:cNvPr id="1" name=""/>
+        <p:cNvGrpSpPr/>
+        <p:nvPr/>
+      </p:nvGrpSpPr>
+      <p:grpSpPr>
+        <a:xfrm>
+          <a:off x="0" y="0"/>
+          <a:ext cx="0" cy="0"/>
+          <a:chOff x="0" y="0"/>
+          <a:chExt cx="0" cy="0"/>
+        </a:xfrm>
+      </p:grpSpPr>
+      <p:sp>
+        <p:nvSpPr>
+          <p:cNvPr id="2" name="Title 1"/>
+          <p:cNvSpPr>
+            <a:spLocks noGrp="1"/>
+          </p:cNvSpPr>
+          <p:nvPr>
+            <p:ph type="title"/>
+          </p:nvPr>
+        </p:nvSpPr>
+        <p:spPr/>
+        <p:txBody>
+          <a:bodyPr/>
+          <a:lstStyle/>
+          <a:p>
+            <a:r>
+              <a:rPr lang="en-US" dirty="0"/>
+              <a:t>Fall of Petersburg</a:t>
+            </a:r>
+          </a:p>
+        </p:txBody>
+      </p:sp>
+      <p:sp>
+        <p:nvSpPr>
+          <p:cNvPr id="3" name="Content Placeholder 2"/>
+          <p:cNvSpPr>
+            <a:spLocks noGrp="1"/>
+          </p:cNvSpPr>
+          <p:nvPr>
+            <p:ph idx="1"/>
+          </p:nvPr>
+        </p:nvSpPr>
+        <p:spPr/>
+        <p:txBody>
+          <a:bodyPr/>
+          <a:lstStyle/>
+          <a:p>
+            <a:endParaRPr lang="en-US"/>
+          </a:p>
+        </p:txBody>
+      </p:sp>
+      <p:sp>
+        <p:nvSpPr>
+          <p:cNvPr id="4" name="TextBox 3"/>
+          <p:cNvSpPr txBox="1"/>
+          <p:nvPr/>
+        </p:nvSpPr>
+        <p:spPr>
+          <a:xfrm>
+            <a:off x="6879167" y="243417"/>
+            <a:ext cx="1428750" cy="369332"/>
+          </a:xfrm>
+          <a:prstGeom prst="rect">
+            <a:avLst/>
+          </a:prstGeom>
+          <a:noFill/>
+        </p:spPr>
+        <p:txBody>
+          <a:bodyPr wrap="square" rtlCol="0">
+            <a:spAutoFit/>
+          </a:bodyPr>
+          <a:lstStyle/>
+          <a:p>
+            <a:r>
+              <a:rPr lang="en-US" dirty="0" smtClean="0"/>
+              <a:t>-Rohan</a:t>
+            </a:r>
+            <a:endParaRPr lang="en-US" dirty="0"/>
+          </a:p>
+        </p:txBody>
+      </p:sp>
+    </p:spTree>
+    <p:extLst>
+      <p:ext uri="{BB962C8B-B14F-4D97-AF65-F5344CB8AC3E}">
+        <p14:creationId xmlns:p14="http://schemas.microsoft.com/office/powerpoint/2010/main" val="256758823"/>
+      </p:ext>
+    </p:extLst>
+  </p:cSld>
+  <p:clrMapOvr>
+    <a:masterClrMapping/>
+  </p:clrMapOvr>
+</p:sld>
+</file>
+
+<file path=ppt/slides/slide26.xml><?xml version="1.0" encoding="utf-8"?>
+<p:sld xmlns:a="http://schemas.openxmlformats.org/drawingml/2006/main" xmlns:r="http://schemas.openxmlformats.org/officeDocument/2006/relationships" xmlns:p="http://schemas.openxmlformats.org/presentationml/2006/main">
+  <p:cSld>
+    <p:spTree>
+      <p:nvGrpSpPr>
+        <p:cNvPr id="1" name=""/>
+        <p:cNvGrpSpPr/>
+        <p:nvPr/>
+      </p:nvGrpSpPr>
+      <p:grpSpPr>
+        <a:xfrm>
+          <a:off x="0" y="0"/>
+          <a:ext cx="0" cy="0"/>
+          <a:chOff x="0" y="0"/>
+          <a:chExt cx="0" cy="0"/>
+        </a:xfrm>
+      </p:grpSpPr>
+      <p:sp>
+        <p:nvSpPr>
+          <p:cNvPr id="2" name="Title 1"/>
+          <p:cNvSpPr>
+            <a:spLocks noGrp="1"/>
+          </p:cNvSpPr>
+          <p:nvPr>
+            <p:ph type="title"/>
+          </p:nvPr>
+        </p:nvSpPr>
+        <p:spPr/>
+        <p:txBody>
+          <a:bodyPr/>
+          <a:lstStyle/>
+          <a:p>
+            <a:r>
+              <a:rPr lang="en-US" dirty="0"/>
+              <a:t>Fall of Richmond</a:t>
+            </a:r>
+          </a:p>
+        </p:txBody>
+      </p:sp>
+      <p:sp>
+        <p:nvSpPr>
+          <p:cNvPr id="3" name="Content Placeholder 2"/>
+          <p:cNvSpPr>
+            <a:spLocks noGrp="1"/>
+          </p:cNvSpPr>
+          <p:nvPr>
+            <p:ph idx="1"/>
+          </p:nvPr>
+        </p:nvSpPr>
+        <p:spPr/>
+        <p:txBody>
+          <a:bodyPr/>
+          <a:lstStyle/>
+          <a:p>
+            <a:endParaRPr lang="en-US"/>
+          </a:p>
+        </p:txBody>
+      </p:sp>
+      <p:sp>
+        <p:nvSpPr>
+          <p:cNvPr id="4" name="TextBox 3"/>
+          <p:cNvSpPr txBox="1"/>
+          <p:nvPr/>
+        </p:nvSpPr>
+        <p:spPr>
+          <a:xfrm>
+            <a:off x="6858000" y="179917"/>
+            <a:ext cx="1502833" cy="369332"/>
+          </a:xfrm>
+          <a:prstGeom prst="rect">
+            <a:avLst/>
+          </a:prstGeom>
+          <a:noFill/>
+        </p:spPr>
+        <p:txBody>
+          <a:bodyPr wrap="square" rtlCol="0">
+            <a:spAutoFit/>
+          </a:bodyPr>
+          <a:lstStyle/>
+          <a:p>
+            <a:r>
+              <a:rPr lang="en-US" dirty="0" smtClean="0"/>
+              <a:t>-Vinay</a:t>
+            </a:r>
+            <a:endParaRPr lang="en-US" dirty="0"/>
+          </a:p>
+        </p:txBody>
+      </p:sp>
+    </p:spTree>
+    <p:extLst>
+      <p:ext uri="{BB962C8B-B14F-4D97-AF65-F5344CB8AC3E}">
+        <p14:creationId xmlns:p14="http://schemas.microsoft.com/office/powerpoint/2010/main" val="3953403181"/>
+      </p:ext>
+    </p:extLst>
+  </p:cSld>
+  <p:clrMapOvr>
+    <a:masterClrMapping/>
+  </p:clrMapOvr>
+</p:sld>
+</file>
+
+<file path=ppt/slides/slide27.xml><?xml version="1.0" encoding="utf-8"?>
+<p:sld xmlns:a="http://schemas.openxmlformats.org/drawingml/2006/main" xmlns:r="http://schemas.openxmlformats.org/officeDocument/2006/relationships" xmlns:p="http://schemas.openxmlformats.org/presentationml/2006/main">
+  <p:cSld>
+    <p:spTree>
+      <p:nvGrpSpPr>
+        <p:cNvPr id="1" name=""/>
+        <p:cNvGrpSpPr/>
+        <p:nvPr/>
+      </p:nvGrpSpPr>
+      <p:grpSpPr>
+        <a:xfrm>
+          <a:off x="0" y="0"/>
+          <a:ext cx="0" cy="0"/>
+          <a:chOff x="0" y="0"/>
+          <a:chExt cx="0" cy="0"/>
+        </a:xfrm>
+      </p:grpSpPr>
+      <p:sp>
+        <p:nvSpPr>
+          <p:cNvPr id="2" name="Title 1"/>
+          <p:cNvSpPr>
+            <a:spLocks noGrp="1"/>
+          </p:cNvSpPr>
+          <p:nvPr>
+            <p:ph type="title"/>
+          </p:nvPr>
+        </p:nvSpPr>
+        <p:spPr/>
+        <p:txBody>
+          <a:bodyPr/>
+          <a:lstStyle/>
+          <a:p>
+            <a:r>
+              <a:rPr lang="en-US" dirty="0"/>
+              <a:t>Lincoln </a:t>
+            </a:r>
+            <a:r>
+              <a:rPr lang="en-US" dirty="0" smtClean="0"/>
+              <a:t>Assassinated</a:t>
+            </a:r>
+            <a:endParaRPr lang="en-US" dirty="0"/>
+          </a:p>
+        </p:txBody>
+      </p:sp>
+      <p:sp>
+        <p:nvSpPr>
+          <p:cNvPr id="3" name="Content Placeholder 2"/>
+          <p:cNvSpPr>
+            <a:spLocks noGrp="1"/>
+          </p:cNvSpPr>
+          <p:nvPr>
+            <p:ph idx="1"/>
+          </p:nvPr>
+        </p:nvSpPr>
+        <p:spPr/>
+        <p:txBody>
+          <a:bodyPr/>
+          <a:lstStyle/>
+          <a:p>
+            <a:endParaRPr lang="en-US"/>
+          </a:p>
+        </p:txBody>
+      </p:sp>
+      <p:sp>
+        <p:nvSpPr>
+          <p:cNvPr id="4" name="TextBox 3"/>
+          <p:cNvSpPr txBox="1"/>
+          <p:nvPr/>
+        </p:nvSpPr>
+        <p:spPr>
+          <a:xfrm>
+            <a:off x="6879167" y="179917"/>
+            <a:ext cx="1524000" cy="369332"/>
+          </a:xfrm>
+          <a:prstGeom prst="rect">
+            <a:avLst/>
+          </a:prstGeom>
+          <a:noFill/>
+        </p:spPr>
+        <p:txBody>
+          <a:bodyPr wrap="square" rtlCol="0">
+            <a:spAutoFit/>
+          </a:bodyPr>
+          <a:lstStyle/>
+          <a:p>
+            <a:r>
+              <a:rPr lang="en-US" dirty="0" smtClean="0"/>
+              <a:t>-Neel</a:t>
+            </a:r>
+            <a:endParaRPr lang="en-US" dirty="0"/>
+          </a:p>
+        </p:txBody>
+      </p:sp>
+    </p:spTree>
+    <p:extLst>
+      <p:ext uri="{BB962C8B-B14F-4D97-AF65-F5344CB8AC3E}">
+        <p14:creationId xmlns:p14="http://schemas.microsoft.com/office/powerpoint/2010/main" val="2522545022"/>
+      </p:ext>
+    </p:extLst>
+  </p:cSld>
+  <p:clrMapOvr>
+    <a:masterClrMapping/>
+  </p:clrMapOvr>
+</p:sld>
+</file>
+
+<file path=ppt/slides/slide28.xml><?xml version="1.0" encoding="utf-8"?>
+<p:sld xmlns:a="http://schemas.openxmlformats.org/drawingml/2006/main" xmlns:r="http://schemas.openxmlformats.org/officeDocument/2006/relationships" xmlns:p="http://schemas.openxmlformats.org/presentationml/2006/main">
+  <p:cSld>
+    <p:spTree>
+      <p:nvGrpSpPr>
+        <p:cNvPr id="1" name=""/>
+        <p:cNvGrpSpPr/>
+        <p:nvPr/>
+      </p:nvGrpSpPr>
+      <p:grpSpPr>
+        <a:xfrm>
+          <a:off x="0" y="0"/>
+          <a:ext cx="0" cy="0"/>
+          <a:chOff x="0" y="0"/>
+          <a:chExt cx="0" cy="0"/>
+        </a:xfrm>
+      </p:grpSpPr>
+      <p:sp>
+        <p:nvSpPr>
+          <p:cNvPr id="2" name="Title 1"/>
+          <p:cNvSpPr>
+            <a:spLocks noGrp="1"/>
+          </p:cNvSpPr>
+          <p:nvPr>
+            <p:ph type="title"/>
+          </p:nvPr>
+        </p:nvSpPr>
+        <p:spPr/>
+        <p:txBody>
+          <a:bodyPr/>
+          <a:lstStyle/>
+          <a:p>
+            <a:r>
+              <a:rPr lang="en-US" dirty="0"/>
+              <a:t>Palmetto </a:t>
+            </a:r>
+            <a:r>
+              <a:rPr lang="en-US" dirty="0" smtClean="0"/>
+              <a:t>Ranch</a:t>
+            </a:r>
+            <a:endParaRPr lang="en-US" dirty="0"/>
+          </a:p>
+        </p:txBody>
+      </p:sp>
+      <p:sp>
+        <p:nvSpPr>
+          <p:cNvPr id="3" name="Content Placeholder 2"/>
+          <p:cNvSpPr>
+            <a:spLocks noGrp="1"/>
+          </p:cNvSpPr>
+          <p:nvPr>
+            <p:ph idx="1"/>
+          </p:nvPr>
+        </p:nvSpPr>
+        <p:spPr/>
+        <p:txBody>
+          <a:bodyPr/>
+          <a:lstStyle/>
+          <a:p>
+            <a:endParaRPr lang="en-US"/>
+          </a:p>
+        </p:txBody>
+      </p:sp>
+      <p:sp>
+        <p:nvSpPr>
+          <p:cNvPr id="4" name="TextBox 3"/>
+          <p:cNvSpPr txBox="1"/>
+          <p:nvPr/>
+        </p:nvSpPr>
+        <p:spPr>
+          <a:xfrm>
+            <a:off x="6985000" y="243417"/>
+            <a:ext cx="1333500" cy="369332"/>
+          </a:xfrm>
+          <a:prstGeom prst="rect">
+            <a:avLst/>
+          </a:prstGeom>
+          <a:noFill/>
+        </p:spPr>
+        <p:txBody>
+          <a:bodyPr wrap="square" rtlCol="0">
+            <a:spAutoFit/>
+          </a:bodyPr>
+          <a:lstStyle/>
+          <a:p>
+            <a:r>
+              <a:rPr lang="en-US" dirty="0" smtClean="0"/>
+              <a:t>-Vinay</a:t>
+            </a:r>
+            <a:endParaRPr lang="en-US" dirty="0"/>
+          </a:p>
+        </p:txBody>
+      </p:sp>
+    </p:spTree>
+    <p:extLst>
+      <p:ext uri="{BB962C8B-B14F-4D97-AF65-F5344CB8AC3E}">
+        <p14:creationId xmlns:p14="http://schemas.microsoft.com/office/powerpoint/2010/main" val="844406813"/>
+      </p:ext>
+    </p:extLst>
+  </p:cSld>
+  <p:clrMapOvr>
+    <a:masterClrMapping/>
+  </p:clrMapOvr>
+</p:sld>
+</file>
+
+<file path=ppt/slides/slide29.xml><?xml version="1.0" encoding="utf-8"?>
+<p:sld xmlns:a="http://schemas.openxmlformats.org/drawingml/2006/main" xmlns:r="http://schemas.openxmlformats.org/officeDocument/2006/relationships" xmlns:p="http://schemas.openxmlformats.org/presentationml/2006/main">
+  <p:cSld>
+    <p:spTree>
+      <p:nvGrpSpPr>
+        <p:cNvPr id="1" name=""/>
+        <p:cNvGrpSpPr/>
+        <p:nvPr/>
+      </p:nvGrpSpPr>
+      <p:grpSpPr>
+        <a:xfrm>
+          <a:off x="0" y="0"/>
+          <a:ext cx="0" cy="0"/>
+          <a:chOff x="0" y="0"/>
+          <a:chExt cx="0" cy="0"/>
+        </a:xfrm>
+      </p:grpSpPr>
+      <p:sp>
+        <p:nvSpPr>
+          <p:cNvPr id="2" name="Title 1"/>
+          <p:cNvSpPr>
+            <a:spLocks noGrp="1"/>
+          </p:cNvSpPr>
+          <p:nvPr>
+            <p:ph type="title"/>
+          </p:nvPr>
+        </p:nvSpPr>
+        <p:spPr/>
+        <p:txBody>
+          <a:bodyPr/>
+          <a:lstStyle/>
+          <a:p>
+            <a:r>
+              <a:rPr lang="en-US" dirty="0" smtClean="0"/>
+              <a:t>Modern Realization</a:t>
+            </a:r>
+            <a:endParaRPr lang="en-US" dirty="0"/>
+          </a:p>
+        </p:txBody>
+      </p:sp>
+      <p:sp>
+        <p:nvSpPr>
+          <p:cNvPr id="3" name="Content Placeholder 2"/>
+          <p:cNvSpPr>
+            <a:spLocks noGrp="1"/>
+          </p:cNvSpPr>
+          <p:nvPr>
+            <p:ph idx="1"/>
+          </p:nvPr>
+        </p:nvSpPr>
+        <p:spPr/>
+        <p:txBody>
+          <a:bodyPr/>
+          <a:lstStyle/>
+          <a:p>
+            <a:endParaRPr lang="en-US"/>
+          </a:p>
+        </p:txBody>
+      </p:sp>
+      <p:sp>
+        <p:nvSpPr>
+          <p:cNvPr id="4" name="TextBox 3"/>
+          <p:cNvSpPr txBox="1"/>
+          <p:nvPr/>
+        </p:nvSpPr>
+        <p:spPr>
+          <a:xfrm>
+            <a:off x="7239000" y="232833"/>
+            <a:ext cx="1703917" cy="646331"/>
+          </a:xfrm>
+          <a:prstGeom prst="rect">
+            <a:avLst/>
+          </a:prstGeom>
+          <a:noFill/>
+        </p:spPr>
+        <p:txBody>
+          <a:bodyPr wrap="square" rtlCol="0">
+            <a:spAutoFit/>
+          </a:bodyPr>
+          <a:lstStyle/>
+          <a:p>
+            <a:r>
+              <a:rPr lang="en-US" dirty="0" smtClean="0"/>
+              <a:t>All 3 don</a:t>
+            </a:r>
+            <a:r>
+              <a:rPr lang="fr-FR" dirty="0" smtClean="0"/>
+              <a:t>’</a:t>
+            </a:r>
+            <a:r>
+              <a:rPr lang="en-US" dirty="0" smtClean="0"/>
+              <a:t>t talk about till later</a:t>
+            </a:r>
+            <a:endParaRPr lang="en-US" dirty="0"/>
+          </a:p>
+        </p:txBody>
+      </p:sp>
+    </p:spTree>
+    <p:extLst>
+      <p:ext uri="{BB962C8B-B14F-4D97-AF65-F5344CB8AC3E}">
+        <p14:creationId xmlns:p14="http://schemas.microsoft.com/office/powerpoint/2010/main" val="1052876114"/>
+      </p:ext>
+    </p:extLst>
+  </p:cSld>
+  <p:clrMapOvr>
+    <a:masterClrMapping/>
+  </p:clrMapOvr>
+</p:sld>
+</file>
+
+<file path=ppt/slides/slide3.xml><?xml version="1.0" encoding="utf-8"?>
+<p:sld xmlns:a="http://schemas.openxmlformats.org/drawingml/2006/main" xmlns:r="http://schemas.openxmlformats.org/officeDocument/2006/relationships" xmlns:p="http://schemas.openxmlformats.org/presentationml/2006/main">
+  <p:cSld>
+    <p:spTree>
+      <p:nvGrpSpPr>
+        <p:cNvPr id="1" name=""/>
+        <p:cNvGrpSpPr/>
+        <p:nvPr/>
+      </p:nvGrpSpPr>
+      <p:grpSpPr>
+        <a:xfrm>
+          <a:off x="0" y="0"/>
+          <a:ext cx="0" cy="0"/>
+          <a:chOff x="0" y="0"/>
+          <a:chExt cx="0" cy="0"/>
+        </a:xfrm>
+      </p:grpSpPr>
+      <p:sp>
+        <p:nvSpPr>
+          <p:cNvPr id="2" name="Title 1"/>
+          <p:cNvSpPr>
+            <a:spLocks noGrp="1"/>
+          </p:cNvSpPr>
+          <p:nvPr>
+            <p:ph type="title"/>
+          </p:nvPr>
+        </p:nvSpPr>
+        <p:spPr/>
+        <p:txBody>
+          <a:bodyPr/>
+          <a:lstStyle/>
+          <a:p>
+            <a:r>
+              <a:rPr lang="en-US" dirty="0" smtClean="0"/>
+              <a:t>Fort Sumter</a:t>
+            </a:r>
+            <a:endParaRPr lang="en-US" dirty="0"/>
+          </a:p>
+        </p:txBody>
+      </p:sp>
+      <p:sp>
+        <p:nvSpPr>
+          <p:cNvPr id="3" name="Content Placeholder 2"/>
+          <p:cNvSpPr>
+            <a:spLocks noGrp="1"/>
+          </p:cNvSpPr>
+          <p:nvPr>
+            <p:ph idx="1"/>
+          </p:nvPr>
+        </p:nvSpPr>
+        <p:spPr/>
+        <p:txBody>
+          <a:bodyPr/>
+          <a:lstStyle/>
+          <a:p>
+            <a:endParaRPr lang="en-US"/>
+          </a:p>
+        </p:txBody>
+      </p:sp>
+      <p:sp>
+        <p:nvSpPr>
+          <p:cNvPr id="4" name="TextBox 3"/>
+          <p:cNvSpPr txBox="1"/>
+          <p:nvPr/>
+        </p:nvSpPr>
+        <p:spPr>
+          <a:xfrm>
+            <a:off x="7179133" y="207327"/>
+            <a:ext cx="1619841" cy="369332"/>
+          </a:xfrm>
+          <a:prstGeom prst="rect">
+            <a:avLst/>
+          </a:prstGeom>
+          <a:noFill/>
+        </p:spPr>
+        <p:txBody>
+          <a:bodyPr wrap="square" rtlCol="0">
+            <a:spAutoFit/>
+          </a:bodyPr>
+          <a:lstStyle/>
+          <a:p>
+            <a:r>
+              <a:rPr lang="en-US" dirty="0" smtClean="0"/>
+              <a:t>-Vinay</a:t>
+            </a:r>
+            <a:endParaRPr lang="en-US" dirty="0"/>
+          </a:p>
+        </p:txBody>
+      </p:sp>
+    </p:spTree>
+    <p:extLst>
+      <p:ext uri="{BB962C8B-B14F-4D97-AF65-F5344CB8AC3E}">
+        <p14:creationId xmlns:p14="http://schemas.microsoft.com/office/powerpoint/2010/main" val="168350203"/>
+      </p:ext>
+    </p:extLst>
+  </p:cSld>
+  <p:clrMapOvr>
+    <a:masterClrMapping/>
+  </p:clrMapOvr>
+  <p:timing>
+    <p:tnLst>
+      <p:par>
+        <p:cTn xmlns:p14="http://schemas.microsoft.com/office/powerpoint/2010/main" id="1" dur="indefinite" restart="never" nodeType="tmRoot"/>
+      </p:par>
+    </p:tnLst>
+  </p:timing>
+</p:sld>
+</file>
+
+<file path=ppt/slides/slide30.xml><?xml version="1.0" encoding="utf-8"?>
+<p:sld xmlns:a="http://schemas.openxmlformats.org/drawingml/2006/main" xmlns:r="http://schemas.openxmlformats.org/officeDocument/2006/relationships" xmlns:p="http://schemas.openxmlformats.org/presentationml/2006/main">
+  <p:cSld>
+    <p:spTree>
+      <p:nvGrpSpPr>
+        <p:cNvPr id="1" name=""/>
+        <p:cNvGrpSpPr/>
+        <p:nvPr/>
+      </p:nvGrpSpPr>
+      <p:grpSpPr>
+        <a:xfrm>
+          <a:off x="0" y="0"/>
+          <a:ext cx="0" cy="0"/>
+          <a:chOff x="0" y="0"/>
+          <a:chExt cx="0" cy="0"/>
+        </a:xfrm>
+      </p:grpSpPr>
+      <p:sp>
+        <p:nvSpPr>
+          <p:cNvPr id="2" name="Title 1"/>
+          <p:cNvSpPr>
+            <a:spLocks noGrp="1"/>
+          </p:cNvSpPr>
+          <p:nvPr>
+            <p:ph type="title"/>
+          </p:nvPr>
+        </p:nvSpPr>
+        <p:spPr/>
+        <p:txBody>
+          <a:bodyPr/>
+          <a:lstStyle/>
+          <a:p>
+            <a:r>
+              <a:rPr lang="en-US" dirty="0" smtClean="0"/>
+              <a:t>Citations</a:t>
+            </a:r>
+            <a:endParaRPr lang="en-US" dirty="0"/>
+          </a:p>
+        </p:txBody>
+      </p:sp>
+      <p:sp>
+        <p:nvSpPr>
+          <p:cNvPr id="3" name="Content Placeholder 2"/>
+          <p:cNvSpPr>
+            <a:spLocks noGrp="1"/>
+          </p:cNvSpPr>
+          <p:nvPr>
+            <p:ph idx="1"/>
+          </p:nvPr>
+        </p:nvSpPr>
+        <p:spPr/>
+        <p:txBody>
+          <a:bodyPr/>
+          <a:lstStyle/>
+          <a:p>
+            <a:r>
+              <a:rPr lang="en-US" dirty="0" smtClean="0">
+                <a:hlinkClick r:id="rId2"/>
+              </a:rPr>
+              <a:t>www.nps.gov/gett/learn/historyculture/civil-war-timeline.htm</a:t>
+            </a:r>
+            <a:endParaRPr lang="en-US" dirty="0" smtClean="0"/>
+          </a:p>
+          <a:p>
+            <a:endParaRPr lang="en-US" dirty="0"/>
+          </a:p>
+        </p:txBody>
+      </p:sp>
+    </p:spTree>
+    <p:extLst>
+      <p:ext uri="{BB962C8B-B14F-4D97-AF65-F5344CB8AC3E}">
+        <p14:creationId xmlns:p14="http://schemas.microsoft.com/office/powerpoint/2010/main" val="2892767894"/>
+      </p:ext>
+    </p:extLst>
+  </p:cSld>
+  <p:clrMapOvr>
+    <a:masterClrMapping/>
+  </p:clrMapOvr>
+</p:sld>
+</file>
+
+<file path=ppt/slides/slide4.xml><?xml version="1.0" encoding="utf-8"?>
+<p:sld xmlns:a="http://schemas.openxmlformats.org/drawingml/2006/main" xmlns:r="http://schemas.openxmlformats.org/officeDocument/2006/relationships" xmlns:p="http://schemas.openxmlformats.org/presentationml/2006/main">
+  <p:cSld>
+    <p:spTree>
+      <p:nvGrpSpPr>
+        <p:cNvPr id="1" name=""/>
+        <p:cNvGrpSpPr/>
+        <p:nvPr/>
+      </p:nvGrpSpPr>
+      <p:grpSpPr>
+        <a:xfrm>
+          <a:off x="0" y="0"/>
+          <a:ext cx="0" cy="0"/>
+          <a:chOff x="0" y="0"/>
+          <a:chExt cx="0" cy="0"/>
+        </a:xfrm>
+      </p:grpSpPr>
+      <p:sp>
+        <p:nvSpPr>
+          <p:cNvPr id="2" name="Title 1"/>
+          <p:cNvSpPr>
+            <a:spLocks noGrp="1"/>
+          </p:cNvSpPr>
+          <p:nvPr>
+            <p:ph type="title"/>
+          </p:nvPr>
+        </p:nvSpPr>
+        <p:spPr/>
+        <p:txBody>
+          <a:bodyPr/>
+          <a:lstStyle/>
+          <a:p>
+            <a:r>
+              <a:rPr lang="en-US" dirty="0" smtClean="0"/>
+              <a:t>Bull Run/First Manassas</a:t>
+            </a:r>
+            <a:endParaRPr lang="en-US" dirty="0"/>
+          </a:p>
+        </p:txBody>
+      </p:sp>
+      <p:sp>
+        <p:nvSpPr>
+          <p:cNvPr id="3" name="Content Placeholder 2"/>
+          <p:cNvSpPr>
+            <a:spLocks noGrp="1"/>
+          </p:cNvSpPr>
+          <p:nvPr>
+            <p:ph idx="1"/>
+          </p:nvPr>
+        </p:nvSpPr>
+        <p:spPr/>
+        <p:txBody>
+          <a:bodyPr/>
+          <a:lstStyle/>
+          <a:p>
+            <a:endParaRPr lang="en-US" dirty="0"/>
+          </a:p>
+        </p:txBody>
+      </p:sp>
+      <p:sp>
+        <p:nvSpPr>
+          <p:cNvPr id="4" name="TextBox 3"/>
+          <p:cNvSpPr txBox="1"/>
+          <p:nvPr/>
+        </p:nvSpPr>
+        <p:spPr>
+          <a:xfrm>
+            <a:off x="7088422" y="298033"/>
+            <a:ext cx="1464336" cy="369332"/>
+          </a:xfrm>
+          <a:prstGeom prst="rect">
+            <a:avLst/>
+          </a:prstGeom>
+          <a:noFill/>
+        </p:spPr>
+        <p:txBody>
+          <a:bodyPr wrap="square" rtlCol="0">
+            <a:spAutoFit/>
+          </a:bodyPr>
+          <a:lstStyle/>
+          <a:p>
+            <a:r>
+              <a:rPr lang="en-US" dirty="0" smtClean="0"/>
+              <a:t>-Rohan</a:t>
+            </a:r>
+            <a:endParaRPr lang="en-US" dirty="0"/>
+          </a:p>
+        </p:txBody>
+      </p:sp>
+    </p:spTree>
+    <p:extLst>
+      <p:ext uri="{BB962C8B-B14F-4D97-AF65-F5344CB8AC3E}">
+        <p14:creationId xmlns:p14="http://schemas.microsoft.com/office/powerpoint/2010/main" val="1188851054"/>
+      </p:ext>
+    </p:extLst>
+  </p:cSld>
+  <p:clrMapOvr>
+    <a:masterClrMapping/>
+  </p:clrMapOvr>
+  <p:timing>
+    <p:tnLst>
+      <p:par>
+        <p:cTn xmlns:p14="http://schemas.microsoft.com/office/powerpoint/2010/main" id="1" dur="indefinite" restart="never" nodeType="tmRoot"/>
+      </p:par>
+    </p:tnLst>
+  </p:timing>
+</p:sld>
+</file>
+
+<file path=ppt/slides/slide5.xml><?xml version="1.0" encoding="utf-8"?>
+<p:sld xmlns:a="http://schemas.openxmlformats.org/drawingml/2006/main" xmlns:r="http://schemas.openxmlformats.org/officeDocument/2006/relationships" xmlns:p="http://schemas.openxmlformats.org/presentationml/2006/main">
+  <p:cSld>
+    <p:spTree>
+      <p:nvGrpSpPr>
+        <p:cNvPr id="1" name=""/>
+        <p:cNvGrpSpPr/>
+        <p:nvPr/>
+      </p:nvGrpSpPr>
+      <p:grpSpPr>
+        <a:xfrm>
+          <a:off x="0" y="0"/>
+          <a:ext cx="0" cy="0"/>
+          <a:chOff x="0" y="0"/>
+          <a:chExt cx="0" cy="0"/>
+        </a:xfrm>
+      </p:grpSpPr>
+      <p:sp>
+        <p:nvSpPr>
+          <p:cNvPr id="2" name="Title 1"/>
+          <p:cNvSpPr>
+            <a:spLocks noGrp="1"/>
+          </p:cNvSpPr>
+          <p:nvPr>
+            <p:ph type="title"/>
+          </p:nvPr>
+        </p:nvSpPr>
+        <p:spPr/>
+        <p:txBody>
+          <a:bodyPr/>
+          <a:lstStyle/>
+          <a:p>
+            <a:r>
+              <a:rPr lang="en-US" dirty="0" smtClean="0"/>
+              <a:t>Fort Washington</a:t>
+            </a:r>
+            <a:endParaRPr lang="en-US" dirty="0"/>
+          </a:p>
+        </p:txBody>
+      </p:sp>
+      <p:sp>
+        <p:nvSpPr>
+          <p:cNvPr id="3" name="Content Placeholder 2"/>
+          <p:cNvSpPr>
+            <a:spLocks noGrp="1"/>
+          </p:cNvSpPr>
+          <p:nvPr>
+            <p:ph idx="1"/>
+          </p:nvPr>
+        </p:nvSpPr>
+        <p:spPr/>
+        <p:txBody>
+          <a:bodyPr/>
+          <a:lstStyle/>
+          <a:p>
+            <a:endParaRPr lang="en-US"/>
+          </a:p>
+        </p:txBody>
+      </p:sp>
+      <p:sp>
+        <p:nvSpPr>
+          <p:cNvPr id="4" name="TextBox 3"/>
+          <p:cNvSpPr txBox="1"/>
+          <p:nvPr/>
+        </p:nvSpPr>
+        <p:spPr>
+          <a:xfrm>
+            <a:off x="6945876" y="233243"/>
+            <a:ext cx="1529130" cy="369332"/>
+          </a:xfrm>
+          <a:prstGeom prst="rect">
+            <a:avLst/>
+          </a:prstGeom>
+          <a:noFill/>
+        </p:spPr>
+        <p:txBody>
+          <a:bodyPr wrap="square" rtlCol="0">
+            <a:spAutoFit/>
+          </a:bodyPr>
+          <a:lstStyle/>
+          <a:p>
+            <a:r>
+              <a:rPr lang="en-US" dirty="0" smtClean="0"/>
+              <a:t>-Neel</a:t>
+            </a:r>
+            <a:endParaRPr lang="en-US" dirty="0"/>
+          </a:p>
+        </p:txBody>
+      </p:sp>
+    </p:spTree>
+    <p:extLst>
+      <p:ext uri="{BB962C8B-B14F-4D97-AF65-F5344CB8AC3E}">
+        <p14:creationId xmlns:p14="http://schemas.microsoft.com/office/powerpoint/2010/main" val="4172413337"/>
+      </p:ext>
+    </p:extLst>
+  </p:cSld>
+  <p:clrMapOvr>
+    <a:masterClrMapping/>
+  </p:clrMapOvr>
+  <p:timing>
+    <p:tnLst>
+      <p:par>
+        <p:cTn xmlns:p14="http://schemas.microsoft.com/office/powerpoint/2010/main" id="1" dur="indefinite" restart="never" nodeType="tmRoot"/>
+      </p:par>
+    </p:tnLst>
+  </p:timing>
 </p:sld>
 </file>
 
@@ -8767,7 +11058,7 @@
           <a:p>
             <a:r>
               <a:rPr lang="en-US" dirty="0" smtClean="0"/>
-              <a:t>Citations</a:t>
+              <a:t>Lexington</a:t>
             </a:r>
             <a:endParaRPr lang="en-US" dirty="0"/>
           </a:p>
@@ -8788,15 +11079,36 @@
           <a:bodyPr/>
           <a:lstStyle/>
           <a:p>
-            <a:r>
-              <a:rPr lang="en-US" dirty="0" smtClean="0">
-                <a:hlinkClick r:id="rId2"/>
-              </a:rPr>
-              <a:t>www.nps.gov/gett/learn/historyculture/civil-war-timeline.htm</a:t>
-            </a:r>
-            <a:endParaRPr lang="en-US" dirty="0" smtClean="0"/>
-          </a:p>
-          <a:p>
+            <a:endParaRPr lang="en-US"/>
+          </a:p>
+        </p:txBody>
+      </p:sp>
+      <p:sp>
+        <p:nvSpPr>
+          <p:cNvPr id="4" name="TextBox 3"/>
+          <p:cNvSpPr txBox="1"/>
+          <p:nvPr/>
+        </p:nvSpPr>
+        <p:spPr>
+          <a:xfrm>
+            <a:off x="7334638" y="207327"/>
+            <a:ext cx="1503212" cy="369332"/>
+          </a:xfrm>
+          <a:prstGeom prst="rect">
+            <a:avLst/>
+          </a:prstGeom>
+          <a:noFill/>
+        </p:spPr>
+        <p:txBody>
+          <a:bodyPr wrap="square" rtlCol="0">
+            <a:spAutoFit/>
+          </a:bodyPr>
+          <a:lstStyle/>
+          <a:p>
+            <a:r>
+              <a:rPr lang="en-US" dirty="0" smtClean="0"/>
+              <a:t>-Vinay</a:t>
+            </a:r>
             <a:endParaRPr lang="en-US" dirty="0"/>
           </a:p>
         </p:txBody>
@@ -8804,13 +11116,364 @@
     </p:spTree>
     <p:extLst>
       <p:ext uri="{BB962C8B-B14F-4D97-AF65-F5344CB8AC3E}">
-        <p14:creationId xmlns:p14="http://schemas.microsoft.com/office/powerpoint/2010/main" val="2892767894"/>
+        <p14:creationId xmlns:p14="http://schemas.microsoft.com/office/powerpoint/2010/main" val="2900627398"/>
       </p:ext>
     </p:extLst>
   </p:cSld>
   <p:clrMapOvr>
     <a:masterClrMapping/>
   </p:clrMapOvr>
+  <p:timing>
+    <p:tnLst>
+      <p:par>
+        <p:cTn xmlns:p14="http://schemas.microsoft.com/office/powerpoint/2010/main" id="1" dur="indefinite" restart="never" nodeType="tmRoot"/>
+      </p:par>
+    </p:tnLst>
+  </p:timing>
+</p:sld>
+</file>
+
+<file path=ppt/slides/slide7.xml><?xml version="1.0" encoding="utf-8"?>
+<p:sld xmlns:a="http://schemas.openxmlformats.org/drawingml/2006/main" xmlns:r="http://schemas.openxmlformats.org/officeDocument/2006/relationships" xmlns:p="http://schemas.openxmlformats.org/presentationml/2006/main">
+  <p:cSld>
+    <p:spTree>
+      <p:nvGrpSpPr>
+        <p:cNvPr id="1" name=""/>
+        <p:cNvGrpSpPr/>
+        <p:nvPr/>
+      </p:nvGrpSpPr>
+      <p:grpSpPr>
+        <a:xfrm>
+          <a:off x="0" y="0"/>
+          <a:ext cx="0" cy="0"/>
+          <a:chOff x="0" y="0"/>
+          <a:chExt cx="0" cy="0"/>
+        </a:xfrm>
+      </p:grpSpPr>
+      <p:sp>
+        <p:nvSpPr>
+          <p:cNvPr id="2" name="Title 1"/>
+          <p:cNvSpPr>
+            <a:spLocks noGrp="1"/>
+          </p:cNvSpPr>
+          <p:nvPr>
+            <p:ph type="title"/>
+          </p:nvPr>
+        </p:nvSpPr>
+        <p:spPr/>
+        <p:txBody>
+          <a:bodyPr/>
+          <a:lstStyle/>
+          <a:p>
+            <a:r>
+              <a:rPr lang="en-US" dirty="0" smtClean="0"/>
+              <a:t>Battles 1862</a:t>
+            </a:r>
+            <a:endParaRPr lang="en-US" dirty="0"/>
+          </a:p>
+        </p:txBody>
+      </p:sp>
+      <p:sp>
+        <p:nvSpPr>
+          <p:cNvPr id="3" name="Content Placeholder 2"/>
+          <p:cNvSpPr>
+            <a:spLocks noGrp="1"/>
+          </p:cNvSpPr>
+          <p:nvPr>
+            <p:ph idx="1"/>
+          </p:nvPr>
+        </p:nvSpPr>
+        <p:spPr/>
+        <p:txBody>
+          <a:bodyPr>
+            <a:normAutofit fontScale="92500" lnSpcReduction="20000"/>
+          </a:bodyPr>
+          <a:lstStyle/>
+          <a:p>
+            <a:r>
+              <a:rPr lang="en-US" dirty="0" smtClean="0"/>
+              <a:t>Battle of Roanoke Island</a:t>
+            </a:r>
+          </a:p>
+          <a:p>
+            <a:r>
+              <a:rPr lang="en-US" dirty="0" smtClean="0"/>
+              <a:t>Fort Donaldson* </a:t>
+            </a:r>
+          </a:p>
+          <a:p>
+            <a:r>
+              <a:rPr lang="en-US" dirty="0" smtClean="0"/>
+              <a:t>Battle of Pea Ridge</a:t>
+            </a:r>
+          </a:p>
+          <a:p>
+            <a:r>
+              <a:rPr lang="en-US" dirty="0" smtClean="0"/>
+              <a:t>Shiloh*</a:t>
+            </a:r>
+          </a:p>
+          <a:p>
+            <a:r>
+              <a:rPr lang="en-US" dirty="0" smtClean="0"/>
+              <a:t>Battle of seven Pines</a:t>
+            </a:r>
+          </a:p>
+          <a:p>
+            <a:r>
+              <a:rPr lang="en-US" dirty="0" smtClean="0"/>
+              <a:t>Second Bull Run*</a:t>
+            </a:r>
+          </a:p>
+          <a:p>
+            <a:r>
+              <a:rPr lang="en-US" dirty="0" smtClean="0"/>
+              <a:t>Antietam*</a:t>
+            </a:r>
+          </a:p>
+          <a:p>
+            <a:r>
+              <a:rPr lang="en-US" dirty="0" smtClean="0"/>
+              <a:t>Fredericksburg*</a:t>
+            </a:r>
+            <a:endParaRPr lang="en-US" dirty="0"/>
+          </a:p>
+        </p:txBody>
+      </p:sp>
+    </p:spTree>
+    <p:extLst>
+      <p:ext uri="{BB962C8B-B14F-4D97-AF65-F5344CB8AC3E}">
+        <p14:creationId xmlns:p14="http://schemas.microsoft.com/office/powerpoint/2010/main" val="2782731645"/>
+      </p:ext>
+    </p:extLst>
+  </p:cSld>
+  <p:clrMapOvr>
+    <a:masterClrMapping/>
+  </p:clrMapOvr>
+  <p:timing>
+    <p:tnLst>
+      <p:par>
+        <p:cTn xmlns:p14="http://schemas.microsoft.com/office/powerpoint/2010/main" id="1" dur="indefinite" restart="never" nodeType="tmRoot"/>
+      </p:par>
+    </p:tnLst>
+  </p:timing>
+</p:sld>
+</file>
+
+<file path=ppt/slides/slide8.xml><?xml version="1.0" encoding="utf-8"?>
+<p:sld xmlns:a="http://schemas.openxmlformats.org/drawingml/2006/main" xmlns:r="http://schemas.openxmlformats.org/officeDocument/2006/relationships" xmlns:p="http://schemas.openxmlformats.org/presentationml/2006/main">
+  <p:cSld>
+    <p:spTree>
+      <p:nvGrpSpPr>
+        <p:cNvPr id="1" name=""/>
+        <p:cNvGrpSpPr/>
+        <p:nvPr/>
+      </p:nvGrpSpPr>
+      <p:grpSpPr>
+        <a:xfrm>
+          <a:off x="0" y="0"/>
+          <a:ext cx="0" cy="0"/>
+          <a:chOff x="0" y="0"/>
+          <a:chExt cx="0" cy="0"/>
+        </a:xfrm>
+      </p:grpSpPr>
+      <p:sp>
+        <p:nvSpPr>
+          <p:cNvPr id="2" name="Title 1"/>
+          <p:cNvSpPr>
+            <a:spLocks noGrp="1"/>
+          </p:cNvSpPr>
+          <p:nvPr>
+            <p:ph type="title"/>
+          </p:nvPr>
+        </p:nvSpPr>
+        <p:spPr/>
+        <p:txBody>
+          <a:bodyPr/>
+          <a:lstStyle/>
+          <a:p>
+            <a:r>
+              <a:rPr lang="en-US" dirty="0"/>
+              <a:t>Fort Donaldson</a:t>
+            </a:r>
+          </a:p>
+        </p:txBody>
+      </p:sp>
+      <p:sp>
+        <p:nvSpPr>
+          <p:cNvPr id="3" name="Content Placeholder 2"/>
+          <p:cNvSpPr>
+            <a:spLocks noGrp="1"/>
+          </p:cNvSpPr>
+          <p:nvPr>
+            <p:ph idx="1"/>
+          </p:nvPr>
+        </p:nvSpPr>
+        <p:spPr/>
+        <p:txBody>
+          <a:bodyPr/>
+          <a:lstStyle/>
+          <a:p>
+            <a:endParaRPr lang="en-US"/>
+          </a:p>
+        </p:txBody>
+      </p:sp>
+      <p:sp>
+        <p:nvSpPr>
+          <p:cNvPr id="4" name="TextBox 3"/>
+          <p:cNvSpPr txBox="1"/>
+          <p:nvPr/>
+        </p:nvSpPr>
+        <p:spPr>
+          <a:xfrm>
+            <a:off x="6764454" y="233243"/>
+            <a:ext cx="1606882" cy="369332"/>
+          </a:xfrm>
+          <a:prstGeom prst="rect">
+            <a:avLst/>
+          </a:prstGeom>
+          <a:noFill/>
+        </p:spPr>
+        <p:txBody>
+          <a:bodyPr wrap="square" rtlCol="0">
+            <a:spAutoFit/>
+          </a:bodyPr>
+          <a:lstStyle/>
+          <a:p>
+            <a:r>
+              <a:rPr lang="en-US" dirty="0" smtClean="0"/>
+              <a:t>-Neel</a:t>
+            </a:r>
+            <a:endParaRPr lang="en-US" dirty="0"/>
+          </a:p>
+        </p:txBody>
+      </p:sp>
+    </p:spTree>
+    <p:extLst>
+      <p:ext uri="{BB962C8B-B14F-4D97-AF65-F5344CB8AC3E}">
+        <p14:creationId xmlns:p14="http://schemas.microsoft.com/office/powerpoint/2010/main" val="2253988221"/>
+      </p:ext>
+    </p:extLst>
+  </p:cSld>
+  <p:clrMapOvr>
+    <a:masterClrMapping/>
+  </p:clrMapOvr>
+  <p:timing>
+    <p:tnLst>
+      <p:par>
+        <p:cTn xmlns:p14="http://schemas.microsoft.com/office/powerpoint/2010/main" id="1" dur="indefinite" restart="never" nodeType="tmRoot"/>
+      </p:par>
+    </p:tnLst>
+  </p:timing>
+</p:sld>
+</file>
+
+<file path=ppt/slides/slide9.xml><?xml version="1.0" encoding="utf-8"?>
+<p:sld xmlns:a="http://schemas.openxmlformats.org/drawingml/2006/main" xmlns:r="http://schemas.openxmlformats.org/officeDocument/2006/relationships" xmlns:p="http://schemas.openxmlformats.org/presentationml/2006/main">
+  <p:cSld>
+    <p:spTree>
+      <p:nvGrpSpPr>
+        <p:cNvPr id="1" name=""/>
+        <p:cNvGrpSpPr/>
+        <p:nvPr/>
+      </p:nvGrpSpPr>
+      <p:grpSpPr>
+        <a:xfrm>
+          <a:off x="0" y="0"/>
+          <a:ext cx="0" cy="0"/>
+          <a:chOff x="0" y="0"/>
+          <a:chExt cx="0" cy="0"/>
+        </a:xfrm>
+      </p:grpSpPr>
+      <p:sp>
+        <p:nvSpPr>
+          <p:cNvPr id="2" name="Title 1"/>
+          <p:cNvSpPr>
+            <a:spLocks noGrp="1"/>
+          </p:cNvSpPr>
+          <p:nvPr>
+            <p:ph type="title"/>
+          </p:nvPr>
+        </p:nvSpPr>
+        <p:spPr/>
+        <p:txBody>
+          <a:bodyPr/>
+          <a:lstStyle/>
+          <a:p>
+            <a:r>
+              <a:rPr lang="en-US" dirty="0" smtClean="0"/>
+              <a:t>Shiloh</a:t>
+            </a:r>
+            <a:endParaRPr lang="en-US" dirty="0"/>
+          </a:p>
+        </p:txBody>
+      </p:sp>
+      <p:sp>
+        <p:nvSpPr>
+          <p:cNvPr id="3" name="Content Placeholder 2"/>
+          <p:cNvSpPr>
+            <a:spLocks noGrp="1"/>
+          </p:cNvSpPr>
+          <p:nvPr>
+            <p:ph idx="1"/>
+          </p:nvPr>
+        </p:nvSpPr>
+        <p:spPr/>
+        <p:txBody>
+          <a:bodyPr/>
+          <a:lstStyle/>
+          <a:p>
+            <a:endParaRPr lang="en-US"/>
+          </a:p>
+        </p:txBody>
+      </p:sp>
+      <p:sp>
+        <p:nvSpPr>
+          <p:cNvPr id="4" name="TextBox 3"/>
+          <p:cNvSpPr txBox="1"/>
+          <p:nvPr/>
+        </p:nvSpPr>
+        <p:spPr>
+          <a:xfrm>
+            <a:off x="6557115" y="272117"/>
+            <a:ext cx="2021561" cy="375781"/>
+          </a:xfrm>
+          <a:prstGeom prst="rect">
+            <a:avLst/>
+          </a:prstGeom>
+          <a:noFill/>
+        </p:spPr>
+        <p:txBody>
+          <a:bodyPr wrap="square" rtlCol="0">
+            <a:spAutoFit/>
+          </a:bodyPr>
+          <a:lstStyle/>
+          <a:p>
+            <a:r>
+              <a:rPr lang="en-US" dirty="0" smtClean="0"/>
+              <a:t>-Rohan</a:t>
+            </a:r>
+            <a:endParaRPr lang="en-US" dirty="0"/>
+          </a:p>
+        </p:txBody>
+      </p:sp>
+    </p:spTree>
+    <p:extLst>
+      <p:ext uri="{BB962C8B-B14F-4D97-AF65-F5344CB8AC3E}">
+        <p14:creationId xmlns:p14="http://schemas.microsoft.com/office/powerpoint/2010/main" val="1213115108"/>
+      </p:ext>
+    </p:extLst>
+  </p:cSld>
+  <p:clrMapOvr>
+    <a:masterClrMapping/>
+  </p:clrMapOvr>
+  <p:timing>
+    <p:tnLst>
+      <p:par>
+        <p:cTn xmlns:p14="http://schemas.microsoft.com/office/powerpoint/2010/main" id="1" dur="indefinite" restart="never" nodeType="tmRoot"/>
+      </p:par>
+    </p:tnLst>
+  </p:timing>
 </p:sld>
 </file>
 

</xml_diff>

<commit_message>
Finished 61 and part of 62 as well as all the citations
</commit_message>
<xml_diff>
--- a/Archive project.pptx
+++ b/Archive project.pptx
@@ -9,32 +9,36 @@
     <p:sldId id="258" r:id="rId3"/>
     <p:sldId id="263" r:id="rId4"/>
     <p:sldId id="264" r:id="rId5"/>
-    <p:sldId id="265" r:id="rId6"/>
-    <p:sldId id="266" r:id="rId7"/>
-    <p:sldId id="259" r:id="rId8"/>
-    <p:sldId id="267" r:id="rId9"/>
-    <p:sldId id="268" r:id="rId10"/>
-    <p:sldId id="269" r:id="rId11"/>
-    <p:sldId id="270" r:id="rId12"/>
-    <p:sldId id="271" r:id="rId13"/>
-    <p:sldId id="260" r:id="rId14"/>
-    <p:sldId id="272" r:id="rId15"/>
-    <p:sldId id="273" r:id="rId16"/>
-    <p:sldId id="274" r:id="rId17"/>
-    <p:sldId id="275" r:id="rId18"/>
-    <p:sldId id="276" r:id="rId19"/>
-    <p:sldId id="261" r:id="rId20"/>
-    <p:sldId id="277" r:id="rId21"/>
-    <p:sldId id="278" r:id="rId22"/>
-    <p:sldId id="279" r:id="rId23"/>
-    <p:sldId id="280" r:id="rId24"/>
-    <p:sldId id="262" r:id="rId25"/>
-    <p:sldId id="281" r:id="rId26"/>
-    <p:sldId id="282" r:id="rId27"/>
-    <p:sldId id="283" r:id="rId28"/>
-    <p:sldId id="284" r:id="rId29"/>
-    <p:sldId id="285" r:id="rId30"/>
-    <p:sldId id="257" r:id="rId31"/>
+    <p:sldId id="286" r:id="rId6"/>
+    <p:sldId id="265" r:id="rId7"/>
+    <p:sldId id="266" r:id="rId8"/>
+    <p:sldId id="259" r:id="rId9"/>
+    <p:sldId id="267" r:id="rId10"/>
+    <p:sldId id="287" r:id="rId11"/>
+    <p:sldId id="268" r:id="rId12"/>
+    <p:sldId id="289" r:id="rId13"/>
+    <p:sldId id="269" r:id="rId14"/>
+    <p:sldId id="270" r:id="rId15"/>
+    <p:sldId id="271" r:id="rId16"/>
+    <p:sldId id="260" r:id="rId17"/>
+    <p:sldId id="272" r:id="rId18"/>
+    <p:sldId id="273" r:id="rId19"/>
+    <p:sldId id="274" r:id="rId20"/>
+    <p:sldId id="275" r:id="rId21"/>
+    <p:sldId id="276" r:id="rId22"/>
+    <p:sldId id="261" r:id="rId23"/>
+    <p:sldId id="277" r:id="rId24"/>
+    <p:sldId id="278" r:id="rId25"/>
+    <p:sldId id="279" r:id="rId26"/>
+    <p:sldId id="280" r:id="rId27"/>
+    <p:sldId id="262" r:id="rId28"/>
+    <p:sldId id="281" r:id="rId29"/>
+    <p:sldId id="282" r:id="rId30"/>
+    <p:sldId id="283" r:id="rId31"/>
+    <p:sldId id="284" r:id="rId32"/>
+    <p:sldId id="285" r:id="rId33"/>
+    <p:sldId id="257" r:id="rId34"/>
+    <p:sldId id="288" r:id="rId35"/>
   </p:sldIdLst>
   <p:sldSz cx="9144000" cy="6858000" type="screen4x3"/>
   <p:notesSz cx="6858000" cy="9144000"/>
@@ -8040,81 +8044,40 @@
           <a:chExt cx="0" cy="0"/>
         </a:xfrm>
       </p:grpSpPr>
-      <p:sp>
-        <p:nvSpPr>
-          <p:cNvPr id="2" name="Title 1"/>
-          <p:cNvSpPr>
-            <a:spLocks noGrp="1"/>
-          </p:cNvSpPr>
-          <p:nvPr>
-            <p:ph type="title"/>
-          </p:nvPr>
-        </p:nvSpPr>
-        <p:spPr/>
-        <p:txBody>
-          <a:bodyPr/>
-          <a:lstStyle/>
-          <a:p>
-            <a:r>
-              <a:rPr lang="en-US" dirty="0"/>
-              <a:t>Second Bull Run</a:t>
-            </a:r>
-          </a:p>
-        </p:txBody>
-      </p:sp>
-      <p:sp>
-        <p:nvSpPr>
-          <p:cNvPr id="3" name="Content Placeholder 2"/>
-          <p:cNvSpPr>
-            <a:spLocks noGrp="1"/>
-          </p:cNvSpPr>
+      <p:pic>
+        <p:nvPicPr>
+          <p:cNvPr id="4" name="Content Placeholder 3" descr="6857047327_b66b5b7fcd.jpg"/>
+          <p:cNvPicPr>
+            <a:picLocks noGrp="1" noChangeAspect="1"/>
+          </p:cNvPicPr>
           <p:nvPr>
             <p:ph idx="1"/>
           </p:nvPr>
-        </p:nvSpPr>
-        <p:spPr/>
-        <p:txBody>
-          <a:bodyPr/>
-          <a:lstStyle/>
-          <a:p>
-            <a:endParaRPr lang="en-US"/>
-          </a:p>
-        </p:txBody>
-      </p:sp>
-      <p:sp>
-        <p:nvSpPr>
-          <p:cNvPr id="4" name="TextBox 3"/>
-          <p:cNvSpPr txBox="1"/>
-          <p:nvPr/>
-        </p:nvSpPr>
+        </p:nvPicPr>
+        <p:blipFill>
+          <a:blip r:embed="rId2">
+            <a:extLst>
+              <a:ext uri="{28A0092B-C50C-407E-A947-70E740481C1C}">
+                <a14:useLocalDpi xmlns:a14="http://schemas.microsoft.com/office/drawing/2010/main" val="0"/>
+              </a:ext>
+            </a:extLst>
+          </a:blip>
+          <a:srcRect l="-9145" r="-9145"/>
+          <a:stretch>
+            <a:fillRect/>
+          </a:stretch>
+        </p:blipFill>
         <p:spPr>
           <a:xfrm>
-            <a:off x="6829248" y="194369"/>
-            <a:ext cx="1671675" cy="369332"/>
+            <a:off x="0" y="77747"/>
+            <a:ext cx="9144000" cy="6725181"/>
           </a:xfrm>
-          <a:prstGeom prst="rect">
-            <a:avLst/>
-          </a:prstGeom>
-          <a:noFill/>
         </p:spPr>
-        <p:txBody>
-          <a:bodyPr wrap="square" rtlCol="0">
-            <a:spAutoFit/>
-          </a:bodyPr>
-          <a:lstStyle/>
-          <a:p>
-            <a:r>
-              <a:rPr lang="en-US" dirty="0" smtClean="0"/>
-              <a:t>-Rohan</a:t>
-            </a:r>
-            <a:endParaRPr lang="en-US" dirty="0"/>
-          </a:p>
-        </p:txBody>
-      </p:sp>
+      </p:pic>
     </p:spTree>
     <p:extLst>
       <p:ext uri="{BB962C8B-B14F-4D97-AF65-F5344CB8AC3E}">
-        <p14:creationId xmlns:p14="http://schemas.microsoft.com/office/powerpoint/2010/main" val="1598801575"/>
+        <p14:creationId xmlns:p14="http://schemas.microsoft.com/office/powerpoint/2010/main" val="3617783724"/>
       </p:ext>
     </p:extLst>
   </p:cSld>
@@ -8165,7 +8128,7 @@
           <a:p>
             <a:r>
               <a:rPr lang="en-US" dirty="0" smtClean="0"/>
-              <a:t>Antietam</a:t>
+              <a:t>Shiloh</a:t>
             </a:r>
             <a:endParaRPr lang="en-US" dirty="0"/>
           </a:p>
@@ -8186,7 +8149,57 @@
           <a:bodyPr/>
           <a:lstStyle/>
           <a:p>
-            <a:endParaRPr lang="en-US"/>
+            <a:r>
+              <a:rPr lang="en-US" dirty="0" smtClean="0"/>
+              <a:t>April 6</a:t>
+            </a:r>
+            <a:r>
+              <a:rPr lang="en-US" baseline="30000" dirty="0" smtClean="0"/>
+              <a:t>th</a:t>
+            </a:r>
+            <a:r>
+              <a:rPr lang="en-US" dirty="0" smtClean="0"/>
+              <a:t>-7</a:t>
+            </a:r>
+            <a:r>
+              <a:rPr lang="en-US" baseline="30000" dirty="0" smtClean="0"/>
+              <a:t>th</a:t>
+            </a:r>
+            <a:r>
+              <a:rPr lang="en-US" dirty="0"/>
+              <a:t> </a:t>
+            </a:r>
+            <a:r>
+              <a:rPr lang="en-US" dirty="0" smtClean="0"/>
+              <a:t>total forces engaged 110,053, The confederates Generals were Albert Sidney Johnston and P.G.T Beauregard. The Union held Don Carlos Buell and Ulysses S. Grant</a:t>
+            </a:r>
+          </a:p>
+          <a:p>
+            <a:r>
+              <a:rPr lang="en-US" dirty="0" smtClean="0"/>
+              <a:t>Confederate Forces were 44,968 and Union Forces were 65,085</a:t>
+            </a:r>
+          </a:p>
+          <a:p>
+            <a:r>
+              <a:rPr lang="en-US" dirty="0" smtClean="0"/>
+              <a:t>Casualties:</a:t>
+            </a:r>
+          </a:p>
+          <a:p>
+            <a:pPr lvl="1"/>
+            <a:r>
+              <a:rPr lang="en-US" dirty="0" smtClean="0"/>
+              <a:t>Confederate – 10,669</a:t>
+            </a:r>
+          </a:p>
+          <a:p>
+            <a:pPr lvl="1"/>
+            <a:r>
+              <a:rPr lang="en-US" dirty="0" smtClean="0"/>
+              <a:t>Union – 13,047</a:t>
+            </a:r>
+            <a:endParaRPr lang="en-US" dirty="0"/>
           </a:p>
         </p:txBody>
       </p:sp>
@@ -8198,8 +8211,8 @@
         </p:nvSpPr>
         <p:spPr>
           <a:xfrm>
-            <a:off x="6246105" y="103664"/>
-            <a:ext cx="2280736" cy="369332"/>
+            <a:off x="6557115" y="272117"/>
+            <a:ext cx="2021561" cy="375781"/>
           </a:xfrm>
           <a:prstGeom prst="rect">
             <a:avLst/>
@@ -8214,7 +8227,7 @@
           <a:p>
             <a:r>
               <a:rPr lang="en-US" dirty="0" smtClean="0"/>
-              <a:t>-Vinay</a:t>
+              <a:t>-Rohan</a:t>
             </a:r>
             <a:endParaRPr lang="en-US" dirty="0"/>
           </a:p>
@@ -8223,7 +8236,7 @@
     </p:spTree>
     <p:extLst>
       <p:ext uri="{BB962C8B-B14F-4D97-AF65-F5344CB8AC3E}">
-        <p14:creationId xmlns:p14="http://schemas.microsoft.com/office/powerpoint/2010/main" val="1885916568"/>
+        <p14:creationId xmlns:p14="http://schemas.microsoft.com/office/powerpoint/2010/main" val="1213115108"/>
       </p:ext>
     </p:extLst>
   </p:cSld>
@@ -8272,10 +8285,7 @@
           <a:bodyPr/>
           <a:lstStyle/>
           <a:p>
-            <a:r>
-              <a:rPr lang="en-US" dirty="0"/>
-              <a:t>Fredericksburg</a:t>
-            </a:r>
+            <a:endParaRPr lang="en-US"/>
           </a:p>
         </p:txBody>
       </p:sp>
@@ -8298,53 +8308,55 @@
           </a:p>
         </p:txBody>
       </p:sp>
-      <p:sp>
-        <p:nvSpPr>
-          <p:cNvPr id="4" name="TextBox 3"/>
-          <p:cNvSpPr txBox="1"/>
+      <p:pic>
+        <p:nvPicPr>
+          <p:cNvPr id="4" name="Picture 3" descr="battle_of_shiloh_7april1862.jpg"/>
+          <p:cNvPicPr>
+            <a:picLocks noChangeAspect="1"/>
+          </p:cNvPicPr>
           <p:nvPr/>
-        </p:nvSpPr>
+        </p:nvPicPr>
+        <p:blipFill>
+          <a:blip r:embed="rId2">
+            <a:extLst>
+              <a:ext uri="{BEBA8EAE-BF5A-486C-A8C5-ECC9F3942E4B}">
+                <a14:imgProps xmlns:a14="http://schemas.microsoft.com/office/drawing/2010/main">
+                  <a14:imgLayer r:embed="rId3">
+                    <a14:imgEffect>
+                      <a14:saturation sat="400000"/>
+                    </a14:imgEffect>
+                  </a14:imgLayer>
+                </a14:imgProps>
+              </a:ext>
+              <a:ext uri="{28A0092B-C50C-407E-A947-70E740481C1C}">
+                <a14:useLocalDpi xmlns:a14="http://schemas.microsoft.com/office/drawing/2010/main" val="0"/>
+              </a:ext>
+            </a:extLst>
+          </a:blip>
+          <a:stretch>
+            <a:fillRect/>
+          </a:stretch>
+        </p:blipFill>
         <p:spPr>
           <a:xfrm>
-            <a:off x="7062505" y="207327"/>
-            <a:ext cx="1438418" cy="369332"/>
+            <a:off x="308229" y="0"/>
+            <a:ext cx="8542580" cy="6858000"/>
           </a:xfrm>
           <a:prstGeom prst="rect">
             <a:avLst/>
           </a:prstGeom>
-          <a:noFill/>
         </p:spPr>
-        <p:txBody>
-          <a:bodyPr wrap="square" rtlCol="0">
-            <a:spAutoFit/>
-          </a:bodyPr>
-          <a:lstStyle/>
-          <a:p>
-            <a:r>
-              <a:rPr lang="en-US" dirty="0" smtClean="0"/>
-              <a:t>-Neel</a:t>
-            </a:r>
-            <a:endParaRPr lang="en-US" dirty="0"/>
-          </a:p>
-        </p:txBody>
-      </p:sp>
+      </p:pic>
     </p:spTree>
     <p:extLst>
       <p:ext uri="{BB962C8B-B14F-4D97-AF65-F5344CB8AC3E}">
-        <p14:creationId xmlns:p14="http://schemas.microsoft.com/office/powerpoint/2010/main" val="1924850588"/>
+        <p14:creationId xmlns:p14="http://schemas.microsoft.com/office/powerpoint/2010/main" val="2656114609"/>
       </p:ext>
     </p:extLst>
   </p:cSld>
   <p:clrMapOvr>
     <a:masterClrMapping/>
   </p:clrMapOvr>
-  <p:timing>
-    <p:tnLst>
-      <p:par>
-        <p:cTn xmlns:p14="http://schemas.microsoft.com/office/powerpoint/2010/main" id="1" dur="indefinite" restart="never" nodeType="tmRoot"/>
-      </p:par>
-    </p:tnLst>
-  </p:timing>
 </p:sld>
 </file>
 
@@ -8381,10 +8393,9 @@
           <a:lstStyle/>
           <a:p>
             <a:r>
-              <a:rPr lang="en-US" dirty="0" smtClean="0"/>
-              <a:t>Battles of 1863</a:t>
-            </a:r>
-            <a:endParaRPr lang="en-US" dirty="0"/>
+              <a:rPr lang="en-US" dirty="0"/>
+              <a:t>Second Bull Run</a:t>
+            </a:r>
           </a:p>
         </p:txBody>
       </p:sp>
@@ -8400,70 +8411,39 @@
         </p:nvSpPr>
         <p:spPr/>
         <p:txBody>
-          <a:bodyPr>
-            <a:normAutofit fontScale="70000" lnSpcReduction="20000"/>
+          <a:bodyPr/>
+          <a:lstStyle/>
+          <a:p>
+            <a:endParaRPr lang="en-US"/>
+          </a:p>
+        </p:txBody>
+      </p:sp>
+      <p:sp>
+        <p:nvSpPr>
+          <p:cNvPr id="4" name="TextBox 3"/>
+          <p:cNvSpPr txBox="1"/>
+          <p:nvPr/>
+        </p:nvSpPr>
+        <p:spPr>
+          <a:xfrm>
+            <a:off x="6829248" y="194369"/>
+            <a:ext cx="1671675" cy="369332"/>
+          </a:xfrm>
+          <a:prstGeom prst="rect">
+            <a:avLst/>
+          </a:prstGeom>
+          <a:noFill/>
+        </p:spPr>
+        <p:txBody>
+          <a:bodyPr wrap="square" rtlCol="0">
+            <a:spAutoFit/>
           </a:bodyPr>
           <a:lstStyle/>
           <a:p>
             <a:r>
               <a:rPr lang="en-US" dirty="0" smtClean="0"/>
-              <a:t>Emancipation Proclamation*</a:t>
-            </a:r>
-          </a:p>
-          <a:p>
-            <a:r>
-              <a:rPr lang="en-US" dirty="0" smtClean="0"/>
-              <a:t>Chancellorsville*</a:t>
-            </a:r>
-          </a:p>
-          <a:p>
-            <a:r>
-              <a:rPr lang="en-US" dirty="0" smtClean="0"/>
-              <a:t>Second Winchester</a:t>
-            </a:r>
-          </a:p>
-          <a:p>
-            <a:r>
-              <a:rPr lang="en-US" dirty="0" smtClean="0"/>
-              <a:t>Gettysburg*</a:t>
-            </a:r>
-          </a:p>
-          <a:p>
-            <a:r>
-              <a:rPr lang="en-US" dirty="0" smtClean="0"/>
-              <a:t>Vicksburg Captured July 4</a:t>
-            </a:r>
-            <a:r>
-              <a:rPr lang="en-US" baseline="30000" dirty="0" smtClean="0"/>
-              <a:t>th*</a:t>
-            </a:r>
-            <a:endParaRPr lang="en-US" dirty="0" smtClean="0"/>
-          </a:p>
-          <a:p>
-            <a:r>
-              <a:rPr lang="en-US" dirty="0" smtClean="0"/>
-              <a:t>Draft riots</a:t>
-            </a:r>
-          </a:p>
-          <a:p>
-            <a:r>
-              <a:rPr lang="en-US" dirty="0" smtClean="0"/>
-              <a:t>Chattanooga </a:t>
-            </a:r>
-          </a:p>
-          <a:p>
-            <a:r>
-              <a:rPr lang="en-US" dirty="0" smtClean="0"/>
-              <a:t>Chickamauga* </a:t>
-            </a:r>
-          </a:p>
-          <a:p>
-            <a:r>
-              <a:rPr lang="en-US" dirty="0" smtClean="0"/>
-              <a:t>Knoxville </a:t>
-            </a:r>
-          </a:p>
-          <a:p>
+              <a:t>-Rohan</a:t>
+            </a:r>
             <a:endParaRPr lang="en-US" dirty="0"/>
           </a:p>
         </p:txBody>
@@ -8471,7 +8451,7 @@
     </p:spTree>
     <p:extLst>
       <p:ext uri="{BB962C8B-B14F-4D97-AF65-F5344CB8AC3E}">
-        <p14:creationId xmlns:p14="http://schemas.microsoft.com/office/powerpoint/2010/main" val="2792614322"/>
+        <p14:creationId xmlns:p14="http://schemas.microsoft.com/office/powerpoint/2010/main" val="1598801575"/>
       </p:ext>
     </p:extLst>
   </p:cSld>
@@ -8521,9 +8501,10 @@
           <a:lstStyle/>
           <a:p>
             <a:r>
-              <a:rPr lang="en-US" dirty="0"/>
-              <a:t>Emancipation Proclamation</a:t>
-            </a:r>
+              <a:rPr lang="en-US" dirty="0" smtClean="0"/>
+              <a:t>Antietam</a:t>
+            </a:r>
+            <a:endParaRPr lang="en-US" dirty="0"/>
           </a:p>
         </p:txBody>
       </p:sp>
@@ -8554,8 +8535,8 @@
         </p:nvSpPr>
         <p:spPr>
           <a:xfrm>
-            <a:off x="6953250" y="95250"/>
-            <a:ext cx="1481667" cy="369332"/>
+            <a:off x="6246105" y="103664"/>
+            <a:ext cx="2280736" cy="369332"/>
           </a:xfrm>
           <a:prstGeom prst="rect">
             <a:avLst/>
@@ -8579,13 +8560,20 @@
     </p:spTree>
     <p:extLst>
       <p:ext uri="{BB962C8B-B14F-4D97-AF65-F5344CB8AC3E}">
-        <p14:creationId xmlns:p14="http://schemas.microsoft.com/office/powerpoint/2010/main" val="954385436"/>
+        <p14:creationId xmlns:p14="http://schemas.microsoft.com/office/powerpoint/2010/main" val="1885916568"/>
       </p:ext>
     </p:extLst>
   </p:cSld>
   <p:clrMapOvr>
     <a:masterClrMapping/>
   </p:clrMapOvr>
+  <p:timing>
+    <p:tnLst>
+      <p:par>
+        <p:cTn xmlns:p14="http://schemas.microsoft.com/office/powerpoint/2010/main" id="1" dur="indefinite" restart="never" nodeType="tmRoot"/>
+      </p:par>
+    </p:tnLst>
+  </p:timing>
 </p:sld>
 </file>
 
@@ -8623,7 +8611,7 @@
           <a:p>
             <a:r>
               <a:rPr lang="en-US" dirty="0"/>
-              <a:t>Chancellorsville</a:t>
+              <a:t>Fredericksburg</a:t>
             </a:r>
           </a:p>
         </p:txBody>
@@ -8655,8 +8643,8 @@
         </p:nvSpPr>
         <p:spPr>
           <a:xfrm>
-            <a:off x="7239000" y="275167"/>
-            <a:ext cx="1555750" cy="381000"/>
+            <a:off x="7062505" y="207327"/>
+            <a:ext cx="1438418" cy="369332"/>
           </a:xfrm>
           <a:prstGeom prst="rect">
             <a:avLst/>
@@ -8671,7 +8659,7 @@
           <a:p>
             <a:r>
               <a:rPr lang="en-US" dirty="0" smtClean="0"/>
-              <a:t>-Rohan</a:t>
+              <a:t>-Neel</a:t>
             </a:r>
             <a:endParaRPr lang="en-US" dirty="0"/>
           </a:p>
@@ -8680,13 +8668,20 @@
     </p:spTree>
     <p:extLst>
       <p:ext uri="{BB962C8B-B14F-4D97-AF65-F5344CB8AC3E}">
-        <p14:creationId xmlns:p14="http://schemas.microsoft.com/office/powerpoint/2010/main" val="2488087028"/>
+        <p14:creationId xmlns:p14="http://schemas.microsoft.com/office/powerpoint/2010/main" val="1924850588"/>
       </p:ext>
     </p:extLst>
   </p:cSld>
   <p:clrMapOvr>
     <a:masterClrMapping/>
   </p:clrMapOvr>
+  <p:timing>
+    <p:tnLst>
+      <p:par>
+        <p:cTn xmlns:p14="http://schemas.microsoft.com/office/powerpoint/2010/main" id="1" dur="indefinite" restart="never" nodeType="tmRoot"/>
+      </p:par>
+    </p:tnLst>
+  </p:timing>
 </p:sld>
 </file>
 
@@ -8723,9 +8718,10 @@
           <a:lstStyle/>
           <a:p>
             <a:r>
-              <a:rPr lang="en-US" dirty="0"/>
-              <a:t>Gettysburg</a:t>
-            </a:r>
+              <a:rPr lang="en-US" dirty="0" smtClean="0"/>
+              <a:t>Battles of 1863</a:t>
+            </a:r>
+            <a:endParaRPr lang="en-US" dirty="0"/>
           </a:p>
         </p:txBody>
       </p:sp>
@@ -8741,39 +8737,70 @@
         </p:nvSpPr>
         <p:spPr/>
         <p:txBody>
-          <a:bodyPr/>
-          <a:lstStyle/>
-          <a:p>
-            <a:endParaRPr lang="en-US"/>
-          </a:p>
-        </p:txBody>
-      </p:sp>
-      <p:sp>
-        <p:nvSpPr>
-          <p:cNvPr id="5" name="TextBox 4"/>
-          <p:cNvSpPr txBox="1"/>
-          <p:nvPr/>
-        </p:nvSpPr>
-        <p:spPr>
-          <a:xfrm>
-            <a:off x="6921500" y="243417"/>
-            <a:ext cx="1672167" cy="369332"/>
-          </a:xfrm>
-          <a:prstGeom prst="rect">
-            <a:avLst/>
-          </a:prstGeom>
-          <a:noFill/>
-        </p:spPr>
-        <p:txBody>
-          <a:bodyPr wrap="square" rtlCol="0">
-            <a:spAutoFit/>
+          <a:bodyPr>
+            <a:normAutofit fontScale="70000" lnSpcReduction="20000"/>
           </a:bodyPr>
           <a:lstStyle/>
           <a:p>
             <a:r>
               <a:rPr lang="en-US" dirty="0" smtClean="0"/>
-              <a:t>-Neel</a:t>
-            </a:r>
+              <a:t>Emancipation Proclamation*</a:t>
+            </a:r>
+          </a:p>
+          <a:p>
+            <a:r>
+              <a:rPr lang="en-US" dirty="0" smtClean="0"/>
+              <a:t>Chancellorsville*</a:t>
+            </a:r>
+          </a:p>
+          <a:p>
+            <a:r>
+              <a:rPr lang="en-US" dirty="0" smtClean="0"/>
+              <a:t>Second Winchester</a:t>
+            </a:r>
+          </a:p>
+          <a:p>
+            <a:r>
+              <a:rPr lang="en-US" dirty="0" smtClean="0"/>
+              <a:t>Gettysburg*</a:t>
+            </a:r>
+          </a:p>
+          <a:p>
+            <a:r>
+              <a:rPr lang="en-US" dirty="0" smtClean="0"/>
+              <a:t>Vicksburg Captured July 4</a:t>
+            </a:r>
+            <a:r>
+              <a:rPr lang="en-US" baseline="30000" dirty="0" smtClean="0"/>
+              <a:t>th*</a:t>
+            </a:r>
+            <a:endParaRPr lang="en-US" dirty="0" smtClean="0"/>
+          </a:p>
+          <a:p>
+            <a:r>
+              <a:rPr lang="en-US" dirty="0" smtClean="0"/>
+              <a:t>Draft riots</a:t>
+            </a:r>
+          </a:p>
+          <a:p>
+            <a:r>
+              <a:rPr lang="en-US" dirty="0" smtClean="0"/>
+              <a:t>Chattanooga </a:t>
+            </a:r>
+          </a:p>
+          <a:p>
+            <a:r>
+              <a:rPr lang="en-US" dirty="0" smtClean="0"/>
+              <a:t>Chickamauga* </a:t>
+            </a:r>
+          </a:p>
+          <a:p>
+            <a:r>
+              <a:rPr lang="en-US" dirty="0" smtClean="0"/>
+              <a:t>Knoxville </a:t>
+            </a:r>
+          </a:p>
+          <a:p>
             <a:endParaRPr lang="en-US" dirty="0"/>
           </a:p>
         </p:txBody>
@@ -8781,13 +8808,20 @@
     </p:spTree>
     <p:extLst>
       <p:ext uri="{BB962C8B-B14F-4D97-AF65-F5344CB8AC3E}">
-        <p14:creationId xmlns:p14="http://schemas.microsoft.com/office/powerpoint/2010/main" val="2470542951"/>
+        <p14:creationId xmlns:p14="http://schemas.microsoft.com/office/powerpoint/2010/main" val="2792614322"/>
       </p:ext>
     </p:extLst>
   </p:cSld>
   <p:clrMapOvr>
     <a:masterClrMapping/>
   </p:clrMapOvr>
+  <p:timing>
+    <p:tnLst>
+      <p:par>
+        <p:cTn xmlns:p14="http://schemas.microsoft.com/office/powerpoint/2010/main" id="1" dur="indefinite" restart="never" nodeType="tmRoot"/>
+      </p:par>
+    </p:tnLst>
+  </p:timing>
 </p:sld>
 </file>
 
@@ -8825,13 +8859,8 @@
           <a:p>
             <a:r>
               <a:rPr lang="en-US" dirty="0"/>
-              <a:t>Vicksburg </a:t>
-            </a:r>
-            <a:r>
-              <a:rPr lang="en-US" dirty="0" smtClean="0"/>
-              <a:t>Captured </a:t>
-            </a:r>
-            <a:endParaRPr lang="en-US" dirty="0"/>
+              <a:t>Emancipation Proclamation</a:t>
+            </a:r>
           </a:p>
         </p:txBody>
       </p:sp>
@@ -8850,11 +8879,7 @@
           <a:bodyPr/>
           <a:lstStyle/>
           <a:p>
-            <a:r>
-              <a:rPr lang="en-US" dirty="0" smtClean="0"/>
-              <a:t>Captured July 4th</a:t>
-            </a:r>
-            <a:endParaRPr lang="en-US" dirty="0"/>
+            <a:endParaRPr lang="en-US"/>
           </a:p>
         </p:txBody>
       </p:sp>
@@ -8866,8 +8891,8 @@
         </p:nvSpPr>
         <p:spPr>
           <a:xfrm>
-            <a:off x="7249583" y="169333"/>
-            <a:ext cx="1344084" cy="369332"/>
+            <a:off x="6953250" y="95250"/>
+            <a:ext cx="1481667" cy="369332"/>
           </a:xfrm>
           <a:prstGeom prst="rect">
             <a:avLst/>
@@ -8882,7 +8907,7 @@
           <a:p>
             <a:r>
               <a:rPr lang="en-US" dirty="0" smtClean="0"/>
-              <a:t>-Neel</a:t>
+              <a:t>-Vinay</a:t>
             </a:r>
             <a:endParaRPr lang="en-US" dirty="0"/>
           </a:p>
@@ -8891,7 +8916,7 @@
     </p:spTree>
     <p:extLst>
       <p:ext uri="{BB962C8B-B14F-4D97-AF65-F5344CB8AC3E}">
-        <p14:creationId xmlns:p14="http://schemas.microsoft.com/office/powerpoint/2010/main" val="2762890798"/>
+        <p14:creationId xmlns:p14="http://schemas.microsoft.com/office/powerpoint/2010/main" val="954385436"/>
       </p:ext>
     </p:extLst>
   </p:cSld>
@@ -8935,6 +8960,458 @@
           <a:p>
             <a:r>
               <a:rPr lang="en-US" dirty="0"/>
+              <a:t>Chancellorsville</a:t>
+            </a:r>
+          </a:p>
+        </p:txBody>
+      </p:sp>
+      <p:sp>
+        <p:nvSpPr>
+          <p:cNvPr id="3" name="Content Placeholder 2"/>
+          <p:cNvSpPr>
+            <a:spLocks noGrp="1"/>
+          </p:cNvSpPr>
+          <p:nvPr>
+            <p:ph idx="1"/>
+          </p:nvPr>
+        </p:nvSpPr>
+        <p:spPr/>
+        <p:txBody>
+          <a:bodyPr/>
+          <a:lstStyle/>
+          <a:p>
+            <a:endParaRPr lang="en-US"/>
+          </a:p>
+        </p:txBody>
+      </p:sp>
+      <p:sp>
+        <p:nvSpPr>
+          <p:cNvPr id="4" name="TextBox 3"/>
+          <p:cNvSpPr txBox="1"/>
+          <p:nvPr/>
+        </p:nvSpPr>
+        <p:spPr>
+          <a:xfrm>
+            <a:off x="7239000" y="275167"/>
+            <a:ext cx="1555750" cy="381000"/>
+          </a:xfrm>
+          <a:prstGeom prst="rect">
+            <a:avLst/>
+          </a:prstGeom>
+          <a:noFill/>
+        </p:spPr>
+        <p:txBody>
+          <a:bodyPr wrap="square" rtlCol="0">
+            <a:spAutoFit/>
+          </a:bodyPr>
+          <a:lstStyle/>
+          <a:p>
+            <a:r>
+              <a:rPr lang="en-US" dirty="0" smtClean="0"/>
+              <a:t>-Rohan</a:t>
+            </a:r>
+            <a:endParaRPr lang="en-US" dirty="0"/>
+          </a:p>
+        </p:txBody>
+      </p:sp>
+    </p:spTree>
+    <p:extLst>
+      <p:ext uri="{BB962C8B-B14F-4D97-AF65-F5344CB8AC3E}">
+        <p14:creationId xmlns:p14="http://schemas.microsoft.com/office/powerpoint/2010/main" val="2488087028"/>
+      </p:ext>
+    </p:extLst>
+  </p:cSld>
+  <p:clrMapOvr>
+    <a:masterClrMapping/>
+  </p:clrMapOvr>
+</p:sld>
+</file>
+
+<file path=ppt/slides/slide19.xml><?xml version="1.0" encoding="utf-8"?>
+<p:sld xmlns:a="http://schemas.openxmlformats.org/drawingml/2006/main" xmlns:r="http://schemas.openxmlformats.org/officeDocument/2006/relationships" xmlns:p="http://schemas.openxmlformats.org/presentationml/2006/main">
+  <p:cSld>
+    <p:spTree>
+      <p:nvGrpSpPr>
+        <p:cNvPr id="1" name=""/>
+        <p:cNvGrpSpPr/>
+        <p:nvPr/>
+      </p:nvGrpSpPr>
+      <p:grpSpPr>
+        <a:xfrm>
+          <a:off x="0" y="0"/>
+          <a:ext cx="0" cy="0"/>
+          <a:chOff x="0" y="0"/>
+          <a:chExt cx="0" cy="0"/>
+        </a:xfrm>
+      </p:grpSpPr>
+      <p:sp>
+        <p:nvSpPr>
+          <p:cNvPr id="2" name="Title 1"/>
+          <p:cNvSpPr>
+            <a:spLocks noGrp="1"/>
+          </p:cNvSpPr>
+          <p:nvPr>
+            <p:ph type="title"/>
+          </p:nvPr>
+        </p:nvSpPr>
+        <p:spPr/>
+        <p:txBody>
+          <a:bodyPr/>
+          <a:lstStyle/>
+          <a:p>
+            <a:r>
+              <a:rPr lang="en-US" dirty="0"/>
+              <a:t>Gettysburg</a:t>
+            </a:r>
+          </a:p>
+        </p:txBody>
+      </p:sp>
+      <p:sp>
+        <p:nvSpPr>
+          <p:cNvPr id="3" name="Content Placeholder 2"/>
+          <p:cNvSpPr>
+            <a:spLocks noGrp="1"/>
+          </p:cNvSpPr>
+          <p:nvPr>
+            <p:ph idx="1"/>
+          </p:nvPr>
+        </p:nvSpPr>
+        <p:spPr/>
+        <p:txBody>
+          <a:bodyPr/>
+          <a:lstStyle/>
+          <a:p>
+            <a:endParaRPr lang="en-US"/>
+          </a:p>
+        </p:txBody>
+      </p:sp>
+      <p:sp>
+        <p:nvSpPr>
+          <p:cNvPr id="5" name="TextBox 4"/>
+          <p:cNvSpPr txBox="1"/>
+          <p:nvPr/>
+        </p:nvSpPr>
+        <p:spPr>
+          <a:xfrm>
+            <a:off x="6921500" y="243417"/>
+            <a:ext cx="1672167" cy="369332"/>
+          </a:xfrm>
+          <a:prstGeom prst="rect">
+            <a:avLst/>
+          </a:prstGeom>
+          <a:noFill/>
+        </p:spPr>
+        <p:txBody>
+          <a:bodyPr wrap="square" rtlCol="0">
+            <a:spAutoFit/>
+          </a:bodyPr>
+          <a:lstStyle/>
+          <a:p>
+            <a:r>
+              <a:rPr lang="en-US" dirty="0" smtClean="0"/>
+              <a:t>-Neel</a:t>
+            </a:r>
+            <a:endParaRPr lang="en-US" dirty="0"/>
+          </a:p>
+        </p:txBody>
+      </p:sp>
+    </p:spTree>
+    <p:extLst>
+      <p:ext uri="{BB962C8B-B14F-4D97-AF65-F5344CB8AC3E}">
+        <p14:creationId xmlns:p14="http://schemas.microsoft.com/office/powerpoint/2010/main" val="2470542951"/>
+      </p:ext>
+    </p:extLst>
+  </p:cSld>
+  <p:clrMapOvr>
+    <a:masterClrMapping/>
+  </p:clrMapOvr>
+</p:sld>
+</file>
+
+<file path=ppt/slides/slide2.xml><?xml version="1.0" encoding="utf-8"?>
+<p:sld xmlns:a="http://schemas.openxmlformats.org/drawingml/2006/main" xmlns:r="http://schemas.openxmlformats.org/officeDocument/2006/relationships" xmlns:p="http://schemas.openxmlformats.org/presentationml/2006/main">
+  <p:cSld>
+    <p:spTree>
+      <p:nvGrpSpPr>
+        <p:cNvPr id="1" name=""/>
+        <p:cNvGrpSpPr/>
+        <p:nvPr/>
+      </p:nvGrpSpPr>
+      <p:grpSpPr>
+        <a:xfrm>
+          <a:off x="0" y="0"/>
+          <a:ext cx="0" cy="0"/>
+          <a:chOff x="0" y="0"/>
+          <a:chExt cx="0" cy="0"/>
+        </a:xfrm>
+      </p:grpSpPr>
+      <p:sp>
+        <p:nvSpPr>
+          <p:cNvPr id="2" name="Title 1"/>
+          <p:cNvSpPr>
+            <a:spLocks noGrp="1"/>
+          </p:cNvSpPr>
+          <p:nvPr>
+            <p:ph type="title"/>
+          </p:nvPr>
+        </p:nvSpPr>
+        <p:spPr/>
+        <p:txBody>
+          <a:bodyPr/>
+          <a:lstStyle/>
+          <a:p>
+            <a:r>
+              <a:rPr lang="en-US" dirty="0" smtClean="0"/>
+              <a:t>Battles in 1861</a:t>
+            </a:r>
+            <a:endParaRPr lang="en-US" dirty="0"/>
+          </a:p>
+        </p:txBody>
+      </p:sp>
+      <p:sp>
+        <p:nvSpPr>
+          <p:cNvPr id="3" name="Content Placeholder 2"/>
+          <p:cNvSpPr>
+            <a:spLocks noGrp="1"/>
+          </p:cNvSpPr>
+          <p:nvPr>
+            <p:ph idx="1"/>
+          </p:nvPr>
+        </p:nvSpPr>
+        <p:spPr/>
+        <p:txBody>
+          <a:bodyPr/>
+          <a:lstStyle/>
+          <a:p>
+            <a:pPr>
+              <a:lnSpc>
+                <a:spcPct val="150000"/>
+              </a:lnSpc>
+            </a:pPr>
+            <a:r>
+              <a:rPr lang="en-US" dirty="0" smtClean="0"/>
+              <a:t>Fort Sumter* </a:t>
+            </a:r>
+          </a:p>
+          <a:p>
+            <a:pPr>
+              <a:lnSpc>
+                <a:spcPct val="150000"/>
+              </a:lnSpc>
+            </a:pPr>
+            <a:r>
+              <a:rPr lang="en-US" dirty="0" smtClean="0"/>
+              <a:t>Bull run/</a:t>
+            </a:r>
+            <a:r>
+              <a:rPr lang="en-US" dirty="0"/>
+              <a:t>F</a:t>
+            </a:r>
+            <a:r>
+              <a:rPr lang="en-US" dirty="0" smtClean="0"/>
+              <a:t>irst Manassas*</a:t>
+            </a:r>
+          </a:p>
+          <a:p>
+            <a:pPr>
+              <a:lnSpc>
+                <a:spcPct val="150000"/>
+              </a:lnSpc>
+            </a:pPr>
+            <a:r>
+              <a:rPr lang="en-US" dirty="0" smtClean="0"/>
+              <a:t>Fort Washington</a:t>
+            </a:r>
+          </a:p>
+          <a:p>
+            <a:pPr>
+              <a:lnSpc>
+                <a:spcPct val="150000"/>
+              </a:lnSpc>
+            </a:pPr>
+            <a:r>
+              <a:rPr lang="en-US" dirty="0" smtClean="0"/>
+              <a:t>Wilson Creek*</a:t>
+            </a:r>
+          </a:p>
+          <a:p>
+            <a:pPr>
+              <a:lnSpc>
+                <a:spcPct val="150000"/>
+              </a:lnSpc>
+            </a:pPr>
+            <a:r>
+              <a:rPr lang="en-US" dirty="0" smtClean="0"/>
+              <a:t>Lexington*</a:t>
+            </a:r>
+            <a:endParaRPr lang="en-US" dirty="0"/>
+          </a:p>
+        </p:txBody>
+      </p:sp>
+    </p:spTree>
+    <p:extLst>
+      <p:ext uri="{BB962C8B-B14F-4D97-AF65-F5344CB8AC3E}">
+        <p14:creationId xmlns:p14="http://schemas.microsoft.com/office/powerpoint/2010/main" val="3915159450"/>
+      </p:ext>
+    </p:extLst>
+  </p:cSld>
+  <p:clrMapOvr>
+    <a:masterClrMapping/>
+  </p:clrMapOvr>
+  <p:timing>
+    <p:tnLst>
+      <p:par>
+        <p:cTn xmlns:p14="http://schemas.microsoft.com/office/powerpoint/2010/main" id="1" dur="indefinite" restart="never" nodeType="tmRoot"/>
+      </p:par>
+    </p:tnLst>
+  </p:timing>
+</p:sld>
+</file>
+
+<file path=ppt/slides/slide20.xml><?xml version="1.0" encoding="utf-8"?>
+<p:sld xmlns:a="http://schemas.openxmlformats.org/drawingml/2006/main" xmlns:r="http://schemas.openxmlformats.org/officeDocument/2006/relationships" xmlns:p="http://schemas.openxmlformats.org/presentationml/2006/main">
+  <p:cSld>
+    <p:spTree>
+      <p:nvGrpSpPr>
+        <p:cNvPr id="1" name=""/>
+        <p:cNvGrpSpPr/>
+        <p:nvPr/>
+      </p:nvGrpSpPr>
+      <p:grpSpPr>
+        <a:xfrm>
+          <a:off x="0" y="0"/>
+          <a:ext cx="0" cy="0"/>
+          <a:chOff x="0" y="0"/>
+          <a:chExt cx="0" cy="0"/>
+        </a:xfrm>
+      </p:grpSpPr>
+      <p:sp>
+        <p:nvSpPr>
+          <p:cNvPr id="2" name="Title 1"/>
+          <p:cNvSpPr>
+            <a:spLocks noGrp="1"/>
+          </p:cNvSpPr>
+          <p:nvPr>
+            <p:ph type="title"/>
+          </p:nvPr>
+        </p:nvSpPr>
+        <p:spPr/>
+        <p:txBody>
+          <a:bodyPr/>
+          <a:lstStyle/>
+          <a:p>
+            <a:r>
+              <a:rPr lang="en-US" dirty="0"/>
+              <a:t>Vicksburg </a:t>
+            </a:r>
+            <a:r>
+              <a:rPr lang="en-US" dirty="0" smtClean="0"/>
+              <a:t>Captured </a:t>
+            </a:r>
+            <a:endParaRPr lang="en-US" dirty="0"/>
+          </a:p>
+        </p:txBody>
+      </p:sp>
+      <p:sp>
+        <p:nvSpPr>
+          <p:cNvPr id="3" name="Content Placeholder 2"/>
+          <p:cNvSpPr>
+            <a:spLocks noGrp="1"/>
+          </p:cNvSpPr>
+          <p:nvPr>
+            <p:ph idx="1"/>
+          </p:nvPr>
+        </p:nvSpPr>
+        <p:spPr/>
+        <p:txBody>
+          <a:bodyPr/>
+          <a:lstStyle/>
+          <a:p>
+            <a:r>
+              <a:rPr lang="en-US" dirty="0" smtClean="0"/>
+              <a:t>Captured July 4th</a:t>
+            </a:r>
+            <a:endParaRPr lang="en-US" dirty="0"/>
+          </a:p>
+        </p:txBody>
+      </p:sp>
+      <p:sp>
+        <p:nvSpPr>
+          <p:cNvPr id="4" name="TextBox 3"/>
+          <p:cNvSpPr txBox="1"/>
+          <p:nvPr/>
+        </p:nvSpPr>
+        <p:spPr>
+          <a:xfrm>
+            <a:off x="7249583" y="169333"/>
+            <a:ext cx="1344084" cy="369332"/>
+          </a:xfrm>
+          <a:prstGeom prst="rect">
+            <a:avLst/>
+          </a:prstGeom>
+          <a:noFill/>
+        </p:spPr>
+        <p:txBody>
+          <a:bodyPr wrap="square" rtlCol="0">
+            <a:spAutoFit/>
+          </a:bodyPr>
+          <a:lstStyle/>
+          <a:p>
+            <a:r>
+              <a:rPr lang="en-US" dirty="0" smtClean="0"/>
+              <a:t>-Neel</a:t>
+            </a:r>
+            <a:endParaRPr lang="en-US" dirty="0"/>
+          </a:p>
+        </p:txBody>
+      </p:sp>
+    </p:spTree>
+    <p:extLst>
+      <p:ext uri="{BB962C8B-B14F-4D97-AF65-F5344CB8AC3E}">
+        <p14:creationId xmlns:p14="http://schemas.microsoft.com/office/powerpoint/2010/main" val="2762890798"/>
+      </p:ext>
+    </p:extLst>
+  </p:cSld>
+  <p:clrMapOvr>
+    <a:masterClrMapping/>
+  </p:clrMapOvr>
+</p:sld>
+</file>
+
+<file path=ppt/slides/slide21.xml><?xml version="1.0" encoding="utf-8"?>
+<p:sld xmlns:a="http://schemas.openxmlformats.org/drawingml/2006/main" xmlns:r="http://schemas.openxmlformats.org/officeDocument/2006/relationships" xmlns:p="http://schemas.openxmlformats.org/presentationml/2006/main">
+  <p:cSld>
+    <p:spTree>
+      <p:nvGrpSpPr>
+        <p:cNvPr id="1" name=""/>
+        <p:cNvGrpSpPr/>
+        <p:nvPr/>
+      </p:nvGrpSpPr>
+      <p:grpSpPr>
+        <a:xfrm>
+          <a:off x="0" y="0"/>
+          <a:ext cx="0" cy="0"/>
+          <a:chOff x="0" y="0"/>
+          <a:chExt cx="0" cy="0"/>
+        </a:xfrm>
+      </p:grpSpPr>
+      <p:sp>
+        <p:nvSpPr>
+          <p:cNvPr id="2" name="Title 1"/>
+          <p:cNvSpPr>
+            <a:spLocks noGrp="1"/>
+          </p:cNvSpPr>
+          <p:nvPr>
+            <p:ph type="title"/>
+          </p:nvPr>
+        </p:nvSpPr>
+        <p:spPr/>
+        <p:txBody>
+          <a:bodyPr/>
+          <a:lstStyle/>
+          <a:p>
+            <a:r>
+              <a:rPr lang="en-US" dirty="0"/>
               <a:t>Chickamauga</a:t>
             </a:r>
           </a:p>
@@ -9002,7 +9479,7 @@
 </p:sld>
 </file>
 
-<file path=ppt/slides/slide19.xml><?xml version="1.0" encoding="utf-8"?>
+<file path=ppt/slides/slide22.xml><?xml version="1.0" encoding="utf-8"?>
 <p:sld xmlns:a="http://schemas.openxmlformats.org/drawingml/2006/main" xmlns:r="http://schemas.openxmlformats.org/officeDocument/2006/relationships" xmlns:p="http://schemas.openxmlformats.org/presentationml/2006/main">
   <p:cSld>
     <p:spTree>
@@ -9396,450 +9873,6 @@
 </p:sld>
 </file>
 
-<file path=ppt/slides/slide2.xml><?xml version="1.0" encoding="utf-8"?>
-<p:sld xmlns:a="http://schemas.openxmlformats.org/drawingml/2006/main" xmlns:r="http://schemas.openxmlformats.org/officeDocument/2006/relationships" xmlns:p="http://schemas.openxmlformats.org/presentationml/2006/main">
-  <p:cSld>
-    <p:spTree>
-      <p:nvGrpSpPr>
-        <p:cNvPr id="1" name=""/>
-        <p:cNvGrpSpPr/>
-        <p:nvPr/>
-      </p:nvGrpSpPr>
-      <p:grpSpPr>
-        <a:xfrm>
-          <a:off x="0" y="0"/>
-          <a:ext cx="0" cy="0"/>
-          <a:chOff x="0" y="0"/>
-          <a:chExt cx="0" cy="0"/>
-        </a:xfrm>
-      </p:grpSpPr>
-      <p:sp>
-        <p:nvSpPr>
-          <p:cNvPr id="2" name="Title 1"/>
-          <p:cNvSpPr>
-            <a:spLocks noGrp="1"/>
-          </p:cNvSpPr>
-          <p:nvPr>
-            <p:ph type="title"/>
-          </p:nvPr>
-        </p:nvSpPr>
-        <p:spPr/>
-        <p:txBody>
-          <a:bodyPr/>
-          <a:lstStyle/>
-          <a:p>
-            <a:r>
-              <a:rPr lang="en-US" dirty="0" smtClean="0"/>
-              <a:t>Battles in 1861</a:t>
-            </a:r>
-            <a:endParaRPr lang="en-US" dirty="0"/>
-          </a:p>
-        </p:txBody>
-      </p:sp>
-      <p:sp>
-        <p:nvSpPr>
-          <p:cNvPr id="3" name="Content Placeholder 2"/>
-          <p:cNvSpPr>
-            <a:spLocks noGrp="1"/>
-          </p:cNvSpPr>
-          <p:nvPr>
-            <p:ph idx="1"/>
-          </p:nvPr>
-        </p:nvSpPr>
-        <p:spPr/>
-        <p:txBody>
-          <a:bodyPr/>
-          <a:lstStyle/>
-          <a:p>
-            <a:pPr>
-              <a:lnSpc>
-                <a:spcPct val="150000"/>
-              </a:lnSpc>
-            </a:pPr>
-            <a:r>
-              <a:rPr lang="en-US" dirty="0" smtClean="0"/>
-              <a:t>Fort Sumter* </a:t>
-            </a:r>
-          </a:p>
-          <a:p>
-            <a:pPr>
-              <a:lnSpc>
-                <a:spcPct val="150000"/>
-              </a:lnSpc>
-            </a:pPr>
-            <a:r>
-              <a:rPr lang="en-US" dirty="0" smtClean="0"/>
-              <a:t>Bull run/</a:t>
-            </a:r>
-            <a:r>
-              <a:rPr lang="en-US" dirty="0"/>
-              <a:t>F</a:t>
-            </a:r>
-            <a:r>
-              <a:rPr lang="en-US" dirty="0" smtClean="0"/>
-              <a:t>irst Manassas*</a:t>
-            </a:r>
-          </a:p>
-          <a:p>
-            <a:pPr>
-              <a:lnSpc>
-                <a:spcPct val="150000"/>
-              </a:lnSpc>
-            </a:pPr>
-            <a:r>
-              <a:rPr lang="en-US" dirty="0" smtClean="0"/>
-              <a:t>Fort Washington*</a:t>
-            </a:r>
-          </a:p>
-          <a:p>
-            <a:pPr>
-              <a:lnSpc>
-                <a:spcPct val="150000"/>
-              </a:lnSpc>
-            </a:pPr>
-            <a:r>
-              <a:rPr lang="en-US" dirty="0" smtClean="0"/>
-              <a:t>Wilson Creek</a:t>
-            </a:r>
-          </a:p>
-          <a:p>
-            <a:pPr>
-              <a:lnSpc>
-                <a:spcPct val="150000"/>
-              </a:lnSpc>
-            </a:pPr>
-            <a:r>
-              <a:rPr lang="en-US" dirty="0" smtClean="0"/>
-              <a:t>Lexington*</a:t>
-            </a:r>
-            <a:endParaRPr lang="en-US" dirty="0"/>
-          </a:p>
-        </p:txBody>
-      </p:sp>
-    </p:spTree>
-    <p:extLst>
-      <p:ext uri="{BB962C8B-B14F-4D97-AF65-F5344CB8AC3E}">
-        <p14:creationId xmlns:p14="http://schemas.microsoft.com/office/powerpoint/2010/main" val="3915159450"/>
-      </p:ext>
-    </p:extLst>
-  </p:cSld>
-  <p:clrMapOvr>
-    <a:masterClrMapping/>
-  </p:clrMapOvr>
-  <p:timing>
-    <p:tnLst>
-      <p:par>
-        <p:cTn xmlns:p14="http://schemas.microsoft.com/office/powerpoint/2010/main" id="1" dur="indefinite" restart="never" nodeType="tmRoot"/>
-      </p:par>
-    </p:tnLst>
-  </p:timing>
-</p:sld>
-</file>
-
-<file path=ppt/slides/slide20.xml><?xml version="1.0" encoding="utf-8"?>
-<p:sld xmlns:a="http://schemas.openxmlformats.org/drawingml/2006/main" xmlns:r="http://schemas.openxmlformats.org/officeDocument/2006/relationships" xmlns:p="http://schemas.openxmlformats.org/presentationml/2006/main">
-  <p:cSld>
-    <p:spTree>
-      <p:nvGrpSpPr>
-        <p:cNvPr id="1" name=""/>
-        <p:cNvGrpSpPr/>
-        <p:nvPr/>
-      </p:nvGrpSpPr>
-      <p:grpSpPr>
-        <a:xfrm>
-          <a:off x="0" y="0"/>
-          <a:ext cx="0" cy="0"/>
-          <a:chOff x="0" y="0"/>
-          <a:chExt cx="0" cy="0"/>
-        </a:xfrm>
-      </p:grpSpPr>
-      <p:sp>
-        <p:nvSpPr>
-          <p:cNvPr id="2" name="Title 1"/>
-          <p:cNvSpPr>
-            <a:spLocks noGrp="1"/>
-          </p:cNvSpPr>
-          <p:nvPr>
-            <p:ph type="title"/>
-          </p:nvPr>
-        </p:nvSpPr>
-        <p:spPr/>
-        <p:txBody>
-          <a:bodyPr/>
-          <a:lstStyle/>
-          <a:p>
-            <a:r>
-              <a:rPr lang="en-US" dirty="0"/>
-              <a:t>Charleston: submarine attack</a:t>
-            </a:r>
-          </a:p>
-        </p:txBody>
-      </p:sp>
-      <p:sp>
-        <p:nvSpPr>
-          <p:cNvPr id="3" name="Content Placeholder 2"/>
-          <p:cNvSpPr>
-            <a:spLocks noGrp="1"/>
-          </p:cNvSpPr>
-          <p:nvPr>
-            <p:ph idx="1"/>
-          </p:nvPr>
-        </p:nvSpPr>
-        <p:spPr/>
-        <p:txBody>
-          <a:bodyPr/>
-          <a:lstStyle/>
-          <a:p>
-            <a:endParaRPr lang="en-US"/>
-          </a:p>
-        </p:txBody>
-      </p:sp>
-      <p:sp>
-        <p:nvSpPr>
-          <p:cNvPr id="4" name="TextBox 3"/>
-          <p:cNvSpPr txBox="1"/>
-          <p:nvPr/>
-        </p:nvSpPr>
-        <p:spPr>
-          <a:xfrm>
-            <a:off x="7239000" y="285750"/>
-            <a:ext cx="1640417" cy="369332"/>
-          </a:xfrm>
-          <a:prstGeom prst="rect">
-            <a:avLst/>
-          </a:prstGeom>
-          <a:noFill/>
-        </p:spPr>
-        <p:txBody>
-          <a:bodyPr wrap="square" rtlCol="0">
-            <a:spAutoFit/>
-          </a:bodyPr>
-          <a:lstStyle/>
-          <a:p>
-            <a:r>
-              <a:rPr lang="en-US" dirty="0" smtClean="0"/>
-              <a:t>-Neel</a:t>
-            </a:r>
-            <a:endParaRPr lang="en-US" dirty="0"/>
-          </a:p>
-        </p:txBody>
-      </p:sp>
-    </p:spTree>
-    <p:extLst>
-      <p:ext uri="{BB962C8B-B14F-4D97-AF65-F5344CB8AC3E}">
-        <p14:creationId xmlns:p14="http://schemas.microsoft.com/office/powerpoint/2010/main" val="129178598"/>
-      </p:ext>
-    </p:extLst>
-  </p:cSld>
-  <p:clrMapOvr>
-    <a:masterClrMapping/>
-  </p:clrMapOvr>
-</p:sld>
-</file>
-
-<file path=ppt/slides/slide21.xml><?xml version="1.0" encoding="utf-8"?>
-<p:sld xmlns:a="http://schemas.openxmlformats.org/drawingml/2006/main" xmlns:r="http://schemas.openxmlformats.org/officeDocument/2006/relationships" xmlns:p="http://schemas.openxmlformats.org/presentationml/2006/main">
-  <p:cSld>
-    <p:spTree>
-      <p:nvGrpSpPr>
-        <p:cNvPr id="1" name=""/>
-        <p:cNvGrpSpPr/>
-        <p:nvPr/>
-      </p:nvGrpSpPr>
-      <p:grpSpPr>
-        <a:xfrm>
-          <a:off x="0" y="0"/>
-          <a:ext cx="0" cy="0"/>
-          <a:chOff x="0" y="0"/>
-          <a:chExt cx="0" cy="0"/>
-        </a:xfrm>
-      </p:grpSpPr>
-      <p:sp>
-        <p:nvSpPr>
-          <p:cNvPr id="2" name="Title 1"/>
-          <p:cNvSpPr>
-            <a:spLocks noGrp="1"/>
-          </p:cNvSpPr>
-          <p:nvPr>
-            <p:ph type="title"/>
-          </p:nvPr>
-        </p:nvSpPr>
-        <p:spPr/>
-        <p:txBody>
-          <a:bodyPr/>
-          <a:lstStyle/>
-          <a:p>
-            <a:r>
-              <a:rPr lang="en-US" dirty="0"/>
-              <a:t>Fort pillow</a:t>
-            </a:r>
-          </a:p>
-        </p:txBody>
-      </p:sp>
-      <p:sp>
-        <p:nvSpPr>
-          <p:cNvPr id="3" name="Content Placeholder 2"/>
-          <p:cNvSpPr>
-            <a:spLocks noGrp="1"/>
-          </p:cNvSpPr>
-          <p:nvPr>
-            <p:ph idx="1"/>
-          </p:nvPr>
-        </p:nvSpPr>
-        <p:spPr/>
-        <p:txBody>
-          <a:bodyPr/>
-          <a:lstStyle/>
-          <a:p>
-            <a:endParaRPr lang="en-US"/>
-          </a:p>
-        </p:txBody>
-      </p:sp>
-      <p:sp>
-        <p:nvSpPr>
-          <p:cNvPr id="4" name="TextBox 3"/>
-          <p:cNvSpPr txBox="1"/>
-          <p:nvPr/>
-        </p:nvSpPr>
-        <p:spPr>
-          <a:xfrm>
-            <a:off x="7313083" y="243417"/>
-            <a:ext cx="1555750" cy="369332"/>
-          </a:xfrm>
-          <a:prstGeom prst="rect">
-            <a:avLst/>
-          </a:prstGeom>
-          <a:noFill/>
-        </p:spPr>
-        <p:txBody>
-          <a:bodyPr wrap="square" rtlCol="0">
-            <a:spAutoFit/>
-          </a:bodyPr>
-          <a:lstStyle/>
-          <a:p>
-            <a:r>
-              <a:rPr lang="en-US" dirty="0" smtClean="0"/>
-              <a:t>-Rohan</a:t>
-            </a:r>
-            <a:endParaRPr lang="en-US" dirty="0"/>
-          </a:p>
-        </p:txBody>
-      </p:sp>
-    </p:spTree>
-    <p:extLst>
-      <p:ext uri="{BB962C8B-B14F-4D97-AF65-F5344CB8AC3E}">
-        <p14:creationId xmlns:p14="http://schemas.microsoft.com/office/powerpoint/2010/main" val="1032982681"/>
-      </p:ext>
-    </p:extLst>
-  </p:cSld>
-  <p:clrMapOvr>
-    <a:masterClrMapping/>
-  </p:clrMapOvr>
-</p:sld>
-</file>
-
-<file path=ppt/slides/slide22.xml><?xml version="1.0" encoding="utf-8"?>
-<p:sld xmlns:a="http://schemas.openxmlformats.org/drawingml/2006/main" xmlns:r="http://schemas.openxmlformats.org/officeDocument/2006/relationships" xmlns:p="http://schemas.openxmlformats.org/presentationml/2006/main">
-  <p:cSld>
-    <p:spTree>
-      <p:nvGrpSpPr>
-        <p:cNvPr id="1" name=""/>
-        <p:cNvGrpSpPr/>
-        <p:nvPr/>
-      </p:nvGrpSpPr>
-      <p:grpSpPr>
-        <a:xfrm>
-          <a:off x="0" y="0"/>
-          <a:ext cx="0" cy="0"/>
-          <a:chOff x="0" y="0"/>
-          <a:chExt cx="0" cy="0"/>
-        </a:xfrm>
-      </p:grpSpPr>
-      <p:sp>
-        <p:nvSpPr>
-          <p:cNvPr id="2" name="Title 1"/>
-          <p:cNvSpPr>
-            <a:spLocks noGrp="1"/>
-          </p:cNvSpPr>
-          <p:nvPr>
-            <p:ph type="title"/>
-          </p:nvPr>
-        </p:nvSpPr>
-        <p:spPr/>
-        <p:txBody>
-          <a:bodyPr/>
-          <a:lstStyle/>
-          <a:p>
-            <a:r>
-              <a:rPr lang="en-US" sz="4800" dirty="0"/>
-              <a:t>Atlanta falls</a:t>
-            </a:r>
-            <a:endParaRPr lang="en-US" dirty="0"/>
-          </a:p>
-        </p:txBody>
-      </p:sp>
-      <p:sp>
-        <p:nvSpPr>
-          <p:cNvPr id="3" name="Content Placeholder 2"/>
-          <p:cNvSpPr>
-            <a:spLocks noGrp="1"/>
-          </p:cNvSpPr>
-          <p:nvPr>
-            <p:ph idx="1"/>
-          </p:nvPr>
-        </p:nvSpPr>
-        <p:spPr/>
-        <p:txBody>
-          <a:bodyPr/>
-          <a:lstStyle/>
-          <a:p>
-            <a:endParaRPr lang="en-US"/>
-          </a:p>
-        </p:txBody>
-      </p:sp>
-      <p:sp>
-        <p:nvSpPr>
-          <p:cNvPr id="4" name="TextBox 3"/>
-          <p:cNvSpPr txBox="1"/>
-          <p:nvPr/>
-        </p:nvSpPr>
-        <p:spPr>
-          <a:xfrm>
-            <a:off x="7778750" y="169333"/>
-            <a:ext cx="1195917" cy="369332"/>
-          </a:xfrm>
-          <a:prstGeom prst="rect">
-            <a:avLst/>
-          </a:prstGeom>
-          <a:noFill/>
-        </p:spPr>
-        <p:txBody>
-          <a:bodyPr wrap="square" rtlCol="0">
-            <a:spAutoFit/>
-          </a:bodyPr>
-          <a:lstStyle/>
-          <a:p>
-            <a:r>
-              <a:rPr lang="en-US" dirty="0" smtClean="0"/>
-              <a:t>-Vinay</a:t>
-            </a:r>
-            <a:endParaRPr lang="en-US" dirty="0"/>
-          </a:p>
-        </p:txBody>
-      </p:sp>
-    </p:spTree>
-    <p:extLst>
-      <p:ext uri="{BB962C8B-B14F-4D97-AF65-F5344CB8AC3E}">
-        <p14:creationId xmlns:p14="http://schemas.microsoft.com/office/powerpoint/2010/main" val="3140450667"/>
-      </p:ext>
-    </p:extLst>
-  </p:cSld>
-  <p:clrMapOvr>
-    <a:masterClrMapping/>
-  </p:clrMapOvr>
-</p:sld>
-</file>
-
 <file path=ppt/slides/slide23.xml><?xml version="1.0" encoding="utf-8"?>
 <p:sld xmlns:a="http://schemas.openxmlformats.org/drawingml/2006/main" xmlns:r="http://schemas.openxmlformats.org/officeDocument/2006/relationships" xmlns:p="http://schemas.openxmlformats.org/presentationml/2006/main">
   <p:cSld>
@@ -9873,10 +9906,9 @@
           <a:lstStyle/>
           <a:p>
             <a:r>
-              <a:rPr lang="en-US" sz="4800" dirty="0"/>
-              <a:t>Nashville</a:t>
-            </a:r>
-            <a:endParaRPr lang="en-US" dirty="0"/>
+              <a:rPr lang="en-US" dirty="0"/>
+              <a:t>Charleston: submarine attack</a:t>
+            </a:r>
           </a:p>
         </p:txBody>
       </p:sp>
@@ -9901,14 +9933,14 @@
       </p:sp>
       <p:sp>
         <p:nvSpPr>
-          <p:cNvPr id="5" name="TextBox 4"/>
+          <p:cNvPr id="4" name="TextBox 3"/>
           <p:cNvSpPr txBox="1"/>
           <p:nvPr/>
         </p:nvSpPr>
         <p:spPr>
           <a:xfrm>
-            <a:off x="6847417" y="201083"/>
-            <a:ext cx="1852083" cy="369332"/>
+            <a:off x="7239000" y="285750"/>
+            <a:ext cx="1640417" cy="369332"/>
           </a:xfrm>
           <a:prstGeom prst="rect">
             <a:avLst/>
@@ -9923,7 +9955,7 @@
           <a:p>
             <a:r>
               <a:rPr lang="en-US" dirty="0" smtClean="0"/>
-              <a:t>-Rohan</a:t>
+              <a:t>-Neel</a:t>
             </a:r>
             <a:endParaRPr lang="en-US" dirty="0"/>
           </a:p>
@@ -9932,7 +9964,7 @@
     </p:spTree>
     <p:extLst>
       <p:ext uri="{BB962C8B-B14F-4D97-AF65-F5344CB8AC3E}">
-        <p14:creationId xmlns:p14="http://schemas.microsoft.com/office/powerpoint/2010/main" val="446644899"/>
+        <p14:creationId xmlns:p14="http://schemas.microsoft.com/office/powerpoint/2010/main" val="129178598"/>
       </p:ext>
     </p:extLst>
   </p:cSld>
@@ -9975,10 +10007,9 @@
           <a:lstStyle/>
           <a:p>
             <a:r>
-              <a:rPr lang="en-US" dirty="0" smtClean="0"/>
-              <a:t>Battles of 1865</a:t>
-            </a:r>
-            <a:endParaRPr lang="en-US" dirty="0"/>
+              <a:rPr lang="en-US" dirty="0"/>
+              <a:t>Fort pillow</a:t>
+            </a:r>
           </a:p>
         </p:txBody>
       </p:sp>
@@ -9994,87 +10025,39 @@
         </p:nvSpPr>
         <p:spPr/>
         <p:txBody>
-          <a:bodyPr>
-            <a:normAutofit fontScale="92500" lnSpcReduction="20000"/>
+          <a:bodyPr/>
+          <a:lstStyle/>
+          <a:p>
+            <a:endParaRPr lang="en-US"/>
+          </a:p>
+        </p:txBody>
+      </p:sp>
+      <p:sp>
+        <p:nvSpPr>
+          <p:cNvPr id="4" name="TextBox 3"/>
+          <p:cNvSpPr txBox="1"/>
+          <p:nvPr/>
+        </p:nvSpPr>
+        <p:spPr>
+          <a:xfrm>
+            <a:off x="7313083" y="243417"/>
+            <a:ext cx="1555750" cy="369332"/>
+          </a:xfrm>
+          <a:prstGeom prst="rect">
+            <a:avLst/>
+          </a:prstGeom>
+          <a:noFill/>
+        </p:spPr>
+        <p:txBody>
+          <a:bodyPr wrap="square" rtlCol="0">
+            <a:spAutoFit/>
           </a:bodyPr>
           <a:lstStyle/>
           <a:p>
             <a:r>
-              <a:rPr lang="en-US" dirty="0"/>
-              <a:t>A</a:t>
-            </a:r>
-            <a:r>
-              <a:rPr lang="en-US" dirty="0" smtClean="0"/>
-              <a:t>ssault </a:t>
-            </a:r>
-            <a:r>
-              <a:rPr lang="en-US" dirty="0"/>
-              <a:t>of fort fisher</a:t>
-            </a:r>
-          </a:p>
-          <a:p>
-            <a:r>
-              <a:rPr lang="en-US" dirty="0"/>
-              <a:t>Columbia south Carolina</a:t>
-            </a:r>
-          </a:p>
-          <a:p>
-            <a:r>
-              <a:rPr lang="en-US" dirty="0" smtClean="0"/>
-              <a:t>Fall of Petersburg*</a:t>
-            </a:r>
-            <a:endParaRPr lang="en-US" dirty="0"/>
-          </a:p>
-          <a:p>
-            <a:r>
-              <a:rPr lang="en-US" dirty="0"/>
-              <a:t>Battle of five forks</a:t>
-            </a:r>
-          </a:p>
-          <a:p>
-            <a:r>
-              <a:rPr lang="en-US" dirty="0"/>
-              <a:t>Fall </a:t>
-            </a:r>
-            <a:r>
-              <a:rPr lang="en-US" dirty="0" smtClean="0"/>
-              <a:t>of Richmond*</a:t>
-            </a:r>
-            <a:endParaRPr lang="en-US" dirty="0"/>
-          </a:p>
-          <a:p>
-            <a:r>
-              <a:rPr lang="en-US" dirty="0"/>
-              <a:t>Lincoln </a:t>
-            </a:r>
-            <a:r>
-              <a:rPr lang="en-US" dirty="0" smtClean="0"/>
-              <a:t>assassinated*</a:t>
-            </a:r>
-            <a:endParaRPr lang="en-US" dirty="0"/>
-          </a:p>
-          <a:p>
-            <a:r>
-              <a:rPr lang="en-US" dirty="0"/>
-              <a:t>Jefferson </a:t>
-            </a:r>
-            <a:r>
-              <a:rPr lang="en-US" dirty="0" smtClean="0"/>
-              <a:t>Davis </a:t>
-            </a:r>
-            <a:r>
-              <a:rPr lang="en-US" dirty="0"/>
-              <a:t>captured</a:t>
-            </a:r>
-          </a:p>
-          <a:p>
-            <a:r>
-              <a:rPr lang="en-US" dirty="0" smtClean="0"/>
-              <a:t>Palmetto ranch*</a:t>
-            </a:r>
-            <a:endParaRPr lang="en-US" dirty="0"/>
-          </a:p>
-          <a:p>
+              <a:rPr lang="en-US" dirty="0" smtClean="0"/>
+              <a:t>-Rohan</a:t>
+            </a:r>
             <a:endParaRPr lang="en-US" dirty="0"/>
           </a:p>
         </p:txBody>
@@ -10082,7 +10065,7 @@
     </p:spTree>
     <p:extLst>
       <p:ext uri="{BB962C8B-B14F-4D97-AF65-F5344CB8AC3E}">
-        <p14:creationId xmlns:p14="http://schemas.microsoft.com/office/powerpoint/2010/main" val="616596551"/>
+        <p14:creationId xmlns:p14="http://schemas.microsoft.com/office/powerpoint/2010/main" val="1032982681"/>
       </p:ext>
     </p:extLst>
   </p:cSld>
@@ -10125,9 +10108,10 @@
           <a:lstStyle/>
           <a:p>
             <a:r>
-              <a:rPr lang="en-US" dirty="0"/>
-              <a:t>Fall of Petersburg</a:t>
-            </a:r>
+              <a:rPr lang="en-US" sz="4800" dirty="0"/>
+              <a:t>Atlanta falls</a:t>
+            </a:r>
+            <a:endParaRPr lang="en-US" dirty="0"/>
           </a:p>
         </p:txBody>
       </p:sp>
@@ -10158,8 +10142,8 @@
         </p:nvSpPr>
         <p:spPr>
           <a:xfrm>
-            <a:off x="6879167" y="243417"/>
-            <a:ext cx="1428750" cy="369332"/>
+            <a:off x="7778750" y="169333"/>
+            <a:ext cx="1195917" cy="369332"/>
           </a:xfrm>
           <a:prstGeom prst="rect">
             <a:avLst/>
@@ -10174,7 +10158,7 @@
           <a:p>
             <a:r>
               <a:rPr lang="en-US" dirty="0" smtClean="0"/>
-              <a:t>-Rohan</a:t>
+              <a:t>-Vinay</a:t>
             </a:r>
             <a:endParaRPr lang="en-US" dirty="0"/>
           </a:p>
@@ -10183,7 +10167,7 @@
     </p:spTree>
     <p:extLst>
       <p:ext uri="{BB962C8B-B14F-4D97-AF65-F5344CB8AC3E}">
-        <p14:creationId xmlns:p14="http://schemas.microsoft.com/office/powerpoint/2010/main" val="256758823"/>
+        <p14:creationId xmlns:p14="http://schemas.microsoft.com/office/powerpoint/2010/main" val="3140450667"/>
       </p:ext>
     </p:extLst>
   </p:cSld>
@@ -10226,9 +10210,10 @@
           <a:lstStyle/>
           <a:p>
             <a:r>
-              <a:rPr lang="en-US" dirty="0"/>
-              <a:t>Fall of Richmond</a:t>
-            </a:r>
+              <a:rPr lang="en-US" sz="4800" dirty="0"/>
+              <a:t>Nashville</a:t>
+            </a:r>
+            <a:endParaRPr lang="en-US" dirty="0"/>
           </a:p>
         </p:txBody>
       </p:sp>
@@ -10253,14 +10238,14 @@
       </p:sp>
       <p:sp>
         <p:nvSpPr>
-          <p:cNvPr id="4" name="TextBox 3"/>
+          <p:cNvPr id="5" name="TextBox 4"/>
           <p:cNvSpPr txBox="1"/>
           <p:nvPr/>
         </p:nvSpPr>
         <p:spPr>
           <a:xfrm>
-            <a:off x="6858000" y="179917"/>
-            <a:ext cx="1502833" cy="369332"/>
+            <a:off x="6847417" y="201083"/>
+            <a:ext cx="1852083" cy="369332"/>
           </a:xfrm>
           <a:prstGeom prst="rect">
             <a:avLst/>
@@ -10275,7 +10260,7 @@
           <a:p>
             <a:r>
               <a:rPr lang="en-US" dirty="0" smtClean="0"/>
-              <a:t>-Vinay</a:t>
+              <a:t>-Rohan</a:t>
             </a:r>
             <a:endParaRPr lang="en-US" dirty="0"/>
           </a:p>
@@ -10284,7 +10269,7 @@
     </p:spTree>
     <p:extLst>
       <p:ext uri="{BB962C8B-B14F-4D97-AF65-F5344CB8AC3E}">
-        <p14:creationId xmlns:p14="http://schemas.microsoft.com/office/powerpoint/2010/main" val="3953403181"/>
+        <p14:creationId xmlns:p14="http://schemas.microsoft.com/office/powerpoint/2010/main" val="446644899"/>
       </p:ext>
     </p:extLst>
   </p:cSld>
@@ -10327,62 +10312,106 @@
           <a:lstStyle/>
           <a:p>
             <a:r>
+              <a:rPr lang="en-US" dirty="0" smtClean="0"/>
+              <a:t>Battles of 1865</a:t>
+            </a:r>
+            <a:endParaRPr lang="en-US" dirty="0"/>
+          </a:p>
+        </p:txBody>
+      </p:sp>
+      <p:sp>
+        <p:nvSpPr>
+          <p:cNvPr id="3" name="Content Placeholder 2"/>
+          <p:cNvSpPr>
+            <a:spLocks noGrp="1"/>
+          </p:cNvSpPr>
+          <p:nvPr>
+            <p:ph idx="1"/>
+          </p:nvPr>
+        </p:nvSpPr>
+        <p:spPr/>
+        <p:txBody>
+          <a:bodyPr>
+            <a:normAutofit fontScale="92500" lnSpcReduction="20000"/>
+          </a:bodyPr>
+          <a:lstStyle/>
+          <a:p>
+            <a:r>
+              <a:rPr lang="en-US" dirty="0"/>
+              <a:t>A</a:t>
+            </a:r>
+            <a:r>
+              <a:rPr lang="en-US" dirty="0" smtClean="0"/>
+              <a:t>ssault </a:t>
+            </a:r>
+            <a:r>
+              <a:rPr lang="en-US" dirty="0"/>
+              <a:t>of fort fisher</a:t>
+            </a:r>
+          </a:p>
+          <a:p>
+            <a:r>
+              <a:rPr lang="en-US" dirty="0"/>
+              <a:t>Columbia south Carolina</a:t>
+            </a:r>
+          </a:p>
+          <a:p>
+            <a:r>
+              <a:rPr lang="en-US" dirty="0" smtClean="0"/>
+              <a:t>Fall of Petersburg*</a:t>
+            </a:r>
+            <a:endParaRPr lang="en-US" dirty="0"/>
+          </a:p>
+          <a:p>
+            <a:r>
+              <a:rPr lang="en-US" dirty="0"/>
+              <a:t>Battle of five forks</a:t>
+            </a:r>
+          </a:p>
+          <a:p>
+            <a:r>
+              <a:rPr lang="en-US" dirty="0"/>
+              <a:t>Fall </a:t>
+            </a:r>
+            <a:r>
+              <a:rPr lang="en-US" dirty="0" smtClean="0"/>
+              <a:t>of Richmond*</a:t>
+            </a:r>
+            <a:endParaRPr lang="en-US" dirty="0"/>
+          </a:p>
+          <a:p>
+            <a:r>
               <a:rPr lang="en-US" dirty="0"/>
               <a:t>Lincoln </a:t>
             </a:r>
             <a:r>
               <a:rPr lang="en-US" dirty="0" smtClean="0"/>
-              <a:t>Assassinated</a:t>
+              <a:t>assassinated*</a:t>
             </a:r>
             <a:endParaRPr lang="en-US" dirty="0"/>
           </a:p>
-        </p:txBody>
-      </p:sp>
-      <p:sp>
-        <p:nvSpPr>
-          <p:cNvPr id="3" name="Content Placeholder 2"/>
-          <p:cNvSpPr>
-            <a:spLocks noGrp="1"/>
-          </p:cNvSpPr>
-          <p:nvPr>
-            <p:ph idx="1"/>
-          </p:nvPr>
-        </p:nvSpPr>
-        <p:spPr/>
-        <p:txBody>
-          <a:bodyPr/>
-          <a:lstStyle/>
-          <a:p>
-            <a:endParaRPr lang="en-US"/>
-          </a:p>
-        </p:txBody>
-      </p:sp>
-      <p:sp>
-        <p:nvSpPr>
-          <p:cNvPr id="4" name="TextBox 3"/>
-          <p:cNvSpPr txBox="1"/>
-          <p:nvPr/>
-        </p:nvSpPr>
-        <p:spPr>
-          <a:xfrm>
-            <a:off x="6879167" y="179917"/>
-            <a:ext cx="1524000" cy="369332"/>
-          </a:xfrm>
-          <a:prstGeom prst="rect">
-            <a:avLst/>
-          </a:prstGeom>
-          <a:noFill/>
-        </p:spPr>
-        <p:txBody>
-          <a:bodyPr wrap="square" rtlCol="0">
-            <a:spAutoFit/>
-          </a:bodyPr>
-          <a:lstStyle/>
-          <a:p>
-            <a:r>
-              <a:rPr lang="en-US" dirty="0" smtClean="0"/>
-              <a:t>-Neel</a:t>
-            </a:r>
+          <a:p>
+            <a:r>
+              <a:rPr lang="en-US" dirty="0"/>
+              <a:t>Jefferson </a:t>
+            </a:r>
+            <a:r>
+              <a:rPr lang="en-US" dirty="0" smtClean="0"/>
+              <a:t>Davis </a:t>
+            </a:r>
+            <a:r>
+              <a:rPr lang="en-US" dirty="0"/>
+              <a:t>captured</a:t>
+            </a:r>
+          </a:p>
+          <a:p>
+            <a:r>
+              <a:rPr lang="en-US" dirty="0" smtClean="0"/>
+              <a:t>Palmetto ranch*</a:t>
+            </a:r>
+            <a:endParaRPr lang="en-US" dirty="0"/>
+          </a:p>
+          <a:p>
             <a:endParaRPr lang="en-US" dirty="0"/>
           </a:p>
         </p:txBody>
@@ -10390,7 +10419,7 @@
     </p:spTree>
     <p:extLst>
       <p:ext uri="{BB962C8B-B14F-4D97-AF65-F5344CB8AC3E}">
-        <p14:creationId xmlns:p14="http://schemas.microsoft.com/office/powerpoint/2010/main" val="2522545022"/>
+        <p14:creationId xmlns:p14="http://schemas.microsoft.com/office/powerpoint/2010/main" val="616596551"/>
       </p:ext>
     </p:extLst>
   </p:cSld>
@@ -10434,13 +10463,8 @@
           <a:p>
             <a:r>
               <a:rPr lang="en-US" dirty="0"/>
-              <a:t>Palmetto </a:t>
-            </a:r>
-            <a:r>
-              <a:rPr lang="en-US" dirty="0" smtClean="0"/>
-              <a:t>Ranch</a:t>
-            </a:r>
-            <a:endParaRPr lang="en-US" dirty="0"/>
+              <a:t>Fall of Petersburg</a:t>
+            </a:r>
           </a:p>
         </p:txBody>
       </p:sp>
@@ -10471,8 +10495,8 @@
         </p:nvSpPr>
         <p:spPr>
           <a:xfrm>
-            <a:off x="6985000" y="243417"/>
-            <a:ext cx="1333500" cy="369332"/>
+            <a:off x="6879167" y="243417"/>
+            <a:ext cx="1428750" cy="369332"/>
           </a:xfrm>
           <a:prstGeom prst="rect">
             <a:avLst/>
@@ -10487,7 +10511,7 @@
           <a:p>
             <a:r>
               <a:rPr lang="en-US" dirty="0" smtClean="0"/>
-              <a:t>-Vinay</a:t>
+              <a:t>-Rohan</a:t>
             </a:r>
             <a:endParaRPr lang="en-US" dirty="0"/>
           </a:p>
@@ -10496,7 +10520,7 @@
     </p:spTree>
     <p:extLst>
       <p:ext uri="{BB962C8B-B14F-4D97-AF65-F5344CB8AC3E}">
-        <p14:creationId xmlns:p14="http://schemas.microsoft.com/office/powerpoint/2010/main" val="844406813"/>
+        <p14:creationId xmlns:p14="http://schemas.microsoft.com/office/powerpoint/2010/main" val="256758823"/>
       </p:ext>
     </p:extLst>
   </p:cSld>
@@ -10539,10 +10563,9 @@
           <a:lstStyle/>
           <a:p>
             <a:r>
-              <a:rPr lang="en-US" dirty="0" smtClean="0"/>
-              <a:t>Modern Realization</a:t>
-            </a:r>
-            <a:endParaRPr lang="en-US" dirty="0"/>
+              <a:rPr lang="en-US" dirty="0"/>
+              <a:t>Fall of Richmond</a:t>
+            </a:r>
           </a:p>
         </p:txBody>
       </p:sp>
@@ -10573,8 +10596,8 @@
         </p:nvSpPr>
         <p:spPr>
           <a:xfrm>
-            <a:off x="7239000" y="232833"/>
-            <a:ext cx="1703917" cy="646331"/>
+            <a:off x="6858000" y="179917"/>
+            <a:ext cx="1502833" cy="369332"/>
           </a:xfrm>
           <a:prstGeom prst="rect">
             <a:avLst/>
@@ -10589,15 +10612,7 @@
           <a:p>
             <a:r>
               <a:rPr lang="en-US" dirty="0" smtClean="0"/>
-              <a:t>All 3 don</a:t>
-            </a:r>
-            <a:r>
-              <a:rPr lang="fr-FR" dirty="0" smtClean="0"/>
-              <a:t>’</a:t>
-            </a:r>
-            <a:r>
-              <a:rPr lang="en-US" dirty="0" smtClean="0"/>
-              <a:t>t talk about till later</a:t>
+              <a:t>-Vinay</a:t>
             </a:r>
             <a:endParaRPr lang="en-US" dirty="0"/>
           </a:p>
@@ -10606,7 +10621,7 @@
     </p:spTree>
     <p:extLst>
       <p:ext uri="{BB962C8B-B14F-4D97-AF65-F5344CB8AC3E}">
-        <p14:creationId xmlns:p14="http://schemas.microsoft.com/office/powerpoint/2010/main" val="1052876114"/>
+        <p14:creationId xmlns:p14="http://schemas.microsoft.com/office/powerpoint/2010/main" val="3953403181"/>
       </p:ext>
     </p:extLst>
   </p:cSld>
@@ -10680,13 +10695,13 @@
           <a:p>
             <a:r>
               <a:rPr lang="en-US" dirty="0" smtClean="0"/>
+              <a:t>500 confederates threating 80 union soldier about 6:1 odds.</a:t>
+            </a:r>
+          </a:p>
+          <a:p>
+            <a:r>
+              <a:rPr lang="en-US" dirty="0" smtClean="0"/>
               <a:t> A soldier asked Union General Robert Anderson to raise the “white flag” for the surrender of the fort, then something went wrong with the cannon thus leading to the first casualty of the civil war.</a:t>
-            </a:r>
-          </a:p>
-          <a:p>
-            <a:r>
-              <a:rPr lang="en-US" dirty="0" smtClean="0"/>
-              <a:t>500 confederates threating 80 union soldier</a:t>
             </a:r>
           </a:p>
         </p:txBody>
@@ -10774,6 +10789,328 @@
           <a:lstStyle/>
           <a:p>
             <a:r>
+              <a:rPr lang="en-US" dirty="0"/>
+              <a:t>Lincoln </a:t>
+            </a:r>
+            <a:r>
+              <a:rPr lang="en-US" dirty="0" smtClean="0"/>
+              <a:t>Assassinated</a:t>
+            </a:r>
+            <a:endParaRPr lang="en-US" dirty="0"/>
+          </a:p>
+        </p:txBody>
+      </p:sp>
+      <p:sp>
+        <p:nvSpPr>
+          <p:cNvPr id="3" name="Content Placeholder 2"/>
+          <p:cNvSpPr>
+            <a:spLocks noGrp="1"/>
+          </p:cNvSpPr>
+          <p:nvPr>
+            <p:ph idx="1"/>
+          </p:nvPr>
+        </p:nvSpPr>
+        <p:spPr/>
+        <p:txBody>
+          <a:bodyPr/>
+          <a:lstStyle/>
+          <a:p>
+            <a:endParaRPr lang="en-US"/>
+          </a:p>
+        </p:txBody>
+      </p:sp>
+      <p:sp>
+        <p:nvSpPr>
+          <p:cNvPr id="4" name="TextBox 3"/>
+          <p:cNvSpPr txBox="1"/>
+          <p:nvPr/>
+        </p:nvSpPr>
+        <p:spPr>
+          <a:xfrm>
+            <a:off x="6879167" y="179917"/>
+            <a:ext cx="1524000" cy="369332"/>
+          </a:xfrm>
+          <a:prstGeom prst="rect">
+            <a:avLst/>
+          </a:prstGeom>
+          <a:noFill/>
+        </p:spPr>
+        <p:txBody>
+          <a:bodyPr wrap="square" rtlCol="0">
+            <a:spAutoFit/>
+          </a:bodyPr>
+          <a:lstStyle/>
+          <a:p>
+            <a:r>
+              <a:rPr lang="en-US" dirty="0" smtClean="0"/>
+              <a:t>-Neel</a:t>
+            </a:r>
+            <a:endParaRPr lang="en-US" dirty="0"/>
+          </a:p>
+        </p:txBody>
+      </p:sp>
+    </p:spTree>
+    <p:extLst>
+      <p:ext uri="{BB962C8B-B14F-4D97-AF65-F5344CB8AC3E}">
+        <p14:creationId xmlns:p14="http://schemas.microsoft.com/office/powerpoint/2010/main" val="2522545022"/>
+      </p:ext>
+    </p:extLst>
+  </p:cSld>
+  <p:clrMapOvr>
+    <a:masterClrMapping/>
+  </p:clrMapOvr>
+</p:sld>
+</file>
+
+<file path=ppt/slides/slide31.xml><?xml version="1.0" encoding="utf-8"?>
+<p:sld xmlns:a="http://schemas.openxmlformats.org/drawingml/2006/main" xmlns:r="http://schemas.openxmlformats.org/officeDocument/2006/relationships" xmlns:p="http://schemas.openxmlformats.org/presentationml/2006/main">
+  <p:cSld>
+    <p:spTree>
+      <p:nvGrpSpPr>
+        <p:cNvPr id="1" name=""/>
+        <p:cNvGrpSpPr/>
+        <p:nvPr/>
+      </p:nvGrpSpPr>
+      <p:grpSpPr>
+        <a:xfrm>
+          <a:off x="0" y="0"/>
+          <a:ext cx="0" cy="0"/>
+          <a:chOff x="0" y="0"/>
+          <a:chExt cx="0" cy="0"/>
+        </a:xfrm>
+      </p:grpSpPr>
+      <p:sp>
+        <p:nvSpPr>
+          <p:cNvPr id="2" name="Title 1"/>
+          <p:cNvSpPr>
+            <a:spLocks noGrp="1"/>
+          </p:cNvSpPr>
+          <p:nvPr>
+            <p:ph type="title"/>
+          </p:nvPr>
+        </p:nvSpPr>
+        <p:spPr/>
+        <p:txBody>
+          <a:bodyPr/>
+          <a:lstStyle/>
+          <a:p>
+            <a:r>
+              <a:rPr lang="en-US" dirty="0"/>
+              <a:t>Palmetto </a:t>
+            </a:r>
+            <a:r>
+              <a:rPr lang="en-US" dirty="0" smtClean="0"/>
+              <a:t>Ranch</a:t>
+            </a:r>
+            <a:endParaRPr lang="en-US" dirty="0"/>
+          </a:p>
+        </p:txBody>
+      </p:sp>
+      <p:sp>
+        <p:nvSpPr>
+          <p:cNvPr id="3" name="Content Placeholder 2"/>
+          <p:cNvSpPr>
+            <a:spLocks noGrp="1"/>
+          </p:cNvSpPr>
+          <p:nvPr>
+            <p:ph idx="1"/>
+          </p:nvPr>
+        </p:nvSpPr>
+        <p:spPr/>
+        <p:txBody>
+          <a:bodyPr/>
+          <a:lstStyle/>
+          <a:p>
+            <a:endParaRPr lang="en-US"/>
+          </a:p>
+        </p:txBody>
+      </p:sp>
+      <p:sp>
+        <p:nvSpPr>
+          <p:cNvPr id="4" name="TextBox 3"/>
+          <p:cNvSpPr txBox="1"/>
+          <p:nvPr/>
+        </p:nvSpPr>
+        <p:spPr>
+          <a:xfrm>
+            <a:off x="6985000" y="243417"/>
+            <a:ext cx="1333500" cy="369332"/>
+          </a:xfrm>
+          <a:prstGeom prst="rect">
+            <a:avLst/>
+          </a:prstGeom>
+          <a:noFill/>
+        </p:spPr>
+        <p:txBody>
+          <a:bodyPr wrap="square" rtlCol="0">
+            <a:spAutoFit/>
+          </a:bodyPr>
+          <a:lstStyle/>
+          <a:p>
+            <a:r>
+              <a:rPr lang="en-US" dirty="0" smtClean="0"/>
+              <a:t>-Vinay</a:t>
+            </a:r>
+            <a:endParaRPr lang="en-US" dirty="0"/>
+          </a:p>
+        </p:txBody>
+      </p:sp>
+    </p:spTree>
+    <p:extLst>
+      <p:ext uri="{BB962C8B-B14F-4D97-AF65-F5344CB8AC3E}">
+        <p14:creationId xmlns:p14="http://schemas.microsoft.com/office/powerpoint/2010/main" val="844406813"/>
+      </p:ext>
+    </p:extLst>
+  </p:cSld>
+  <p:clrMapOvr>
+    <a:masterClrMapping/>
+  </p:clrMapOvr>
+</p:sld>
+</file>
+
+<file path=ppt/slides/slide32.xml><?xml version="1.0" encoding="utf-8"?>
+<p:sld xmlns:a="http://schemas.openxmlformats.org/drawingml/2006/main" xmlns:r="http://schemas.openxmlformats.org/officeDocument/2006/relationships" xmlns:p="http://schemas.openxmlformats.org/presentationml/2006/main">
+  <p:cSld>
+    <p:spTree>
+      <p:nvGrpSpPr>
+        <p:cNvPr id="1" name=""/>
+        <p:cNvGrpSpPr/>
+        <p:nvPr/>
+      </p:nvGrpSpPr>
+      <p:grpSpPr>
+        <a:xfrm>
+          <a:off x="0" y="0"/>
+          <a:ext cx="0" cy="0"/>
+          <a:chOff x="0" y="0"/>
+          <a:chExt cx="0" cy="0"/>
+        </a:xfrm>
+      </p:grpSpPr>
+      <p:sp>
+        <p:nvSpPr>
+          <p:cNvPr id="2" name="Title 1"/>
+          <p:cNvSpPr>
+            <a:spLocks noGrp="1"/>
+          </p:cNvSpPr>
+          <p:nvPr>
+            <p:ph type="title"/>
+          </p:nvPr>
+        </p:nvSpPr>
+        <p:spPr/>
+        <p:txBody>
+          <a:bodyPr/>
+          <a:lstStyle/>
+          <a:p>
+            <a:r>
+              <a:rPr lang="en-US" dirty="0" smtClean="0"/>
+              <a:t>Modern Realization</a:t>
+            </a:r>
+            <a:endParaRPr lang="en-US" dirty="0"/>
+          </a:p>
+        </p:txBody>
+      </p:sp>
+      <p:sp>
+        <p:nvSpPr>
+          <p:cNvPr id="3" name="Content Placeholder 2"/>
+          <p:cNvSpPr>
+            <a:spLocks noGrp="1"/>
+          </p:cNvSpPr>
+          <p:nvPr>
+            <p:ph idx="1"/>
+          </p:nvPr>
+        </p:nvSpPr>
+        <p:spPr/>
+        <p:txBody>
+          <a:bodyPr/>
+          <a:lstStyle/>
+          <a:p>
+            <a:endParaRPr lang="en-US"/>
+          </a:p>
+        </p:txBody>
+      </p:sp>
+      <p:sp>
+        <p:nvSpPr>
+          <p:cNvPr id="4" name="TextBox 3"/>
+          <p:cNvSpPr txBox="1"/>
+          <p:nvPr/>
+        </p:nvSpPr>
+        <p:spPr>
+          <a:xfrm>
+            <a:off x="7239000" y="232833"/>
+            <a:ext cx="1703917" cy="646331"/>
+          </a:xfrm>
+          <a:prstGeom prst="rect">
+            <a:avLst/>
+          </a:prstGeom>
+          <a:noFill/>
+        </p:spPr>
+        <p:txBody>
+          <a:bodyPr wrap="square" rtlCol="0">
+            <a:spAutoFit/>
+          </a:bodyPr>
+          <a:lstStyle/>
+          <a:p>
+            <a:r>
+              <a:rPr lang="en-US" dirty="0" smtClean="0"/>
+              <a:t>All 3 don</a:t>
+            </a:r>
+            <a:r>
+              <a:rPr lang="fr-FR" dirty="0" smtClean="0"/>
+              <a:t>’</a:t>
+            </a:r>
+            <a:r>
+              <a:rPr lang="en-US" dirty="0" smtClean="0"/>
+              <a:t>t talk about till later</a:t>
+            </a:r>
+            <a:endParaRPr lang="en-US" dirty="0"/>
+          </a:p>
+        </p:txBody>
+      </p:sp>
+    </p:spTree>
+    <p:extLst>
+      <p:ext uri="{BB962C8B-B14F-4D97-AF65-F5344CB8AC3E}">
+        <p14:creationId xmlns:p14="http://schemas.microsoft.com/office/powerpoint/2010/main" val="1052876114"/>
+      </p:ext>
+    </p:extLst>
+  </p:cSld>
+  <p:clrMapOvr>
+    <a:masterClrMapping/>
+  </p:clrMapOvr>
+</p:sld>
+</file>
+
+<file path=ppt/slides/slide33.xml><?xml version="1.0" encoding="utf-8"?>
+<p:sld xmlns:a="http://schemas.openxmlformats.org/drawingml/2006/main" xmlns:r="http://schemas.openxmlformats.org/officeDocument/2006/relationships" xmlns:p="http://schemas.openxmlformats.org/presentationml/2006/main">
+  <p:cSld>
+    <p:spTree>
+      <p:nvGrpSpPr>
+        <p:cNvPr id="1" name=""/>
+        <p:cNvGrpSpPr/>
+        <p:nvPr/>
+      </p:nvGrpSpPr>
+      <p:grpSpPr>
+        <a:xfrm>
+          <a:off x="0" y="0"/>
+          <a:ext cx="0" cy="0"/>
+          <a:chOff x="0" y="0"/>
+          <a:chExt cx="0" cy="0"/>
+        </a:xfrm>
+      </p:grpSpPr>
+      <p:sp>
+        <p:nvSpPr>
+          <p:cNvPr id="2" name="Title 1"/>
+          <p:cNvSpPr>
+            <a:spLocks noGrp="1"/>
+          </p:cNvSpPr>
+          <p:nvPr>
+            <p:ph type="title"/>
+          </p:nvPr>
+        </p:nvSpPr>
+        <p:spPr/>
+        <p:txBody>
+          <a:bodyPr/>
+          <a:lstStyle/>
+          <a:p>
+            <a:r>
               <a:rPr lang="en-US" dirty="0" smtClean="0"/>
               <a:t>Citations</a:t>
             </a:r>
@@ -10793,7 +11130,9 @@
         </p:nvSpPr>
         <p:spPr/>
         <p:txBody>
-          <a:bodyPr/>
+          <a:bodyPr>
+            <a:normAutofit fontScale="92500" lnSpcReduction="20000"/>
+          </a:bodyPr>
           <a:lstStyle/>
           <a:p>
             <a:r>
@@ -10805,6 +11144,93 @@
             <a:endParaRPr lang="en-US" dirty="0" smtClean="0"/>
           </a:p>
           <a:p>
+            <a:r>
+              <a:rPr lang="en-US" dirty="0" smtClean="0">
+                <a:hlinkClick r:id="rId3"/>
+              </a:rPr>
+              <a:t>www.americancivilwar.com</a:t>
+            </a:r>
+            <a:endParaRPr lang="en-US" dirty="0" smtClean="0"/>
+          </a:p>
+          <a:p>
+            <a:r>
+              <a:rPr lang="en-US" dirty="0" smtClean="0">
+                <a:hlinkClick r:id="rId4"/>
+              </a:rPr>
+              <a:t>www.nps.gov/abpp/battles/mo004.htm</a:t>
+            </a:r>
+            <a:endParaRPr lang="en-US" dirty="0" smtClean="0"/>
+          </a:p>
+          <a:p>
+            <a:r>
+              <a:rPr lang="en-US" dirty="0" smtClean="0">
+                <a:hlinkClick r:id="rId5"/>
+              </a:rPr>
+              <a:t>www.civilwar.org/battlefields/wilson-s-creek.html</a:t>
+            </a:r>
+            <a:endParaRPr lang="en-US" dirty="0" smtClean="0"/>
+          </a:p>
+          <a:p>
+            <a:r>
+              <a:rPr lang="en-US" dirty="0" smtClean="0">
+                <a:hlinkClick r:id="rId6"/>
+              </a:rPr>
+              <a:t>www.civilwaronthewesternborder.org/content/battle-Lexington</a:t>
+            </a:r>
+            <a:endParaRPr lang="en-US" dirty="0" smtClean="0"/>
+          </a:p>
+          <a:p>
+            <a:r>
+              <a:rPr lang="en-US" dirty="0">
+                <a:hlinkClick r:id="rId7"/>
+              </a:rPr>
+              <a:t>www.civilwar.org/battlefields</a:t>
+            </a:r>
+            <a:r>
+              <a:rPr lang="en-US" dirty="0" smtClean="0">
+                <a:hlinkClick r:id="rId7"/>
+              </a:rPr>
+              <a:t>/fort-donelson.html</a:t>
+            </a:r>
+            <a:endParaRPr lang="en-US" dirty="0" smtClean="0"/>
+          </a:p>
+          <a:p>
+            <a:r>
+              <a:rPr lang="en-US" dirty="0">
+                <a:hlinkClick r:id="rId8"/>
+              </a:rPr>
+              <a:t>www.civilwar.org/</a:t>
+            </a:r>
+            <a:r>
+              <a:rPr lang="en-US" dirty="0" smtClean="0">
+                <a:hlinkClick r:id="rId8"/>
+              </a:rPr>
+              <a:t>battlefields/shiloh.html</a:t>
+            </a:r>
+            <a:endParaRPr lang="en-US" dirty="0" smtClean="0"/>
+          </a:p>
+          <a:p>
+            <a:endParaRPr lang="en-US" dirty="0" smtClean="0"/>
+          </a:p>
+          <a:p>
+            <a:endParaRPr lang="en-US" dirty="0" smtClean="0"/>
+          </a:p>
+          <a:p>
+            <a:endParaRPr lang="en-US" dirty="0" smtClean="0"/>
+          </a:p>
+          <a:p>
+            <a:endParaRPr lang="en-US" dirty="0" smtClean="0"/>
+          </a:p>
+          <a:p>
+            <a:endParaRPr lang="en-US" dirty="0" smtClean="0"/>
+          </a:p>
+          <a:p>
+            <a:endParaRPr lang="en-US" dirty="0" smtClean="0"/>
+          </a:p>
+          <a:p>
+            <a:endParaRPr lang="en-US" dirty="0" smtClean="0"/>
+          </a:p>
+          <a:p>
             <a:endParaRPr lang="en-US" dirty="0"/>
           </a:p>
         </p:txBody>
@@ -10813,6 +11239,102 @@
     <p:extLst>
       <p:ext uri="{BB962C8B-B14F-4D97-AF65-F5344CB8AC3E}">
         <p14:creationId xmlns:p14="http://schemas.microsoft.com/office/powerpoint/2010/main" val="2892767894"/>
+      </p:ext>
+    </p:extLst>
+  </p:cSld>
+  <p:clrMapOvr>
+    <a:masterClrMapping/>
+  </p:clrMapOvr>
+</p:sld>
+</file>
+
+<file path=ppt/slides/slide34.xml><?xml version="1.0" encoding="utf-8"?>
+<p:sld xmlns:a="http://schemas.openxmlformats.org/drawingml/2006/main" xmlns:r="http://schemas.openxmlformats.org/officeDocument/2006/relationships" xmlns:p="http://schemas.openxmlformats.org/presentationml/2006/main">
+  <p:cSld>
+    <p:spTree>
+      <p:nvGrpSpPr>
+        <p:cNvPr id="1" name=""/>
+        <p:cNvGrpSpPr/>
+        <p:nvPr/>
+      </p:nvGrpSpPr>
+      <p:grpSpPr>
+        <a:xfrm>
+          <a:off x="0" y="0"/>
+          <a:ext cx="0" cy="0"/>
+          <a:chOff x="0" y="0"/>
+          <a:chExt cx="0" cy="0"/>
+        </a:xfrm>
+      </p:grpSpPr>
+      <p:sp>
+        <p:nvSpPr>
+          <p:cNvPr id="2" name="Title 1"/>
+          <p:cNvSpPr>
+            <a:spLocks noGrp="1"/>
+          </p:cNvSpPr>
+          <p:nvPr>
+            <p:ph type="title"/>
+          </p:nvPr>
+        </p:nvSpPr>
+        <p:spPr/>
+        <p:txBody>
+          <a:bodyPr/>
+          <a:lstStyle/>
+          <a:p>
+            <a:r>
+              <a:rPr lang="en-US" dirty="0" smtClean="0"/>
+              <a:t>Citations</a:t>
+            </a:r>
+            <a:endParaRPr lang="en-US" dirty="0"/>
+          </a:p>
+        </p:txBody>
+      </p:sp>
+      <p:sp>
+        <p:nvSpPr>
+          <p:cNvPr id="3" name="Content Placeholder 2"/>
+          <p:cNvSpPr>
+            <a:spLocks noGrp="1"/>
+          </p:cNvSpPr>
+          <p:nvPr>
+            <p:ph idx="1"/>
+          </p:nvPr>
+        </p:nvSpPr>
+        <p:spPr/>
+        <p:txBody>
+          <a:bodyPr/>
+          <a:lstStyle/>
+          <a:p>
+            <a:r>
+              <a:rPr lang="en-US" dirty="0" smtClean="0">
+                <a:hlinkClick r:id="rId2"/>
+              </a:rPr>
+              <a:t>www.dailykos.com</a:t>
+            </a:r>
+            <a:endParaRPr lang="en-US" dirty="0" smtClean="0"/>
+          </a:p>
+          <a:p>
+            <a:r>
+              <a:rPr lang="en-US" dirty="0" smtClean="0">
+                <a:hlinkClick r:id="rId3"/>
+              </a:rPr>
+              <a:t>www.thomaslegion.net</a:t>
+            </a:r>
+            <a:endParaRPr lang="en-US" smtClean="0"/>
+          </a:p>
+          <a:p>
+            <a:endParaRPr lang="en-US" smtClean="0"/>
+          </a:p>
+          <a:p>
+            <a:endParaRPr lang="en-US" dirty="0" smtClean="0"/>
+          </a:p>
+          <a:p>
+            <a:endParaRPr lang="en-US" dirty="0"/>
+          </a:p>
+        </p:txBody>
+      </p:sp>
+    </p:spTree>
+    <p:extLst>
+      <p:ext uri="{BB962C8B-B14F-4D97-AF65-F5344CB8AC3E}">
+        <p14:creationId xmlns:p14="http://schemas.microsoft.com/office/powerpoint/2010/main" val="3780708552"/>
       </p:ext>
     </p:extLst>
   </p:cSld>
@@ -10872,12 +11394,65 @@
             <p:ph idx="1"/>
           </p:nvPr>
         </p:nvSpPr>
-        <p:spPr/>
-        <p:txBody>
-          <a:bodyPr/>
-          <a:lstStyle/>
-          <a:p>
-            <a:endParaRPr lang="en-US" dirty="0"/>
+        <p:spPr>
+          <a:xfrm>
+            <a:off x="194382" y="1371601"/>
+            <a:ext cx="8760098" cy="5366538"/>
+          </a:xfrm>
+        </p:spPr>
+        <p:txBody>
+          <a:bodyPr/>
+          <a:lstStyle/>
+          <a:p>
+            <a:endParaRPr lang="en-US" dirty="0" smtClean="0"/>
+          </a:p>
+          <a:p>
+            <a:r>
+              <a:rPr lang="en-US" dirty="0" smtClean="0"/>
+              <a:t>July 21</a:t>
+            </a:r>
+            <a:r>
+              <a:rPr lang="en-US" baseline="30000" dirty="0" smtClean="0"/>
+              <a:t>st</a:t>
+            </a:r>
+            <a:r>
+              <a:rPr lang="en-US" dirty="0" smtClean="0"/>
+              <a:t> 1861, Union General Irvin McDowell marched down into northern Virginia and met confederate forces under </a:t>
+            </a:r>
+            <a:r>
+              <a:rPr lang="en-US" dirty="0"/>
+              <a:t>J</a:t>
+            </a:r>
+            <a:r>
+              <a:rPr lang="en-US" dirty="0" smtClean="0"/>
+              <a:t>oseph E. Johnston and P.G.T Beauregard near a small town, Manassas.</a:t>
+            </a:r>
+          </a:p>
+          <a:p>
+            <a:r>
+              <a:rPr lang="en-US" dirty="0" smtClean="0"/>
+              <a:t> There were 32,230 Confederate soldiers against 23,450 Union soldiers. 1:1 odds</a:t>
+            </a:r>
+          </a:p>
+          <a:p>
+            <a:r>
+              <a:rPr lang="en-US" dirty="0" smtClean="0"/>
+              <a:t>Casualties: </a:t>
+            </a:r>
+          </a:p>
+          <a:p>
+            <a:pPr lvl="1"/>
+            <a:r>
+              <a:rPr lang="en-US" dirty="0" smtClean="0"/>
+              <a:t>Union – 2896 </a:t>
+            </a:r>
+          </a:p>
+          <a:p>
+            <a:pPr lvl="1"/>
+            <a:r>
+              <a:rPr lang="en-US" dirty="0" smtClean="0"/>
+              <a:t>Confederate - 1892</a:t>
+            </a:r>
           </a:p>
         </p:txBody>
       </p:sp>
@@ -10948,82 +11523,40 @@
           <a:chExt cx="0" cy="0"/>
         </a:xfrm>
       </p:grpSpPr>
-      <p:sp>
-        <p:nvSpPr>
-          <p:cNvPr id="2" name="Title 1"/>
-          <p:cNvSpPr>
-            <a:spLocks noGrp="1"/>
-          </p:cNvSpPr>
-          <p:nvPr>
-            <p:ph type="title"/>
-          </p:nvPr>
-        </p:nvSpPr>
-        <p:spPr/>
-        <p:txBody>
-          <a:bodyPr/>
-          <a:lstStyle/>
-          <a:p>
-            <a:r>
-              <a:rPr lang="en-US" dirty="0" smtClean="0"/>
-              <a:t>Fort Washington</a:t>
-            </a:r>
-            <a:endParaRPr lang="en-US" dirty="0"/>
-          </a:p>
-        </p:txBody>
-      </p:sp>
-      <p:sp>
-        <p:nvSpPr>
-          <p:cNvPr id="3" name="Content Placeholder 2"/>
-          <p:cNvSpPr>
-            <a:spLocks noGrp="1"/>
-          </p:cNvSpPr>
-          <p:nvPr>
-            <p:ph idx="1"/>
-          </p:nvPr>
-        </p:nvSpPr>
-        <p:spPr/>
-        <p:txBody>
-          <a:bodyPr/>
-          <a:lstStyle/>
-          <a:p>
-            <a:endParaRPr lang="en-US"/>
-          </a:p>
-        </p:txBody>
-      </p:sp>
-      <p:sp>
-        <p:nvSpPr>
-          <p:cNvPr id="4" name="TextBox 3"/>
-          <p:cNvSpPr txBox="1"/>
+      <p:pic>
+        <p:nvPicPr>
+          <p:cNvPr id="5" name="Picture 4" descr="bull-run-first-battle-July-21.jpg"/>
+          <p:cNvPicPr>
+            <a:picLocks noChangeAspect="1"/>
+          </p:cNvPicPr>
           <p:nvPr/>
-        </p:nvSpPr>
+        </p:nvPicPr>
+        <p:blipFill>
+          <a:blip r:embed="rId2" cstate="print">
+            <a:extLst>
+              <a:ext uri="{28A0092B-C50C-407E-A947-70E740481C1C}">
+                <a14:useLocalDpi xmlns:a14="http://schemas.microsoft.com/office/drawing/2010/main" val="0"/>
+              </a:ext>
+            </a:extLst>
+          </a:blip>
+          <a:stretch>
+            <a:fillRect/>
+          </a:stretch>
+        </p:blipFill>
         <p:spPr>
           <a:xfrm>
-            <a:off x="6945876" y="233243"/>
-            <a:ext cx="1529130" cy="369332"/>
+            <a:off x="0" y="0"/>
+            <a:ext cx="9111121" cy="6857999"/>
           </a:xfrm>
           <a:prstGeom prst="rect">
             <a:avLst/>
           </a:prstGeom>
-          <a:noFill/>
         </p:spPr>
-        <p:txBody>
-          <a:bodyPr wrap="square" rtlCol="0">
-            <a:spAutoFit/>
-          </a:bodyPr>
-          <a:lstStyle/>
-          <a:p>
-            <a:r>
-              <a:rPr lang="en-US" dirty="0" smtClean="0"/>
-              <a:t>-Neel</a:t>
-            </a:r>
-            <a:endParaRPr lang="en-US" dirty="0"/>
-          </a:p>
-        </p:txBody>
-      </p:sp>
+      </p:pic>
     </p:spTree>
     <p:extLst>
       <p:ext uri="{BB962C8B-B14F-4D97-AF65-F5344CB8AC3E}">
-        <p14:creationId xmlns:p14="http://schemas.microsoft.com/office/powerpoint/2010/main" val="4172413337"/>
+        <p14:creationId xmlns:p14="http://schemas.microsoft.com/office/powerpoint/2010/main" val="390825806"/>
       </p:ext>
     </p:extLst>
   </p:cSld>
@@ -11074,7 +11607,7 @@
           <a:p>
             <a:r>
               <a:rPr lang="en-US" dirty="0" smtClean="0"/>
-              <a:t>Lexington</a:t>
+              <a:t>Wilson Creek</a:t>
             </a:r>
             <a:endParaRPr lang="en-US" dirty="0"/>
           </a:p>
@@ -11095,7 +11628,37 @@
           <a:bodyPr/>
           <a:lstStyle/>
           <a:p>
-            <a:endParaRPr lang="en-US"/>
+            <a:r>
+              <a:rPr lang="en-US" dirty="0" smtClean="0"/>
+              <a:t>August 10</a:t>
+            </a:r>
+            <a:r>
+              <a:rPr lang="en-US" baseline="30000" dirty="0" smtClean="0"/>
+              <a:t>th</a:t>
+            </a:r>
+            <a:r>
+              <a:rPr lang="en-US" dirty="0" smtClean="0"/>
+              <a:t> 1861, Ben McCulloch approaches Nathanial Lyon’s brigade camped at Springfield.</a:t>
+            </a:r>
+          </a:p>
+          <a:p>
+            <a:r>
+              <a:rPr lang="en-US" dirty="0" smtClean="0"/>
+              <a:t>Nathanial Lyon along with Franz Sigel (Union) attacked Benjamin McCulloch and Sterling Price (Confederates) at Wilson Creek. Confederate Victory. Union retreated back to Springfield.</a:t>
+            </a:r>
+          </a:p>
+          <a:p>
+            <a:r>
+              <a:rPr lang="en-US" dirty="0" smtClean="0"/>
+              <a:t>Battling Confederate 12,120, Union 5,430</a:t>
+            </a:r>
+          </a:p>
+          <a:p>
+            <a:r>
+              <a:rPr lang="en-US" dirty="0" smtClean="0"/>
+              <a:t>Confederates Casualties: 1095, Union Casualties: 1235</a:t>
+            </a:r>
+            <a:endParaRPr lang="en-US" dirty="0"/>
           </a:p>
         </p:txBody>
       </p:sp>
@@ -11107,8 +11670,8 @@
         </p:nvSpPr>
         <p:spPr>
           <a:xfrm>
-            <a:off x="7334638" y="207327"/>
-            <a:ext cx="1503212" cy="369332"/>
+            <a:off x="6945876" y="233243"/>
+            <a:ext cx="1529130" cy="369332"/>
           </a:xfrm>
           <a:prstGeom prst="rect">
             <a:avLst/>
@@ -11123,7 +11686,7 @@
           <a:p>
             <a:r>
               <a:rPr lang="en-US" dirty="0" smtClean="0"/>
-              <a:t>-Vinay</a:t>
+              <a:t>-Neel</a:t>
             </a:r>
             <a:endParaRPr lang="en-US" dirty="0"/>
           </a:p>
@@ -11132,7 +11695,7 @@
     </p:spTree>
     <p:extLst>
       <p:ext uri="{BB962C8B-B14F-4D97-AF65-F5344CB8AC3E}">
-        <p14:creationId xmlns:p14="http://schemas.microsoft.com/office/powerpoint/2010/main" val="2900627398"/>
+        <p14:creationId xmlns:p14="http://schemas.microsoft.com/office/powerpoint/2010/main" val="4172413337"/>
       </p:ext>
     </p:extLst>
   </p:cSld>
@@ -11183,7 +11746,7 @@
           <a:p>
             <a:r>
               <a:rPr lang="en-US" dirty="0" smtClean="0"/>
-              <a:t>Battles 1862</a:t>
+              <a:t>Lexington</a:t>
             </a:r>
             <a:endParaRPr lang="en-US" dirty="0"/>
           </a:p>
@@ -11202,55 +11765,81 @@
         <p:spPr/>
         <p:txBody>
           <a:bodyPr>
-            <a:normAutofit fontScale="92500" lnSpcReduction="20000"/>
+            <a:normAutofit lnSpcReduction="10000"/>
           </a:bodyPr>
           <a:lstStyle/>
           <a:p>
             <a:r>
               <a:rPr lang="en-US" dirty="0" smtClean="0"/>
-              <a:t>Battle of Roanoke Island</a:t>
-            </a:r>
-          </a:p>
-          <a:p>
-            <a:r>
-              <a:rPr lang="en-US" dirty="0" smtClean="0"/>
-              <a:t>Fort Donaldson* </a:t>
-            </a:r>
-          </a:p>
-          <a:p>
-            <a:r>
-              <a:rPr lang="en-US" dirty="0" smtClean="0"/>
-              <a:t>Battle of Pea Ridge</a:t>
-            </a:r>
-          </a:p>
-          <a:p>
-            <a:r>
-              <a:rPr lang="en-US" dirty="0" smtClean="0"/>
-              <a:t>Shiloh*</a:t>
-            </a:r>
-          </a:p>
-          <a:p>
-            <a:r>
-              <a:rPr lang="en-US" dirty="0" smtClean="0"/>
-              <a:t>Battle of seven Pines</a:t>
-            </a:r>
-          </a:p>
-          <a:p>
-            <a:r>
-              <a:rPr lang="en-US" dirty="0" smtClean="0"/>
-              <a:t>Second Bull Run*</a:t>
-            </a:r>
-          </a:p>
-          <a:p>
-            <a:r>
-              <a:rPr lang="en-US" dirty="0" smtClean="0"/>
-              <a:t>Antietam*</a:t>
-            </a:r>
-          </a:p>
-          <a:p>
-            <a:r>
-              <a:rPr lang="en-US" dirty="0" smtClean="0"/>
-              <a:t>Fredericksburg*</a:t>
+              <a:t>September 12</a:t>
+            </a:r>
+            <a:r>
+              <a:rPr lang="en-US" baseline="30000" dirty="0" smtClean="0"/>
+              <a:t>th</a:t>
+            </a:r>
+            <a:r>
+              <a:rPr lang="en-US" dirty="0"/>
+              <a:t> </a:t>
+            </a:r>
+            <a:r>
+              <a:rPr lang="en-US" dirty="0" smtClean="0"/>
+              <a:t>– Confederate and Missouri state guard advance to Lexington after the Union defeat at Wilson Creek.</a:t>
+            </a:r>
+          </a:p>
+          <a:p>
+            <a:r>
+              <a:rPr lang="en-US" dirty="0" smtClean="0"/>
+              <a:t>Confederates: General Claiborne Fox Jackson and Sterling Price. Union General: James A. Mulligan and Robert T. Van Horn</a:t>
+            </a:r>
+          </a:p>
+          <a:p>
+            <a:r>
+              <a:rPr lang="en-US" dirty="0" smtClean="0"/>
+              <a:t>Confederates 20,000 and Union 3,500 battle soldiers led to casualties. 6-1 odds</a:t>
+            </a:r>
+          </a:p>
+          <a:p>
+            <a:pPr lvl="1"/>
+            <a:r>
+              <a:rPr lang="en-US" dirty="0" smtClean="0"/>
+              <a:t>100 confederate </a:t>
+            </a:r>
+          </a:p>
+          <a:p>
+            <a:pPr lvl="1"/>
+            <a:r>
+              <a:rPr lang="en-US" dirty="0" smtClean="0"/>
+              <a:t>1,774 union</a:t>
+            </a:r>
+            <a:endParaRPr lang="en-US" dirty="0"/>
+          </a:p>
+        </p:txBody>
+      </p:sp>
+      <p:sp>
+        <p:nvSpPr>
+          <p:cNvPr id="4" name="TextBox 3"/>
+          <p:cNvSpPr txBox="1"/>
+          <p:nvPr/>
+        </p:nvSpPr>
+        <p:spPr>
+          <a:xfrm>
+            <a:off x="7334638" y="207327"/>
+            <a:ext cx="1503212" cy="369332"/>
+          </a:xfrm>
+          <a:prstGeom prst="rect">
+            <a:avLst/>
+          </a:prstGeom>
+          <a:noFill/>
+        </p:spPr>
+        <p:txBody>
+          <a:bodyPr wrap="square" rtlCol="0">
+            <a:spAutoFit/>
+          </a:bodyPr>
+          <a:lstStyle/>
+          <a:p>
+            <a:r>
+              <a:rPr lang="en-US" dirty="0" smtClean="0"/>
+              <a:t>-Vinay</a:t>
             </a:r>
             <a:endParaRPr lang="en-US" dirty="0"/>
           </a:p>
@@ -11259,7 +11848,7 @@
     </p:spTree>
     <p:extLst>
       <p:ext uri="{BB962C8B-B14F-4D97-AF65-F5344CB8AC3E}">
-        <p14:creationId xmlns:p14="http://schemas.microsoft.com/office/powerpoint/2010/main" val="2782731645"/>
+        <p14:creationId xmlns:p14="http://schemas.microsoft.com/office/powerpoint/2010/main" val="2900627398"/>
       </p:ext>
     </p:extLst>
   </p:cSld>
@@ -11309,9 +11898,10 @@
           <a:lstStyle/>
           <a:p>
             <a:r>
-              <a:rPr lang="en-US" dirty="0"/>
-              <a:t>Fort Donaldson</a:t>
-            </a:r>
+              <a:rPr lang="en-US" dirty="0" smtClean="0"/>
+              <a:t>Battles 1862</a:t>
+            </a:r>
+            <a:endParaRPr lang="en-US" dirty="0"/>
           </a:p>
         </p:txBody>
       </p:sp>
@@ -11327,38 +11917,56 @@
         </p:nvSpPr>
         <p:spPr/>
         <p:txBody>
-          <a:bodyPr/>
-          <a:lstStyle/>
-          <a:p>
-            <a:endParaRPr lang="en-US"/>
-          </a:p>
-        </p:txBody>
-      </p:sp>
-      <p:sp>
-        <p:nvSpPr>
-          <p:cNvPr id="4" name="TextBox 3"/>
-          <p:cNvSpPr txBox="1"/>
-          <p:nvPr/>
-        </p:nvSpPr>
-        <p:spPr>
-          <a:xfrm>
-            <a:off x="6764454" y="233243"/>
-            <a:ext cx="1606882" cy="369332"/>
-          </a:xfrm>
-          <a:prstGeom prst="rect">
-            <a:avLst/>
-          </a:prstGeom>
-          <a:noFill/>
-        </p:spPr>
-        <p:txBody>
-          <a:bodyPr wrap="square" rtlCol="0">
-            <a:spAutoFit/>
+          <a:bodyPr>
+            <a:normAutofit fontScale="92500" lnSpcReduction="20000"/>
           </a:bodyPr>
           <a:lstStyle/>
           <a:p>
             <a:r>
               <a:rPr lang="en-US" dirty="0" smtClean="0"/>
-              <a:t>-Neel</a:t>
+              <a:t>Battle of Roanoke Island</a:t>
+            </a:r>
+          </a:p>
+          <a:p>
+            <a:r>
+              <a:rPr lang="en-US" dirty="0" smtClean="0"/>
+              <a:t>Fort Donelson* </a:t>
+            </a:r>
+          </a:p>
+          <a:p>
+            <a:r>
+              <a:rPr lang="en-US" dirty="0" smtClean="0"/>
+              <a:t>Battle of Pea Ridge</a:t>
+            </a:r>
+          </a:p>
+          <a:p>
+            <a:r>
+              <a:rPr lang="en-US" dirty="0" smtClean="0"/>
+              <a:t>Shiloh*</a:t>
+            </a:r>
+          </a:p>
+          <a:p>
+            <a:r>
+              <a:rPr lang="en-US" dirty="0" smtClean="0"/>
+              <a:t>Battle of seven Pines</a:t>
+            </a:r>
+          </a:p>
+          <a:p>
+            <a:r>
+              <a:rPr lang="en-US" dirty="0" smtClean="0"/>
+              <a:t>Second Bull Run*</a:t>
+            </a:r>
+          </a:p>
+          <a:p>
+            <a:r>
+              <a:rPr lang="en-US" dirty="0" smtClean="0"/>
+              <a:t>Antietam*</a:t>
+            </a:r>
+          </a:p>
+          <a:p>
+            <a:r>
+              <a:rPr lang="en-US" dirty="0" smtClean="0"/>
+              <a:t>Fredericksburg*</a:t>
             </a:r>
             <a:endParaRPr lang="en-US" dirty="0"/>
           </a:p>
@@ -11367,7 +11975,7 @@
     </p:spTree>
     <p:extLst>
       <p:ext uri="{BB962C8B-B14F-4D97-AF65-F5344CB8AC3E}">
-        <p14:creationId xmlns:p14="http://schemas.microsoft.com/office/powerpoint/2010/main" val="2253988221"/>
+        <p14:creationId xmlns:p14="http://schemas.microsoft.com/office/powerpoint/2010/main" val="2782731645"/>
       </p:ext>
     </p:extLst>
   </p:cSld>
@@ -11417,8 +12025,12 @@
           <a:lstStyle/>
           <a:p>
             <a:r>
-              <a:rPr lang="en-US" dirty="0" smtClean="0"/>
-              <a:t>Shiloh</a:t>
+              <a:rPr lang="en-US" dirty="0"/>
+              <a:t>Fort </a:t>
+            </a:r>
+            <a:r>
+              <a:rPr lang="en-US" dirty="0" smtClean="0"/>
+              <a:t>Donelson</a:t>
             </a:r>
             <a:endParaRPr lang="en-US" dirty="0"/>
           </a:p>
@@ -11439,7 +12051,52 @@
           <a:bodyPr/>
           <a:lstStyle/>
           <a:p>
-            <a:endParaRPr lang="en-US"/>
+            <a:r>
+              <a:rPr lang="en-US" dirty="0" smtClean="0"/>
+              <a:t>February 11-16</a:t>
+            </a:r>
+            <a:r>
+              <a:rPr lang="en-US" baseline="30000" dirty="0" smtClean="0"/>
+              <a:t>th</a:t>
+            </a:r>
+            <a:r>
+              <a:rPr lang="en-US" dirty="0" smtClean="0"/>
+              <a:t>, 1862 Andrew Hull </a:t>
+            </a:r>
+            <a:r>
+              <a:rPr lang="en-US" dirty="0"/>
+              <a:t>F</a:t>
+            </a:r>
+            <a:r>
+              <a:rPr lang="en-US" dirty="0" smtClean="0"/>
+              <a:t>oote and Ulysses S. Grant for the Union and for the Confederates Gideon J. Pillow, John Buchman Floyd, and Simon Buckner.</a:t>
+            </a:r>
+          </a:p>
+          <a:p>
+            <a:r>
+              <a:rPr lang="en-US" dirty="0" smtClean="0"/>
+              <a:t>16,171 Confederates battling against 24,531 Union. 1-1.5 odds</a:t>
+            </a:r>
+          </a:p>
+          <a:p>
+            <a:r>
+              <a:rPr lang="en-US" dirty="0" smtClean="0"/>
+              <a:t> Casualties for </a:t>
+            </a:r>
+          </a:p>
+          <a:p>
+            <a:pPr lvl="1"/>
+            <a:r>
+              <a:rPr lang="en-US" dirty="0" smtClean="0"/>
+              <a:t>Confederates – 13,846</a:t>
+            </a:r>
+          </a:p>
+          <a:p>
+            <a:pPr lvl="1"/>
+            <a:r>
+              <a:rPr lang="en-US" dirty="0" smtClean="0"/>
+              <a:t>Union – 2,691</a:t>
+            </a:r>
           </a:p>
         </p:txBody>
       </p:sp>
@@ -11451,8 +12108,8 @@
         </p:nvSpPr>
         <p:spPr>
           <a:xfrm>
-            <a:off x="6557115" y="272117"/>
-            <a:ext cx="2021561" cy="375781"/>
+            <a:off x="6764454" y="233243"/>
+            <a:ext cx="1606882" cy="369332"/>
           </a:xfrm>
           <a:prstGeom prst="rect">
             <a:avLst/>
@@ -11467,7 +12124,7 @@
           <a:p>
             <a:r>
               <a:rPr lang="en-US" dirty="0" smtClean="0"/>
-              <a:t>-Rohan</a:t>
+              <a:t>-Neel</a:t>
             </a:r>
             <a:endParaRPr lang="en-US" dirty="0"/>
           </a:p>
@@ -11476,7 +12133,7 @@
     </p:spTree>
     <p:extLst>
       <p:ext uri="{BB962C8B-B14F-4D97-AF65-F5344CB8AC3E}">
-        <p14:creationId xmlns:p14="http://schemas.microsoft.com/office/powerpoint/2010/main" val="1213115108"/>
+        <p14:creationId xmlns:p14="http://schemas.microsoft.com/office/powerpoint/2010/main" val="2253988221"/>
       </p:ext>
     </p:extLst>
   </p:cSld>

</xml_diff>

<commit_message>
Uploaded all of Rohan's slides.
Today at Starbucks lets talk about hypothetical questions. Also on
rohan your pictures I didn’t upload because you need to find a citation
for each.
</commit_message>
<xml_diff>
--- a/Archive project.pptx
+++ b/Archive project.pptx
@@ -11,35 +11,36 @@
     <p:sldId id="264" r:id="rId5"/>
     <p:sldId id="286" r:id="rId6"/>
     <p:sldId id="265" r:id="rId7"/>
-    <p:sldId id="266" r:id="rId8"/>
-    <p:sldId id="259" r:id="rId9"/>
-    <p:sldId id="267" r:id="rId10"/>
-    <p:sldId id="287" r:id="rId11"/>
-    <p:sldId id="268" r:id="rId12"/>
-    <p:sldId id="289" r:id="rId13"/>
-    <p:sldId id="269" r:id="rId14"/>
-    <p:sldId id="270" r:id="rId15"/>
-    <p:sldId id="271" r:id="rId16"/>
-    <p:sldId id="290" r:id="rId17"/>
-    <p:sldId id="260" r:id="rId18"/>
-    <p:sldId id="272" r:id="rId19"/>
-    <p:sldId id="273" r:id="rId20"/>
-    <p:sldId id="274" r:id="rId21"/>
-    <p:sldId id="275" r:id="rId22"/>
-    <p:sldId id="276" r:id="rId23"/>
-    <p:sldId id="261" r:id="rId24"/>
-    <p:sldId id="277" r:id="rId25"/>
-    <p:sldId id="278" r:id="rId26"/>
-    <p:sldId id="279" r:id="rId27"/>
-    <p:sldId id="280" r:id="rId28"/>
-    <p:sldId id="262" r:id="rId29"/>
-    <p:sldId id="281" r:id="rId30"/>
-    <p:sldId id="282" r:id="rId31"/>
-    <p:sldId id="283" r:id="rId32"/>
-    <p:sldId id="284" r:id="rId33"/>
-    <p:sldId id="285" r:id="rId34"/>
-    <p:sldId id="257" r:id="rId35"/>
-    <p:sldId id="288" r:id="rId36"/>
+    <p:sldId id="291" r:id="rId8"/>
+    <p:sldId id="266" r:id="rId9"/>
+    <p:sldId id="259" r:id="rId10"/>
+    <p:sldId id="267" r:id="rId11"/>
+    <p:sldId id="287" r:id="rId12"/>
+    <p:sldId id="268" r:id="rId13"/>
+    <p:sldId id="289" r:id="rId14"/>
+    <p:sldId id="269" r:id="rId15"/>
+    <p:sldId id="270" r:id="rId16"/>
+    <p:sldId id="271" r:id="rId17"/>
+    <p:sldId id="290" r:id="rId18"/>
+    <p:sldId id="260" r:id="rId19"/>
+    <p:sldId id="272" r:id="rId20"/>
+    <p:sldId id="273" r:id="rId21"/>
+    <p:sldId id="274" r:id="rId22"/>
+    <p:sldId id="275" r:id="rId23"/>
+    <p:sldId id="276" r:id="rId24"/>
+    <p:sldId id="261" r:id="rId25"/>
+    <p:sldId id="277" r:id="rId26"/>
+    <p:sldId id="278" r:id="rId27"/>
+    <p:sldId id="279" r:id="rId28"/>
+    <p:sldId id="280" r:id="rId29"/>
+    <p:sldId id="262" r:id="rId30"/>
+    <p:sldId id="281" r:id="rId31"/>
+    <p:sldId id="282" r:id="rId32"/>
+    <p:sldId id="283" r:id="rId33"/>
+    <p:sldId id="284" r:id="rId34"/>
+    <p:sldId id="285" r:id="rId35"/>
+    <p:sldId id="257" r:id="rId36"/>
+    <p:sldId id="288" r:id="rId37"/>
   </p:sldIdLst>
   <p:sldSz cx="9144000" cy="6858000" type="screen4x3"/>
   <p:notesSz cx="6858000" cy="9144000"/>
@@ -374,7 +375,7 @@
           <a:p>
             <a:fld id="{2DF66AD8-BC4A-4004-9882-414398D930CA}" type="datetimeFigureOut">
               <a:rPr lang="en-US" smtClean="0"/>
-              <a:t>4/19/15</a:t>
+              <a:t>4/25/15</a:t>
             </a:fld>
             <a:endParaRPr lang="en-US"/>
           </a:p>
@@ -519,7 +520,7 @@
           <a:p>
             <a:fld id="{2DF66AD8-BC4A-4004-9882-414398D930CA}" type="datetimeFigureOut">
               <a:rPr lang="en-US" smtClean="0"/>
-              <a:t>4/19/15</a:t>
+              <a:t>4/25/15</a:t>
             </a:fld>
             <a:endParaRPr lang="en-US"/>
           </a:p>
@@ -1088,7 +1089,7 @@
           <a:p>
             <a:fld id="{2DF66AD8-BC4A-4004-9882-414398D930CA}" type="datetimeFigureOut">
               <a:rPr lang="en-US" smtClean="0"/>
-              <a:t>4/19/15</a:t>
+              <a:t>4/25/15</a:t>
             </a:fld>
             <a:endParaRPr lang="en-US"/>
           </a:p>
@@ -1540,7 +1541,7 @@
           <a:p>
             <a:fld id="{2DF66AD8-BC4A-4004-9882-414398D930CA}" type="datetimeFigureOut">
               <a:rPr lang="en-US" smtClean="0"/>
-              <a:t>4/19/15</a:t>
+              <a:t>4/25/15</a:t>
             </a:fld>
             <a:endParaRPr lang="en-US"/>
           </a:p>
@@ -1630,7 +1631,7 @@
           <a:p>
             <a:fld id="{2DF66AD8-BC4A-4004-9882-414398D930CA}" type="datetimeFigureOut">
               <a:rPr lang="en-US" smtClean="0"/>
-              <a:t>4/19/15</a:t>
+              <a:t>4/25/15</a:t>
             </a:fld>
             <a:endParaRPr lang="en-US"/>
           </a:p>
@@ -1936,7 +1937,7 @@
           <a:p>
             <a:fld id="{2DF66AD8-BC4A-4004-9882-414398D930CA}" type="datetimeFigureOut">
               <a:rPr lang="en-US" smtClean="0"/>
-              <a:t>4/19/15</a:t>
+              <a:t>4/25/15</a:t>
             </a:fld>
             <a:endParaRPr lang="en-US"/>
           </a:p>
@@ -2129,7 +2130,7 @@
           <a:p>
             <a:fld id="{2DF66AD8-BC4A-4004-9882-414398D930CA}" type="datetimeFigureOut">
               <a:rPr lang="en-US" smtClean="0"/>
-              <a:t>4/19/15</a:t>
+              <a:t>4/25/15</a:t>
             </a:fld>
             <a:endParaRPr lang="en-US"/>
           </a:p>
@@ -2871,7 +2872,7 @@
           <a:p>
             <a:fld id="{2DF66AD8-BC4A-4004-9882-414398D930CA}" type="datetimeFigureOut">
               <a:rPr lang="en-US" smtClean="0"/>
-              <a:t>4/19/15</a:t>
+              <a:t>4/25/15</a:t>
             </a:fld>
             <a:endParaRPr lang="en-US"/>
           </a:p>
@@ -3209,7 +3210,7 @@
           <a:p>
             <a:fld id="{2DF66AD8-BC4A-4004-9882-414398D930CA}" type="datetimeFigureOut">
               <a:rPr lang="en-US" smtClean="0"/>
-              <a:t>4/19/15</a:t>
+              <a:t>4/25/15</a:t>
             </a:fld>
             <a:endParaRPr lang="en-US"/>
           </a:p>
@@ -3806,7 +3807,7 @@
           <a:p>
             <a:fld id="{2DF66AD8-BC4A-4004-9882-414398D930CA}" type="datetimeFigureOut">
               <a:rPr lang="en-US" smtClean="0"/>
-              <a:t>4/19/15</a:t>
+              <a:t>4/25/15</a:t>
             </a:fld>
             <a:endParaRPr lang="en-US"/>
           </a:p>
@@ -4017,7 +4018,7 @@
           <a:p>
             <a:fld id="{2DF66AD8-BC4A-4004-9882-414398D930CA}" type="datetimeFigureOut">
               <a:rPr lang="en-US" smtClean="0"/>
-              <a:t>4/19/15</a:t>
+              <a:t>4/25/15</a:t>
             </a:fld>
             <a:endParaRPr lang="en-US"/>
           </a:p>
@@ -4214,7 +4215,7 @@
           <a:p>
             <a:fld id="{2DF66AD8-BC4A-4004-9882-414398D930CA}" type="datetimeFigureOut">
               <a:rPr lang="en-US" smtClean="0"/>
-              <a:t>4/19/15</a:t>
+              <a:t>4/25/15</a:t>
             </a:fld>
             <a:endParaRPr lang="en-US"/>
           </a:p>
@@ -4435,7 +4436,7 @@
           <a:p>
             <a:fld id="{2DF66AD8-BC4A-4004-9882-414398D930CA}" type="datetimeFigureOut">
               <a:rPr lang="en-US" smtClean="0"/>
-              <a:t>4/19/15</a:t>
+              <a:t>4/25/15</a:t>
             </a:fld>
             <a:endParaRPr lang="en-US"/>
           </a:p>
@@ -4854,7 +4855,7 @@
           <a:p>
             <a:fld id="{2DF66AD8-BC4A-4004-9882-414398D930CA}" type="datetimeFigureOut">
               <a:rPr lang="en-US" smtClean="0"/>
-              <a:t>4/19/15</a:t>
+              <a:t>4/25/15</a:t>
             </a:fld>
             <a:endParaRPr lang="en-US"/>
           </a:p>
@@ -5152,7 +5153,7 @@
           <a:p>
             <a:fld id="{2DF66AD8-BC4A-4004-9882-414398D930CA}" type="datetimeFigureOut">
               <a:rPr lang="en-US" smtClean="0"/>
-              <a:t>4/19/15</a:t>
+              <a:t>4/25/15</a:t>
             </a:fld>
             <a:endParaRPr lang="en-US"/>
           </a:p>
@@ -5553,7 +5554,7 @@
           <a:p>
             <a:fld id="{2DF66AD8-BC4A-4004-9882-414398D930CA}" type="datetimeFigureOut">
               <a:rPr lang="en-US" smtClean="0"/>
-              <a:t>4/19/15</a:t>
+              <a:t>4/25/15</a:t>
             </a:fld>
             <a:endParaRPr lang="en-US"/>
           </a:p>
@@ -5943,7 +5944,7 @@
           <a:p>
             <a:fld id="{2DF66AD8-BC4A-4004-9882-414398D930CA}" type="datetimeFigureOut">
               <a:rPr lang="en-US" smtClean="0"/>
-              <a:t>4/19/15</a:t>
+              <a:t>4/25/15</a:t>
             </a:fld>
             <a:endParaRPr lang="en-US"/>
           </a:p>
@@ -6282,7 +6283,7 @@
           <a:p>
             <a:fld id="{2DF66AD8-BC4A-4004-9882-414398D930CA}" type="datetimeFigureOut">
               <a:rPr lang="en-US" smtClean="0"/>
-              <a:t>4/19/15</a:t>
+              <a:t>4/25/15</a:t>
             </a:fld>
             <a:endParaRPr lang="en-US"/>
           </a:p>
@@ -6777,7 +6778,7 @@
           <a:p>
             <a:fld id="{2DF66AD8-BC4A-4004-9882-414398D930CA}" type="datetimeFigureOut">
               <a:rPr lang="en-US" smtClean="0"/>
-              <a:t>4/19/15</a:t>
+              <a:t>4/25/15</a:t>
             </a:fld>
             <a:endParaRPr lang="en-US"/>
           </a:p>
@@ -7099,7 +7100,7 @@
           <a:p>
             <a:fld id="{2DF66AD8-BC4A-4004-9882-414398D930CA}" type="datetimeFigureOut">
               <a:rPr lang="en-US" smtClean="0"/>
-              <a:t>4/19/15</a:t>
+              <a:t>4/25/15</a:t>
             </a:fld>
             <a:endParaRPr lang="en-US"/>
           </a:p>
@@ -7447,7 +7448,7 @@
           <a:p>
             <a:fld id="{2DF66AD8-BC4A-4004-9882-414398D930CA}" type="datetimeFigureOut">
               <a:rPr lang="en-US" smtClean="0"/>
-              <a:t>4/19/15</a:t>
+              <a:t>4/25/15</a:t>
             </a:fld>
             <a:endParaRPr lang="en-US"/>
           </a:p>
@@ -8045,6 +8046,164 @@
           <a:chExt cx="0" cy="0"/>
         </a:xfrm>
       </p:grpSpPr>
+      <p:sp>
+        <p:nvSpPr>
+          <p:cNvPr id="2" name="Title 1"/>
+          <p:cNvSpPr>
+            <a:spLocks noGrp="1"/>
+          </p:cNvSpPr>
+          <p:nvPr>
+            <p:ph type="title"/>
+          </p:nvPr>
+        </p:nvSpPr>
+        <p:spPr/>
+        <p:txBody>
+          <a:bodyPr/>
+          <a:lstStyle/>
+          <a:p>
+            <a:r>
+              <a:rPr lang="en-US" dirty="0"/>
+              <a:t>Fort </a:t>
+            </a:r>
+            <a:r>
+              <a:rPr lang="en-US" dirty="0" smtClean="0"/>
+              <a:t>Donelson</a:t>
+            </a:r>
+            <a:endParaRPr lang="en-US" dirty="0"/>
+          </a:p>
+        </p:txBody>
+      </p:sp>
+      <p:sp>
+        <p:nvSpPr>
+          <p:cNvPr id="3" name="Content Placeholder 2"/>
+          <p:cNvSpPr>
+            <a:spLocks noGrp="1"/>
+          </p:cNvSpPr>
+          <p:nvPr>
+            <p:ph idx="1"/>
+          </p:nvPr>
+        </p:nvSpPr>
+        <p:spPr/>
+        <p:txBody>
+          <a:bodyPr/>
+          <a:lstStyle/>
+          <a:p>
+            <a:r>
+              <a:rPr lang="en-US" dirty="0" smtClean="0"/>
+              <a:t>February 11-16</a:t>
+            </a:r>
+            <a:r>
+              <a:rPr lang="en-US" baseline="30000" dirty="0" smtClean="0"/>
+              <a:t>th</a:t>
+            </a:r>
+            <a:r>
+              <a:rPr lang="en-US" dirty="0" smtClean="0"/>
+              <a:t>, 1862 Andrew Hull </a:t>
+            </a:r>
+            <a:r>
+              <a:rPr lang="en-US" dirty="0"/>
+              <a:t>F</a:t>
+            </a:r>
+            <a:r>
+              <a:rPr lang="en-US" dirty="0" smtClean="0"/>
+              <a:t>oote and Ulysses S. Grant for the Union and for the Confederates Gideon J. Pillow, John Buchman Floyd, and Simon Buckner.</a:t>
+            </a:r>
+          </a:p>
+          <a:p>
+            <a:r>
+              <a:rPr lang="en-US" dirty="0" smtClean="0"/>
+              <a:t>16,171 Confederates battling against 24,531 Union. 1-1.5 odds</a:t>
+            </a:r>
+          </a:p>
+          <a:p>
+            <a:r>
+              <a:rPr lang="en-US" dirty="0" smtClean="0"/>
+              <a:t> Casualties for </a:t>
+            </a:r>
+          </a:p>
+          <a:p>
+            <a:pPr lvl="1"/>
+            <a:r>
+              <a:rPr lang="en-US" dirty="0" smtClean="0"/>
+              <a:t>Confederates – 13,846</a:t>
+            </a:r>
+          </a:p>
+          <a:p>
+            <a:pPr lvl="1"/>
+            <a:r>
+              <a:rPr lang="en-US" dirty="0" smtClean="0"/>
+              <a:t>Union – 2,691</a:t>
+            </a:r>
+          </a:p>
+        </p:txBody>
+      </p:sp>
+      <p:sp>
+        <p:nvSpPr>
+          <p:cNvPr id="4" name="TextBox 3"/>
+          <p:cNvSpPr txBox="1"/>
+          <p:nvPr/>
+        </p:nvSpPr>
+        <p:spPr>
+          <a:xfrm>
+            <a:off x="6764454" y="233243"/>
+            <a:ext cx="1606882" cy="369332"/>
+          </a:xfrm>
+          <a:prstGeom prst="rect">
+            <a:avLst/>
+          </a:prstGeom>
+          <a:noFill/>
+        </p:spPr>
+        <p:txBody>
+          <a:bodyPr wrap="square" rtlCol="0">
+            <a:spAutoFit/>
+          </a:bodyPr>
+          <a:lstStyle/>
+          <a:p>
+            <a:r>
+              <a:rPr lang="en-US" dirty="0" smtClean="0"/>
+              <a:t>-Neel</a:t>
+            </a:r>
+            <a:endParaRPr lang="en-US" dirty="0"/>
+          </a:p>
+        </p:txBody>
+      </p:sp>
+    </p:spTree>
+    <p:extLst>
+      <p:ext uri="{BB962C8B-B14F-4D97-AF65-F5344CB8AC3E}">
+        <p14:creationId xmlns:p14="http://schemas.microsoft.com/office/powerpoint/2010/main" val="2253988221"/>
+      </p:ext>
+    </p:extLst>
+  </p:cSld>
+  <p:clrMapOvr>
+    <a:masterClrMapping/>
+  </p:clrMapOvr>
+  <p:timing>
+    <p:tnLst>
+      <p:par>
+        <p:cTn xmlns:p14="http://schemas.microsoft.com/office/powerpoint/2010/main" id="1" dur="indefinite" restart="never" nodeType="tmRoot"/>
+      </p:par>
+    </p:tnLst>
+  </p:timing>
+</p:sld>
+</file>
+
+<file path=ppt/slides/slide11.xml><?xml version="1.0" encoding="utf-8"?>
+<p:sld xmlns:a="http://schemas.openxmlformats.org/drawingml/2006/main" xmlns:r="http://schemas.openxmlformats.org/officeDocument/2006/relationships" xmlns:p="http://schemas.openxmlformats.org/presentationml/2006/main">
+  <p:cSld>
+    <p:spTree>
+      <p:nvGrpSpPr>
+        <p:cNvPr id="1" name=""/>
+        <p:cNvGrpSpPr/>
+        <p:nvPr/>
+      </p:nvGrpSpPr>
+      <p:grpSpPr>
+        <a:xfrm>
+          <a:off x="0" y="0"/>
+          <a:ext cx="0" cy="0"/>
+          <a:chOff x="0" y="0"/>
+          <a:chExt cx="0" cy="0"/>
+        </a:xfrm>
+      </p:grpSpPr>
       <p:pic>
         <p:nvPicPr>
           <p:cNvPr id="4" name="Content Placeholder 3" descr="6857047327_b66b5b7fcd.jpg"/>
@@ -8095,7 +8254,7 @@
 </p:sld>
 </file>
 
-<file path=ppt/slides/slide11.xml><?xml version="1.0" encoding="utf-8"?>
+<file path=ppt/slides/slide12.xml><?xml version="1.0" encoding="utf-8"?>
 <p:sld xmlns:a="http://schemas.openxmlformats.org/drawingml/2006/main" xmlns:r="http://schemas.openxmlformats.org/officeDocument/2006/relationships" xmlns:p="http://schemas.openxmlformats.org/presentationml/2006/main">
   <p:cSld>
     <p:spTree>
@@ -8254,7 +8413,7 @@
 </p:sld>
 </file>
 
-<file path=ppt/slides/slide12.xml><?xml version="1.0" encoding="utf-8"?>
+<file path=ppt/slides/slide13.xml><?xml version="1.0" encoding="utf-8"?>
 <p:sld xmlns:a="http://schemas.openxmlformats.org/drawingml/2006/main" xmlns:r="http://schemas.openxmlformats.org/officeDocument/2006/relationships" xmlns:p="http://schemas.openxmlformats.org/presentationml/2006/main">
   <p:cSld>
     <p:spTree>
@@ -8368,114 +8527,6 @@
 </p:sld>
 </file>
 
-<file path=ppt/slides/slide13.xml><?xml version="1.0" encoding="utf-8"?>
-<p:sld xmlns:a="http://schemas.openxmlformats.org/drawingml/2006/main" xmlns:r="http://schemas.openxmlformats.org/officeDocument/2006/relationships" xmlns:p="http://schemas.openxmlformats.org/presentationml/2006/main">
-  <p:cSld>
-    <p:spTree>
-      <p:nvGrpSpPr>
-        <p:cNvPr id="1" name=""/>
-        <p:cNvGrpSpPr/>
-        <p:nvPr/>
-      </p:nvGrpSpPr>
-      <p:grpSpPr>
-        <a:xfrm>
-          <a:off x="0" y="0"/>
-          <a:ext cx="0" cy="0"/>
-          <a:chOff x="0" y="0"/>
-          <a:chExt cx="0" cy="0"/>
-        </a:xfrm>
-      </p:grpSpPr>
-      <p:sp>
-        <p:nvSpPr>
-          <p:cNvPr id="2" name="Title 1"/>
-          <p:cNvSpPr>
-            <a:spLocks noGrp="1"/>
-          </p:cNvSpPr>
-          <p:nvPr>
-            <p:ph type="title"/>
-          </p:nvPr>
-        </p:nvSpPr>
-        <p:spPr/>
-        <p:txBody>
-          <a:bodyPr/>
-          <a:lstStyle/>
-          <a:p>
-            <a:r>
-              <a:rPr lang="en-US" dirty="0"/>
-              <a:t>Second Bull Run</a:t>
-            </a:r>
-          </a:p>
-        </p:txBody>
-      </p:sp>
-      <p:sp>
-        <p:nvSpPr>
-          <p:cNvPr id="3" name="Content Placeholder 2"/>
-          <p:cNvSpPr>
-            <a:spLocks noGrp="1"/>
-          </p:cNvSpPr>
-          <p:nvPr>
-            <p:ph idx="1"/>
-          </p:nvPr>
-        </p:nvSpPr>
-        <p:spPr/>
-        <p:txBody>
-          <a:bodyPr/>
-          <a:lstStyle/>
-          <a:p>
-            <a:endParaRPr lang="en-US"/>
-          </a:p>
-        </p:txBody>
-      </p:sp>
-      <p:sp>
-        <p:nvSpPr>
-          <p:cNvPr id="4" name="TextBox 3"/>
-          <p:cNvSpPr txBox="1"/>
-          <p:nvPr/>
-        </p:nvSpPr>
-        <p:spPr>
-          <a:xfrm>
-            <a:off x="6829248" y="194369"/>
-            <a:ext cx="1671675" cy="369332"/>
-          </a:xfrm>
-          <a:prstGeom prst="rect">
-            <a:avLst/>
-          </a:prstGeom>
-          <a:noFill/>
-        </p:spPr>
-        <p:txBody>
-          <a:bodyPr wrap="square" rtlCol="0">
-            <a:spAutoFit/>
-          </a:bodyPr>
-          <a:lstStyle/>
-          <a:p>
-            <a:r>
-              <a:rPr lang="en-US" dirty="0" smtClean="0"/>
-              <a:t>-Rohan</a:t>
-            </a:r>
-            <a:endParaRPr lang="en-US" dirty="0"/>
-          </a:p>
-        </p:txBody>
-      </p:sp>
-    </p:spTree>
-    <p:extLst>
-      <p:ext uri="{BB962C8B-B14F-4D97-AF65-F5344CB8AC3E}">
-        <p14:creationId xmlns:p14="http://schemas.microsoft.com/office/powerpoint/2010/main" val="1598801575"/>
-      </p:ext>
-    </p:extLst>
-  </p:cSld>
-  <p:clrMapOvr>
-    <a:masterClrMapping/>
-  </p:clrMapOvr>
-  <p:timing>
-    <p:tnLst>
-      <p:par>
-        <p:cTn xmlns:p14="http://schemas.microsoft.com/office/powerpoint/2010/main" id="1" dur="indefinite" restart="never" nodeType="tmRoot"/>
-      </p:par>
-    </p:tnLst>
-  </p:timing>
-</p:sld>
-</file>
-
 <file path=ppt/slides/slide14.xml><?xml version="1.0" encoding="utf-8"?>
 <p:sld xmlns:a="http://schemas.openxmlformats.org/drawingml/2006/main" xmlns:r="http://schemas.openxmlformats.org/officeDocument/2006/relationships" xmlns:p="http://schemas.openxmlformats.org/presentationml/2006/main">
   <p:cSld>
@@ -8509,29 +8560,58 @@
           <a:lstStyle/>
           <a:p>
             <a:r>
-              <a:rPr lang="en-US" dirty="0" smtClean="0"/>
-              <a:t>Antietam</a:t>
-            </a:r>
+              <a:rPr lang="en-US" dirty="0"/>
+              <a:t>Second Bull Run</a:t>
+            </a:r>
+          </a:p>
+        </p:txBody>
+      </p:sp>
+      <p:sp>
+        <p:nvSpPr>
+          <p:cNvPr id="3" name="Content Placeholder 2"/>
+          <p:cNvSpPr>
+            <a:spLocks noGrp="1"/>
+          </p:cNvSpPr>
+          <p:nvPr>
+            <p:ph idx="1"/>
+          </p:nvPr>
+        </p:nvSpPr>
+        <p:spPr/>
+        <p:txBody>
+          <a:bodyPr/>
+          <a:lstStyle/>
+          <a:p>
+            <a:r>
+              <a:rPr lang="en-US" dirty="0"/>
+              <a:t>August 28th Confederate General Stonewall Jackson attacked a lone Union division to cut of Union General Pope’s supply line.</a:t>
+            </a:r>
+          </a:p>
+          <a:p>
+            <a:r>
+              <a:rPr lang="en-US" dirty="0"/>
+              <a:t>Confederate Forces: 55,000; </a:t>
+            </a:r>
+          </a:p>
+          <a:p>
+            <a:r>
+              <a:rPr lang="en-US" dirty="0"/>
+              <a:t>Union Forces: 70,000</a:t>
+            </a:r>
+          </a:p>
+          <a:p>
+            <a:r>
+              <a:rPr lang="en-US" dirty="0"/>
+              <a:t>Confederate Casualties: 1,305</a:t>
+            </a:r>
+          </a:p>
+          <a:p>
+            <a:r>
+              <a:rPr lang="en-US" dirty="0"/>
+              <a:t>Union: Casualties: 1,716</a:t>
+            </a:r>
+          </a:p>
+          <a:p>
             <a:endParaRPr lang="en-US" dirty="0"/>
-          </a:p>
-        </p:txBody>
-      </p:sp>
-      <p:sp>
-        <p:nvSpPr>
-          <p:cNvPr id="3" name="Content Placeholder 2"/>
-          <p:cNvSpPr>
-            <a:spLocks noGrp="1"/>
-          </p:cNvSpPr>
-          <p:nvPr>
-            <p:ph idx="1"/>
-          </p:nvPr>
-        </p:nvSpPr>
-        <p:spPr/>
-        <p:txBody>
-          <a:bodyPr/>
-          <a:lstStyle/>
-          <a:p>
-            <a:endParaRPr lang="en-US"/>
           </a:p>
         </p:txBody>
       </p:sp>
@@ -8543,8 +8623,8 @@
         </p:nvSpPr>
         <p:spPr>
           <a:xfrm>
-            <a:off x="6246105" y="103664"/>
-            <a:ext cx="2280736" cy="369332"/>
+            <a:off x="6829248" y="194369"/>
+            <a:ext cx="1671675" cy="369332"/>
           </a:xfrm>
           <a:prstGeom prst="rect">
             <a:avLst/>
@@ -8559,7 +8639,7 @@
           <a:p>
             <a:r>
               <a:rPr lang="en-US" dirty="0" smtClean="0"/>
-              <a:t>-Vinay</a:t>
+              <a:t>-Rohan</a:t>
             </a:r>
             <a:endParaRPr lang="en-US" dirty="0"/>
           </a:p>
@@ -8568,7 +8648,7 @@
     </p:spTree>
     <p:extLst>
       <p:ext uri="{BB962C8B-B14F-4D97-AF65-F5344CB8AC3E}">
-        <p14:creationId xmlns:p14="http://schemas.microsoft.com/office/powerpoint/2010/main" val="1885916568"/>
+        <p14:creationId xmlns:p14="http://schemas.microsoft.com/office/powerpoint/2010/main" val="1598801575"/>
       </p:ext>
     </p:extLst>
   </p:cSld>
@@ -8618,9 +8698,10 @@
           <a:lstStyle/>
           <a:p>
             <a:r>
-              <a:rPr lang="en-US" dirty="0"/>
-              <a:t>Fredericksburg</a:t>
-            </a:r>
+              <a:rPr lang="en-US" dirty="0" smtClean="0"/>
+              <a:t>Antietam</a:t>
+            </a:r>
+            <a:endParaRPr lang="en-US" dirty="0"/>
           </a:p>
         </p:txBody>
       </p:sp>
@@ -8636,98 +8717,10 @@
         </p:nvSpPr>
         <p:spPr/>
         <p:txBody>
-          <a:bodyPr>
-            <a:normAutofit lnSpcReduction="10000"/>
-          </a:bodyPr>
-          <a:lstStyle/>
-          <a:p>
-            <a:r>
-              <a:rPr lang="en-US" dirty="0"/>
-              <a:t>December 11-15 Total Forces: 172,504</a:t>
-            </a:r>
-          </a:p>
-          <a:p>
-            <a:pPr lvl="1"/>
-            <a:r>
-              <a:rPr lang="en-US" dirty="0"/>
-              <a:t>Confederates: 72,947 </a:t>
-            </a:r>
-          </a:p>
-          <a:p>
-            <a:pPr lvl="1"/>
-            <a:r>
-              <a:rPr lang="en-US" dirty="0"/>
-              <a:t>Union </a:t>
-            </a:r>
-            <a:r>
-              <a:rPr lang="en-US" dirty="0" smtClean="0"/>
-              <a:t>100,007</a:t>
-            </a:r>
-          </a:p>
-          <a:p>
-            <a:r>
-              <a:rPr lang="en-US" dirty="0" smtClean="0"/>
-              <a:t>Generals</a:t>
-            </a:r>
-          </a:p>
-          <a:p>
-            <a:pPr lvl="1"/>
-            <a:r>
-              <a:rPr lang="en-US" dirty="0" smtClean="0"/>
-              <a:t>Confederates: Robert E. Lee</a:t>
-            </a:r>
-          </a:p>
-          <a:p>
-            <a:pPr lvl="1"/>
-            <a:r>
-              <a:rPr lang="en-US" dirty="0" smtClean="0"/>
-              <a:t>Union: Ambrose E. Burnside</a:t>
-            </a:r>
-          </a:p>
-          <a:p>
-            <a:r>
-              <a:rPr lang="en-US" dirty="0" smtClean="0"/>
-              <a:t>Casualties</a:t>
-            </a:r>
-          </a:p>
-          <a:p>
-            <a:pPr lvl="1"/>
-            <a:r>
-              <a:rPr lang="en-US" dirty="0" smtClean="0"/>
-              <a:t>Confederates: 4,576</a:t>
-            </a:r>
-          </a:p>
-          <a:p>
-            <a:pPr lvl="1"/>
-            <a:r>
-              <a:rPr lang="en-US" dirty="0" smtClean="0"/>
-              <a:t>Union: 13,353</a:t>
-            </a:r>
-            <a:endParaRPr lang="en-US" dirty="0"/>
-          </a:p>
-          <a:p>
-            <a:pPr marL="0" indent="0">
-              <a:buNone/>
-            </a:pPr>
-            <a:endParaRPr lang="en-US" dirty="0"/>
-          </a:p>
-          <a:p>
-            <a:pPr marL="457200" lvl="1" indent="0">
-              <a:buNone/>
-            </a:pPr>
-            <a:endParaRPr lang="en-US" dirty="0"/>
-          </a:p>
-          <a:p>
-            <a:pPr marL="457200" lvl="1" indent="0">
-              <a:buNone/>
-            </a:pPr>
-            <a:endParaRPr lang="en-US" dirty="0"/>
-          </a:p>
-          <a:p>
-            <a:pPr marL="0" indent="0">
-              <a:buNone/>
-            </a:pPr>
-            <a:endParaRPr lang="en-US" dirty="0" smtClean="0"/>
+          <a:bodyPr/>
+          <a:lstStyle/>
+          <a:p>
+            <a:endParaRPr lang="en-US"/>
           </a:p>
         </p:txBody>
       </p:sp>
@@ -8739,8 +8732,8 @@
         </p:nvSpPr>
         <p:spPr>
           <a:xfrm>
-            <a:off x="7062505" y="207327"/>
-            <a:ext cx="1438418" cy="369332"/>
+            <a:off x="6246105" y="103664"/>
+            <a:ext cx="2280736" cy="369332"/>
           </a:xfrm>
           <a:prstGeom prst="rect">
             <a:avLst/>
@@ -8755,7 +8748,7 @@
           <a:p>
             <a:r>
               <a:rPr lang="en-US" dirty="0" smtClean="0"/>
-              <a:t>-Neel</a:t>
+              <a:t>-Vinay</a:t>
             </a:r>
             <a:endParaRPr lang="en-US" dirty="0"/>
           </a:p>
@@ -8764,7 +8757,7 @@
     </p:spTree>
     <p:extLst>
       <p:ext uri="{BB962C8B-B14F-4D97-AF65-F5344CB8AC3E}">
-        <p14:creationId xmlns:p14="http://schemas.microsoft.com/office/powerpoint/2010/main" val="1924850588"/>
+        <p14:creationId xmlns:p14="http://schemas.microsoft.com/office/powerpoint/2010/main" val="1885916568"/>
       </p:ext>
     </p:extLst>
   </p:cSld>
@@ -8813,6 +8806,202 @@
           <a:bodyPr/>
           <a:lstStyle/>
           <a:p>
+            <a:r>
+              <a:rPr lang="en-US" dirty="0"/>
+              <a:t>Fredericksburg</a:t>
+            </a:r>
+          </a:p>
+        </p:txBody>
+      </p:sp>
+      <p:sp>
+        <p:nvSpPr>
+          <p:cNvPr id="3" name="Content Placeholder 2"/>
+          <p:cNvSpPr>
+            <a:spLocks noGrp="1"/>
+          </p:cNvSpPr>
+          <p:nvPr>
+            <p:ph idx="1"/>
+          </p:nvPr>
+        </p:nvSpPr>
+        <p:spPr/>
+        <p:txBody>
+          <a:bodyPr>
+            <a:normAutofit lnSpcReduction="10000"/>
+          </a:bodyPr>
+          <a:lstStyle/>
+          <a:p>
+            <a:r>
+              <a:rPr lang="en-US" dirty="0"/>
+              <a:t>December 11-15 Total Forces: 172,504</a:t>
+            </a:r>
+          </a:p>
+          <a:p>
+            <a:pPr lvl="1"/>
+            <a:r>
+              <a:rPr lang="en-US" dirty="0"/>
+              <a:t>Confederates: 72,947 </a:t>
+            </a:r>
+          </a:p>
+          <a:p>
+            <a:pPr lvl="1"/>
+            <a:r>
+              <a:rPr lang="en-US" dirty="0"/>
+              <a:t>Union </a:t>
+            </a:r>
+            <a:r>
+              <a:rPr lang="en-US" dirty="0" smtClean="0"/>
+              <a:t>100,007</a:t>
+            </a:r>
+          </a:p>
+          <a:p>
+            <a:r>
+              <a:rPr lang="en-US" dirty="0" smtClean="0"/>
+              <a:t>Generals</a:t>
+            </a:r>
+          </a:p>
+          <a:p>
+            <a:pPr lvl="1"/>
+            <a:r>
+              <a:rPr lang="en-US" dirty="0" smtClean="0"/>
+              <a:t>Confederates: Robert E. Lee</a:t>
+            </a:r>
+          </a:p>
+          <a:p>
+            <a:pPr lvl="1"/>
+            <a:r>
+              <a:rPr lang="en-US" dirty="0" smtClean="0"/>
+              <a:t>Union: Ambrose E. Burnside</a:t>
+            </a:r>
+          </a:p>
+          <a:p>
+            <a:r>
+              <a:rPr lang="en-US" dirty="0" smtClean="0"/>
+              <a:t>Casualties</a:t>
+            </a:r>
+          </a:p>
+          <a:p>
+            <a:pPr lvl="1"/>
+            <a:r>
+              <a:rPr lang="en-US" dirty="0" smtClean="0"/>
+              <a:t>Confederates: 4,576</a:t>
+            </a:r>
+          </a:p>
+          <a:p>
+            <a:pPr lvl="1"/>
+            <a:r>
+              <a:rPr lang="en-US" dirty="0" smtClean="0"/>
+              <a:t>Union: 13,353</a:t>
+            </a:r>
+            <a:endParaRPr lang="en-US" dirty="0"/>
+          </a:p>
+          <a:p>
+            <a:pPr marL="0" indent="0">
+              <a:buNone/>
+            </a:pPr>
+            <a:endParaRPr lang="en-US" dirty="0"/>
+          </a:p>
+          <a:p>
+            <a:pPr marL="457200" lvl="1" indent="0">
+              <a:buNone/>
+            </a:pPr>
+            <a:endParaRPr lang="en-US" dirty="0"/>
+          </a:p>
+          <a:p>
+            <a:pPr marL="457200" lvl="1" indent="0">
+              <a:buNone/>
+            </a:pPr>
+            <a:endParaRPr lang="en-US" dirty="0"/>
+          </a:p>
+          <a:p>
+            <a:pPr marL="0" indent="0">
+              <a:buNone/>
+            </a:pPr>
+            <a:endParaRPr lang="en-US" dirty="0" smtClean="0"/>
+          </a:p>
+        </p:txBody>
+      </p:sp>
+      <p:sp>
+        <p:nvSpPr>
+          <p:cNvPr id="4" name="TextBox 3"/>
+          <p:cNvSpPr txBox="1"/>
+          <p:nvPr/>
+        </p:nvSpPr>
+        <p:spPr>
+          <a:xfrm>
+            <a:off x="7062505" y="207327"/>
+            <a:ext cx="1438418" cy="369332"/>
+          </a:xfrm>
+          <a:prstGeom prst="rect">
+            <a:avLst/>
+          </a:prstGeom>
+          <a:noFill/>
+        </p:spPr>
+        <p:txBody>
+          <a:bodyPr wrap="square" rtlCol="0">
+            <a:spAutoFit/>
+          </a:bodyPr>
+          <a:lstStyle/>
+          <a:p>
+            <a:r>
+              <a:rPr lang="en-US" dirty="0" smtClean="0"/>
+              <a:t>-Neel</a:t>
+            </a:r>
+            <a:endParaRPr lang="en-US" dirty="0"/>
+          </a:p>
+        </p:txBody>
+      </p:sp>
+    </p:spTree>
+    <p:extLst>
+      <p:ext uri="{BB962C8B-B14F-4D97-AF65-F5344CB8AC3E}">
+        <p14:creationId xmlns:p14="http://schemas.microsoft.com/office/powerpoint/2010/main" val="1924850588"/>
+      </p:ext>
+    </p:extLst>
+  </p:cSld>
+  <p:clrMapOvr>
+    <a:masterClrMapping/>
+  </p:clrMapOvr>
+  <p:timing>
+    <p:tnLst>
+      <p:par>
+        <p:cTn xmlns:p14="http://schemas.microsoft.com/office/powerpoint/2010/main" id="1" dur="indefinite" restart="never" nodeType="tmRoot"/>
+      </p:par>
+    </p:tnLst>
+  </p:timing>
+</p:sld>
+</file>
+
+<file path=ppt/slides/slide17.xml><?xml version="1.0" encoding="utf-8"?>
+<p:sld xmlns:a="http://schemas.openxmlformats.org/drawingml/2006/main" xmlns:r="http://schemas.openxmlformats.org/officeDocument/2006/relationships" xmlns:p="http://schemas.openxmlformats.org/presentationml/2006/main">
+  <p:cSld>
+    <p:spTree>
+      <p:nvGrpSpPr>
+        <p:cNvPr id="1" name=""/>
+        <p:cNvGrpSpPr/>
+        <p:nvPr/>
+      </p:nvGrpSpPr>
+      <p:grpSpPr>
+        <a:xfrm>
+          <a:off x="0" y="0"/>
+          <a:ext cx="0" cy="0"/>
+          <a:chOff x="0" y="0"/>
+          <a:chExt cx="0" cy="0"/>
+        </a:xfrm>
+      </p:grpSpPr>
+      <p:sp>
+        <p:nvSpPr>
+          <p:cNvPr id="2" name="Title 1"/>
+          <p:cNvSpPr>
+            <a:spLocks noGrp="1"/>
+          </p:cNvSpPr>
+          <p:nvPr>
+            <p:ph type="title"/>
+          </p:nvPr>
+        </p:nvSpPr>
+        <p:spPr/>
+        <p:txBody>
+          <a:bodyPr/>
+          <a:lstStyle/>
+          <a:p>
             <a:endParaRPr lang="en-US"/>
           </a:p>
         </p:txBody>
@@ -8854,146 +9043,6 @@
 </p:sld>
 </file>
 
-<file path=ppt/slides/slide17.xml><?xml version="1.0" encoding="utf-8"?>
-<p:sld xmlns:a="http://schemas.openxmlformats.org/drawingml/2006/main" xmlns:r="http://schemas.openxmlformats.org/officeDocument/2006/relationships" xmlns:p="http://schemas.openxmlformats.org/presentationml/2006/main">
-  <p:cSld>
-    <p:spTree>
-      <p:nvGrpSpPr>
-        <p:cNvPr id="1" name=""/>
-        <p:cNvGrpSpPr/>
-        <p:nvPr/>
-      </p:nvGrpSpPr>
-      <p:grpSpPr>
-        <a:xfrm>
-          <a:off x="0" y="0"/>
-          <a:ext cx="0" cy="0"/>
-          <a:chOff x="0" y="0"/>
-          <a:chExt cx="0" cy="0"/>
-        </a:xfrm>
-      </p:grpSpPr>
-      <p:sp>
-        <p:nvSpPr>
-          <p:cNvPr id="2" name="Title 1"/>
-          <p:cNvSpPr>
-            <a:spLocks noGrp="1"/>
-          </p:cNvSpPr>
-          <p:nvPr>
-            <p:ph type="title"/>
-          </p:nvPr>
-        </p:nvSpPr>
-        <p:spPr/>
-        <p:txBody>
-          <a:bodyPr/>
-          <a:lstStyle/>
-          <a:p>
-            <a:r>
-              <a:rPr lang="en-US" dirty="0" smtClean="0"/>
-              <a:t>Battles of 1863</a:t>
-            </a:r>
-            <a:endParaRPr lang="en-US" dirty="0"/>
-          </a:p>
-        </p:txBody>
-      </p:sp>
-      <p:sp>
-        <p:nvSpPr>
-          <p:cNvPr id="3" name="Content Placeholder 2"/>
-          <p:cNvSpPr>
-            <a:spLocks noGrp="1"/>
-          </p:cNvSpPr>
-          <p:nvPr>
-            <p:ph idx="1"/>
-          </p:nvPr>
-        </p:nvSpPr>
-        <p:spPr/>
-        <p:txBody>
-          <a:bodyPr>
-            <a:normAutofit fontScale="70000" lnSpcReduction="20000"/>
-          </a:bodyPr>
-          <a:lstStyle/>
-          <a:p>
-            <a:r>
-              <a:rPr lang="en-US" dirty="0" smtClean="0"/>
-              <a:t>Emancipation Proclamation*</a:t>
-            </a:r>
-          </a:p>
-          <a:p>
-            <a:r>
-              <a:rPr lang="en-US" dirty="0" smtClean="0"/>
-              <a:t>Chancellorsville*</a:t>
-            </a:r>
-          </a:p>
-          <a:p>
-            <a:r>
-              <a:rPr lang="en-US" dirty="0" smtClean="0"/>
-              <a:t>Second Winchester</a:t>
-            </a:r>
-          </a:p>
-          <a:p>
-            <a:r>
-              <a:rPr lang="en-US" dirty="0" smtClean="0"/>
-              <a:t>Gettysburg*</a:t>
-            </a:r>
-          </a:p>
-          <a:p>
-            <a:r>
-              <a:rPr lang="en-US" dirty="0" smtClean="0"/>
-              <a:t>Vicksburg Captured July 4</a:t>
-            </a:r>
-            <a:r>
-              <a:rPr lang="en-US" baseline="30000" dirty="0" smtClean="0"/>
-              <a:t>th*</a:t>
-            </a:r>
-            <a:endParaRPr lang="en-US" dirty="0" smtClean="0"/>
-          </a:p>
-          <a:p>
-            <a:r>
-              <a:rPr lang="en-US" dirty="0" smtClean="0"/>
-              <a:t>Draft riots</a:t>
-            </a:r>
-          </a:p>
-          <a:p>
-            <a:r>
-              <a:rPr lang="en-US" dirty="0" smtClean="0"/>
-              <a:t>Chattanooga </a:t>
-            </a:r>
-          </a:p>
-          <a:p>
-            <a:r>
-              <a:rPr lang="en-US" dirty="0" smtClean="0"/>
-              <a:t>Chickamauga* </a:t>
-            </a:r>
-          </a:p>
-          <a:p>
-            <a:r>
-              <a:rPr lang="en-US" dirty="0" smtClean="0"/>
-              <a:t>Knoxville </a:t>
-            </a:r>
-          </a:p>
-          <a:p>
-            <a:endParaRPr lang="en-US" dirty="0"/>
-          </a:p>
-        </p:txBody>
-      </p:sp>
-    </p:spTree>
-    <p:extLst>
-      <p:ext uri="{BB962C8B-B14F-4D97-AF65-F5344CB8AC3E}">
-        <p14:creationId xmlns:p14="http://schemas.microsoft.com/office/powerpoint/2010/main" val="2792614322"/>
-      </p:ext>
-    </p:extLst>
-  </p:cSld>
-  <p:clrMapOvr>
-    <a:masterClrMapping/>
-  </p:clrMapOvr>
-  <p:timing>
-    <p:tnLst>
-      <p:par>
-        <p:cTn xmlns:p14="http://schemas.microsoft.com/office/powerpoint/2010/main" id="1" dur="indefinite" restart="never" nodeType="tmRoot"/>
-      </p:par>
-    </p:tnLst>
-  </p:timing>
-</p:sld>
-</file>
-
 <file path=ppt/slides/slide18.xml><?xml version="1.0" encoding="utf-8"?>
 <p:sld xmlns:a="http://schemas.openxmlformats.org/drawingml/2006/main" xmlns:r="http://schemas.openxmlformats.org/officeDocument/2006/relationships" xmlns:p="http://schemas.openxmlformats.org/presentationml/2006/main">
   <p:cSld>
@@ -9027,9 +9076,10 @@
           <a:lstStyle/>
           <a:p>
             <a:r>
-              <a:rPr lang="en-US" dirty="0"/>
-              <a:t>Emancipation Proclamation</a:t>
-            </a:r>
+              <a:rPr lang="en-US" dirty="0" smtClean="0"/>
+              <a:t>Battles of 1863</a:t>
+            </a:r>
+            <a:endParaRPr lang="en-US" dirty="0"/>
           </a:p>
         </p:txBody>
       </p:sp>
@@ -9045,39 +9095,70 @@
         </p:nvSpPr>
         <p:spPr/>
         <p:txBody>
-          <a:bodyPr/>
-          <a:lstStyle/>
-          <a:p>
-            <a:endParaRPr lang="en-US"/>
-          </a:p>
-        </p:txBody>
-      </p:sp>
-      <p:sp>
-        <p:nvSpPr>
-          <p:cNvPr id="4" name="TextBox 3"/>
-          <p:cNvSpPr txBox="1"/>
-          <p:nvPr/>
-        </p:nvSpPr>
-        <p:spPr>
-          <a:xfrm>
-            <a:off x="6953250" y="95250"/>
-            <a:ext cx="1481667" cy="369332"/>
-          </a:xfrm>
-          <a:prstGeom prst="rect">
-            <a:avLst/>
-          </a:prstGeom>
-          <a:noFill/>
-        </p:spPr>
-        <p:txBody>
-          <a:bodyPr wrap="square" rtlCol="0">
-            <a:spAutoFit/>
+          <a:bodyPr>
+            <a:normAutofit fontScale="70000" lnSpcReduction="20000"/>
           </a:bodyPr>
           <a:lstStyle/>
           <a:p>
             <a:r>
               <a:rPr lang="en-US" dirty="0" smtClean="0"/>
-              <a:t>-Vinay</a:t>
-            </a:r>
+              <a:t>Emancipation Proclamation*</a:t>
+            </a:r>
+          </a:p>
+          <a:p>
+            <a:r>
+              <a:rPr lang="en-US" dirty="0" smtClean="0"/>
+              <a:t>Chancellorsville*</a:t>
+            </a:r>
+          </a:p>
+          <a:p>
+            <a:r>
+              <a:rPr lang="en-US" dirty="0" smtClean="0"/>
+              <a:t>Second Winchester</a:t>
+            </a:r>
+          </a:p>
+          <a:p>
+            <a:r>
+              <a:rPr lang="en-US" dirty="0" smtClean="0"/>
+              <a:t>Gettysburg*</a:t>
+            </a:r>
+          </a:p>
+          <a:p>
+            <a:r>
+              <a:rPr lang="en-US" dirty="0" smtClean="0"/>
+              <a:t>Vicksburg Captured July 4</a:t>
+            </a:r>
+            <a:r>
+              <a:rPr lang="en-US" baseline="30000" dirty="0" smtClean="0"/>
+              <a:t>th*</a:t>
+            </a:r>
+            <a:endParaRPr lang="en-US" dirty="0" smtClean="0"/>
+          </a:p>
+          <a:p>
+            <a:r>
+              <a:rPr lang="en-US" dirty="0" smtClean="0"/>
+              <a:t>Draft riots</a:t>
+            </a:r>
+          </a:p>
+          <a:p>
+            <a:r>
+              <a:rPr lang="en-US" dirty="0" smtClean="0"/>
+              <a:t>Chattanooga </a:t>
+            </a:r>
+          </a:p>
+          <a:p>
+            <a:r>
+              <a:rPr lang="en-US" dirty="0" smtClean="0"/>
+              <a:t>Chickamauga* </a:t>
+            </a:r>
+          </a:p>
+          <a:p>
+            <a:r>
+              <a:rPr lang="en-US" dirty="0" smtClean="0"/>
+              <a:t>Knoxville </a:t>
+            </a:r>
+          </a:p>
+          <a:p>
             <a:endParaRPr lang="en-US" dirty="0"/>
           </a:p>
         </p:txBody>
@@ -9085,7 +9166,7 @@
     </p:spTree>
     <p:extLst>
       <p:ext uri="{BB962C8B-B14F-4D97-AF65-F5344CB8AC3E}">
-        <p14:creationId xmlns:p14="http://schemas.microsoft.com/office/powerpoint/2010/main" val="954385436"/>
+        <p14:creationId xmlns:p14="http://schemas.microsoft.com/office/powerpoint/2010/main" val="2792614322"/>
       </p:ext>
     </p:extLst>
   </p:cSld>
@@ -9136,7 +9217,7 @@
           <a:p>
             <a:r>
               <a:rPr lang="en-US" dirty="0"/>
-              <a:t>Chancellorsville</a:t>
+              <a:t>Emancipation Proclamation</a:t>
             </a:r>
           </a:p>
         </p:txBody>
@@ -9168,8 +9249,8 @@
         </p:nvSpPr>
         <p:spPr>
           <a:xfrm>
-            <a:off x="7239000" y="275167"/>
-            <a:ext cx="1555750" cy="381000"/>
+            <a:off x="6953250" y="95250"/>
+            <a:ext cx="1481667" cy="369332"/>
           </a:xfrm>
           <a:prstGeom prst="rect">
             <a:avLst/>
@@ -9184,7 +9265,7 @@
           <a:p>
             <a:r>
               <a:rPr lang="en-US" dirty="0" smtClean="0"/>
-              <a:t>-Rohan</a:t>
+              <a:t>-Vinay</a:t>
             </a:r>
             <a:endParaRPr lang="en-US" dirty="0"/>
           </a:p>
@@ -9193,7 +9274,7 @@
     </p:spTree>
     <p:extLst>
       <p:ext uri="{BB962C8B-B14F-4D97-AF65-F5344CB8AC3E}">
-        <p14:creationId xmlns:p14="http://schemas.microsoft.com/office/powerpoint/2010/main" val="2488087028"/>
+        <p14:creationId xmlns:p14="http://schemas.microsoft.com/office/powerpoint/2010/main" val="954385436"/>
       </p:ext>
     </p:extLst>
   </p:cSld>
@@ -9384,7 +9465,7 @@
           <a:p>
             <a:r>
               <a:rPr lang="en-US" dirty="0"/>
-              <a:t>Gettysburg</a:t>
+              <a:t>Chancellorsville</a:t>
             </a:r>
           </a:p>
         </p:txBody>
@@ -9399,85 +9480,92 @@
             <p:ph idx="1"/>
           </p:nvPr>
         </p:nvSpPr>
-        <p:spPr/>
+        <p:spPr>
+          <a:xfrm>
+            <a:off x="254000" y="1371600"/>
+            <a:ext cx="8648095" cy="5292876"/>
+          </a:xfrm>
+        </p:spPr>
         <p:txBody>
           <a:bodyPr>
-            <a:normAutofit lnSpcReduction="10000"/>
+            <a:normAutofit fontScale="85000" lnSpcReduction="20000"/>
           </a:bodyPr>
           <a:lstStyle/>
           <a:p>
             <a:r>
-              <a:rPr lang="en-US" dirty="0" smtClean="0"/>
-              <a:t>July 1-3 Total forces engaged: 165,620</a:t>
-            </a:r>
-          </a:p>
-          <a:p>
-            <a:pPr lvl="1"/>
-            <a:r>
-              <a:rPr lang="en-US" dirty="0" smtClean="0"/>
-              <a:t>Confederates: 71,699</a:t>
-            </a:r>
-          </a:p>
-          <a:p>
-            <a:pPr lvl="1"/>
-            <a:r>
-              <a:rPr lang="en-US" dirty="0" smtClean="0"/>
-              <a:t>Union: 93,921</a:t>
-            </a:r>
-          </a:p>
-          <a:p>
-            <a:r>
-              <a:rPr lang="en-US" dirty="0" smtClean="0"/>
-              <a:t>Generals</a:t>
-            </a:r>
-          </a:p>
-          <a:p>
-            <a:pPr lvl="1"/>
-            <a:r>
-              <a:rPr lang="en-US" dirty="0" smtClean="0"/>
-              <a:t>Confederates: Robert E. Lee</a:t>
-            </a:r>
-          </a:p>
-          <a:p>
-            <a:pPr lvl="1"/>
-            <a:r>
-              <a:rPr lang="en-US" dirty="0" smtClean="0"/>
-              <a:t>Union: George G. Meade</a:t>
-            </a:r>
-          </a:p>
-          <a:p>
-            <a:r>
-              <a:rPr lang="en-US" dirty="0" smtClean="0"/>
-              <a:t>Casualties: 51,112</a:t>
-            </a:r>
-          </a:p>
-          <a:p>
-            <a:pPr lvl="1"/>
-            <a:r>
-              <a:rPr lang="en-US" dirty="0" smtClean="0"/>
-              <a:t>Confederates: 28,063</a:t>
-            </a:r>
-          </a:p>
-          <a:p>
-            <a:pPr lvl="1"/>
-            <a:r>
-              <a:rPr lang="en-US" dirty="0" smtClean="0"/>
-              <a:t>Union: 23,049</a:t>
-            </a:r>
+              <a:rPr lang="en-US" dirty="0"/>
+              <a:t>April 30th to May 6th</a:t>
+            </a:r>
+          </a:p>
+          <a:p>
+            <a:r>
+              <a:rPr lang="en-US" dirty="0"/>
+              <a:t>Commanding Officers</a:t>
+            </a:r>
+          </a:p>
+          <a:p>
+            <a:r>
+              <a:rPr lang="en-US" dirty="0"/>
+              <a:t>Union General Joseph Hooker</a:t>
+            </a:r>
+          </a:p>
+          <a:p>
+            <a:r>
+              <a:rPr lang="en-US" dirty="0"/>
+              <a:t>Confederate General Robert E. Lee and Stonewall Jackson</a:t>
+            </a:r>
+          </a:p>
+          <a:p>
+            <a:r>
+              <a:rPr lang="en-US" dirty="0"/>
+              <a:t>In an astonishing turn of events, friendly fire from the Confederate Forces, Stonewall Jackson is shot and dies of Pneumonia 6 days later.</a:t>
+            </a:r>
+          </a:p>
+          <a:p>
+            <a:r>
+              <a:rPr lang="en-US" dirty="0"/>
+              <a:t>Lee’s greatest bittersweet victory.</a:t>
+            </a:r>
+          </a:p>
+          <a:p>
+            <a:r>
+              <a:rPr lang="en-US" dirty="0"/>
+              <a:t>Rebels Engaged: 57,352</a:t>
+            </a:r>
+          </a:p>
+          <a:p>
+            <a:r>
+              <a:rPr lang="en-US" dirty="0"/>
+              <a:t>Yankees Engaged: 97,382</a:t>
+            </a:r>
+          </a:p>
+          <a:p>
+            <a:r>
+              <a:rPr lang="en-US" dirty="0"/>
+              <a:t>Rebel Casualties: 1,724</a:t>
+            </a:r>
+          </a:p>
+          <a:p>
+            <a:r>
+              <a:rPr lang="en-US" dirty="0"/>
+              <a:t>Yankee Casualties: 1,694</a:t>
+            </a:r>
+          </a:p>
+          <a:p>
             <a:endParaRPr lang="en-US" dirty="0"/>
           </a:p>
         </p:txBody>
       </p:sp>
       <p:sp>
         <p:nvSpPr>
-          <p:cNvPr id="5" name="TextBox 4"/>
+          <p:cNvPr id="4" name="TextBox 3"/>
           <p:cNvSpPr txBox="1"/>
           <p:nvPr/>
         </p:nvSpPr>
         <p:spPr>
           <a:xfrm>
-            <a:off x="6921500" y="243417"/>
-            <a:ext cx="1672167" cy="369332"/>
+            <a:off x="7239000" y="275167"/>
+            <a:ext cx="1555750" cy="381000"/>
           </a:xfrm>
           <a:prstGeom prst="rect">
             <a:avLst/>
@@ -9492,7 +9580,7 @@
           <a:p>
             <a:r>
               <a:rPr lang="en-US" dirty="0" smtClean="0"/>
-              <a:t>-Neel</a:t>
+              <a:t>-Rohan</a:t>
             </a:r>
             <a:endParaRPr lang="en-US" dirty="0"/>
           </a:p>
@@ -9501,7 +9589,7 @@
     </p:spTree>
     <p:extLst>
       <p:ext uri="{BB962C8B-B14F-4D97-AF65-F5344CB8AC3E}">
-        <p14:creationId xmlns:p14="http://schemas.microsoft.com/office/powerpoint/2010/main" val="2470542951"/>
+        <p14:creationId xmlns:p14="http://schemas.microsoft.com/office/powerpoint/2010/main" val="2488087028"/>
       </p:ext>
     </p:extLst>
   </p:cSld>
@@ -9552,11 +9640,85 @@
           <a:p>
             <a:r>
               <a:rPr lang="en-US" dirty="0"/>
-              <a:t>Vicksburg </a:t>
-            </a:r>
-            <a:r>
-              <a:rPr lang="en-US" dirty="0" smtClean="0"/>
-              <a:t>Captured </a:t>
+              <a:t>Gettysburg</a:t>
+            </a:r>
+          </a:p>
+        </p:txBody>
+      </p:sp>
+      <p:sp>
+        <p:nvSpPr>
+          <p:cNvPr id="3" name="Content Placeholder 2"/>
+          <p:cNvSpPr>
+            <a:spLocks noGrp="1"/>
+          </p:cNvSpPr>
+          <p:nvPr>
+            <p:ph idx="1"/>
+          </p:nvPr>
+        </p:nvSpPr>
+        <p:spPr/>
+        <p:txBody>
+          <a:bodyPr>
+            <a:normAutofit lnSpcReduction="10000"/>
+          </a:bodyPr>
+          <a:lstStyle/>
+          <a:p>
+            <a:r>
+              <a:rPr lang="en-US" dirty="0" smtClean="0"/>
+              <a:t>July 1-3 Total forces engaged: 165,620</a:t>
+            </a:r>
+          </a:p>
+          <a:p>
+            <a:pPr lvl="1"/>
+            <a:r>
+              <a:rPr lang="en-US" dirty="0" smtClean="0"/>
+              <a:t>Confederates: 71,699</a:t>
+            </a:r>
+          </a:p>
+          <a:p>
+            <a:pPr lvl="1"/>
+            <a:r>
+              <a:rPr lang="en-US" dirty="0" smtClean="0"/>
+              <a:t>Union: 93,921</a:t>
+            </a:r>
+          </a:p>
+          <a:p>
+            <a:r>
+              <a:rPr lang="en-US" dirty="0" smtClean="0"/>
+              <a:t>Generals</a:t>
+            </a:r>
+          </a:p>
+          <a:p>
+            <a:pPr lvl="1"/>
+            <a:r>
+              <a:rPr lang="en-US" dirty="0" smtClean="0"/>
+              <a:t>Confederates: Robert E. Lee</a:t>
+            </a:r>
+          </a:p>
+          <a:p>
+            <a:pPr lvl="1"/>
+            <a:r>
+              <a:rPr lang="en-US" dirty="0" smtClean="0"/>
+              <a:t>Union: George G. Meade</a:t>
+            </a:r>
+          </a:p>
+          <a:p>
+            <a:r>
+              <a:rPr lang="en-US" dirty="0" smtClean="0"/>
+              <a:t>Casualties: 51,112</a:t>
+            </a:r>
+          </a:p>
+          <a:p>
+            <a:pPr lvl="1"/>
+            <a:r>
+              <a:rPr lang="en-US" dirty="0" smtClean="0"/>
+              <a:t>Confederates: 28,063</a:t>
+            </a:r>
+          </a:p>
+          <a:p>
+            <a:pPr lvl="1"/>
+            <a:r>
+              <a:rPr lang="en-US" dirty="0" smtClean="0"/>
+              <a:t>Union: 23,049</a:t>
             </a:r>
             <a:endParaRPr lang="en-US" dirty="0"/>
           </a:p>
@@ -9564,37 +9726,14 @@
       </p:sp>
       <p:sp>
         <p:nvSpPr>
-          <p:cNvPr id="3" name="Content Placeholder 2"/>
-          <p:cNvSpPr>
-            <a:spLocks noGrp="1"/>
-          </p:cNvSpPr>
-          <p:nvPr>
-            <p:ph idx="1"/>
-          </p:nvPr>
-        </p:nvSpPr>
-        <p:spPr/>
-        <p:txBody>
-          <a:bodyPr/>
-          <a:lstStyle/>
-          <a:p>
-            <a:r>
-              <a:rPr lang="en-US" dirty="0" smtClean="0"/>
-              <a:t>Captured July 4th</a:t>
-            </a:r>
-            <a:endParaRPr lang="en-US" dirty="0"/>
-          </a:p>
-        </p:txBody>
-      </p:sp>
-      <p:sp>
-        <p:nvSpPr>
-          <p:cNvPr id="4" name="TextBox 3"/>
+          <p:cNvPr id="5" name="TextBox 4"/>
           <p:cNvSpPr txBox="1"/>
           <p:nvPr/>
         </p:nvSpPr>
         <p:spPr>
           <a:xfrm>
-            <a:off x="7249583" y="169333"/>
-            <a:ext cx="1344084" cy="369332"/>
+            <a:off x="6921500" y="243417"/>
+            <a:ext cx="1672167" cy="369332"/>
           </a:xfrm>
           <a:prstGeom prst="rect">
             <a:avLst/>
@@ -9618,7 +9757,7 @@
     </p:spTree>
     <p:extLst>
       <p:ext uri="{BB962C8B-B14F-4D97-AF65-F5344CB8AC3E}">
-        <p14:creationId xmlns:p14="http://schemas.microsoft.com/office/powerpoint/2010/main" val="2762890798"/>
+        <p14:creationId xmlns:p14="http://schemas.microsoft.com/office/powerpoint/2010/main" val="2470542951"/>
       </p:ext>
     </p:extLst>
   </p:cSld>
@@ -9669,6 +9808,123 @@
           <a:p>
             <a:r>
               <a:rPr lang="en-US" dirty="0"/>
+              <a:t>Vicksburg </a:t>
+            </a:r>
+            <a:r>
+              <a:rPr lang="en-US" dirty="0" smtClean="0"/>
+              <a:t>Captured </a:t>
+            </a:r>
+            <a:endParaRPr lang="en-US" dirty="0"/>
+          </a:p>
+        </p:txBody>
+      </p:sp>
+      <p:sp>
+        <p:nvSpPr>
+          <p:cNvPr id="3" name="Content Placeholder 2"/>
+          <p:cNvSpPr>
+            <a:spLocks noGrp="1"/>
+          </p:cNvSpPr>
+          <p:nvPr>
+            <p:ph idx="1"/>
+          </p:nvPr>
+        </p:nvSpPr>
+        <p:spPr/>
+        <p:txBody>
+          <a:bodyPr/>
+          <a:lstStyle/>
+          <a:p>
+            <a:r>
+              <a:rPr lang="en-US" dirty="0" smtClean="0"/>
+              <a:t>Captured July 4th</a:t>
+            </a:r>
+            <a:endParaRPr lang="en-US" dirty="0"/>
+          </a:p>
+        </p:txBody>
+      </p:sp>
+      <p:sp>
+        <p:nvSpPr>
+          <p:cNvPr id="4" name="TextBox 3"/>
+          <p:cNvSpPr txBox="1"/>
+          <p:nvPr/>
+        </p:nvSpPr>
+        <p:spPr>
+          <a:xfrm>
+            <a:off x="7249583" y="169333"/>
+            <a:ext cx="1344084" cy="369332"/>
+          </a:xfrm>
+          <a:prstGeom prst="rect">
+            <a:avLst/>
+          </a:prstGeom>
+          <a:noFill/>
+        </p:spPr>
+        <p:txBody>
+          <a:bodyPr wrap="square" rtlCol="0">
+            <a:spAutoFit/>
+          </a:bodyPr>
+          <a:lstStyle/>
+          <a:p>
+            <a:r>
+              <a:rPr lang="en-US" dirty="0" smtClean="0"/>
+              <a:t>-Neel</a:t>
+            </a:r>
+            <a:endParaRPr lang="en-US" dirty="0"/>
+          </a:p>
+        </p:txBody>
+      </p:sp>
+    </p:spTree>
+    <p:extLst>
+      <p:ext uri="{BB962C8B-B14F-4D97-AF65-F5344CB8AC3E}">
+        <p14:creationId xmlns:p14="http://schemas.microsoft.com/office/powerpoint/2010/main" val="2762890798"/>
+      </p:ext>
+    </p:extLst>
+  </p:cSld>
+  <p:clrMapOvr>
+    <a:masterClrMapping/>
+  </p:clrMapOvr>
+  <p:timing>
+    <p:tnLst>
+      <p:par>
+        <p:cTn xmlns:p14="http://schemas.microsoft.com/office/powerpoint/2010/main" id="1" dur="indefinite" restart="never" nodeType="tmRoot"/>
+      </p:par>
+    </p:tnLst>
+  </p:timing>
+</p:sld>
+</file>
+
+<file path=ppt/slides/slide23.xml><?xml version="1.0" encoding="utf-8"?>
+<p:sld xmlns:a="http://schemas.openxmlformats.org/drawingml/2006/main" xmlns:r="http://schemas.openxmlformats.org/officeDocument/2006/relationships" xmlns:p="http://schemas.openxmlformats.org/presentationml/2006/main">
+  <p:cSld>
+    <p:spTree>
+      <p:nvGrpSpPr>
+        <p:cNvPr id="1" name=""/>
+        <p:cNvGrpSpPr/>
+        <p:nvPr/>
+      </p:nvGrpSpPr>
+      <p:grpSpPr>
+        <a:xfrm>
+          <a:off x="0" y="0"/>
+          <a:ext cx="0" cy="0"/>
+          <a:chOff x="0" y="0"/>
+          <a:chExt cx="0" cy="0"/>
+        </a:xfrm>
+      </p:grpSpPr>
+      <p:sp>
+        <p:nvSpPr>
+          <p:cNvPr id="2" name="Title 1"/>
+          <p:cNvSpPr>
+            <a:spLocks noGrp="1"/>
+          </p:cNvSpPr>
+          <p:nvPr>
+            <p:ph type="title"/>
+          </p:nvPr>
+        </p:nvSpPr>
+        <p:spPr/>
+        <p:txBody>
+          <a:bodyPr/>
+          <a:lstStyle/>
+          <a:p>
+            <a:r>
+              <a:rPr lang="en-US" dirty="0"/>
               <a:t>Chickamauga</a:t>
             </a:r>
           </a:p>
@@ -9743,7 +9999,7 @@
 </p:sld>
 </file>
 
-<file path=ppt/slides/slide23.xml><?xml version="1.0" encoding="utf-8"?>
+<file path=ppt/slides/slide24.xml><?xml version="1.0" encoding="utf-8"?>
 <p:sld xmlns:a="http://schemas.openxmlformats.org/drawingml/2006/main" xmlns:r="http://schemas.openxmlformats.org/officeDocument/2006/relationships" xmlns:p="http://schemas.openxmlformats.org/presentationml/2006/main">
   <p:cSld>
     <p:spTree>
@@ -10137,114 +10393,6 @@
 </p:sld>
 </file>
 
-<file path=ppt/slides/slide24.xml><?xml version="1.0" encoding="utf-8"?>
-<p:sld xmlns:a="http://schemas.openxmlformats.org/drawingml/2006/main" xmlns:r="http://schemas.openxmlformats.org/officeDocument/2006/relationships" xmlns:p="http://schemas.openxmlformats.org/presentationml/2006/main">
-  <p:cSld>
-    <p:spTree>
-      <p:nvGrpSpPr>
-        <p:cNvPr id="1" name=""/>
-        <p:cNvGrpSpPr/>
-        <p:nvPr/>
-      </p:nvGrpSpPr>
-      <p:grpSpPr>
-        <a:xfrm>
-          <a:off x="0" y="0"/>
-          <a:ext cx="0" cy="0"/>
-          <a:chOff x="0" y="0"/>
-          <a:chExt cx="0" cy="0"/>
-        </a:xfrm>
-      </p:grpSpPr>
-      <p:sp>
-        <p:nvSpPr>
-          <p:cNvPr id="2" name="Title 1"/>
-          <p:cNvSpPr>
-            <a:spLocks noGrp="1"/>
-          </p:cNvSpPr>
-          <p:nvPr>
-            <p:ph type="title"/>
-          </p:nvPr>
-        </p:nvSpPr>
-        <p:spPr/>
-        <p:txBody>
-          <a:bodyPr/>
-          <a:lstStyle/>
-          <a:p>
-            <a:r>
-              <a:rPr lang="en-US" dirty="0"/>
-              <a:t>Charleston: submarine attack</a:t>
-            </a:r>
-          </a:p>
-        </p:txBody>
-      </p:sp>
-      <p:sp>
-        <p:nvSpPr>
-          <p:cNvPr id="3" name="Content Placeholder 2"/>
-          <p:cNvSpPr>
-            <a:spLocks noGrp="1"/>
-          </p:cNvSpPr>
-          <p:nvPr>
-            <p:ph idx="1"/>
-          </p:nvPr>
-        </p:nvSpPr>
-        <p:spPr/>
-        <p:txBody>
-          <a:bodyPr/>
-          <a:lstStyle/>
-          <a:p>
-            <a:endParaRPr lang="en-US"/>
-          </a:p>
-        </p:txBody>
-      </p:sp>
-      <p:sp>
-        <p:nvSpPr>
-          <p:cNvPr id="4" name="TextBox 3"/>
-          <p:cNvSpPr txBox="1"/>
-          <p:nvPr/>
-        </p:nvSpPr>
-        <p:spPr>
-          <a:xfrm>
-            <a:off x="7239000" y="285750"/>
-            <a:ext cx="1640417" cy="369332"/>
-          </a:xfrm>
-          <a:prstGeom prst="rect">
-            <a:avLst/>
-          </a:prstGeom>
-          <a:noFill/>
-        </p:spPr>
-        <p:txBody>
-          <a:bodyPr wrap="square" rtlCol="0">
-            <a:spAutoFit/>
-          </a:bodyPr>
-          <a:lstStyle/>
-          <a:p>
-            <a:r>
-              <a:rPr lang="en-US" dirty="0" smtClean="0"/>
-              <a:t>-Neel</a:t>
-            </a:r>
-            <a:endParaRPr lang="en-US" dirty="0"/>
-          </a:p>
-        </p:txBody>
-      </p:sp>
-    </p:spTree>
-    <p:extLst>
-      <p:ext uri="{BB962C8B-B14F-4D97-AF65-F5344CB8AC3E}">
-        <p14:creationId xmlns:p14="http://schemas.microsoft.com/office/powerpoint/2010/main" val="129178598"/>
-      </p:ext>
-    </p:extLst>
-  </p:cSld>
-  <p:clrMapOvr>
-    <a:masterClrMapping/>
-  </p:clrMapOvr>
-  <p:timing>
-    <p:tnLst>
-      <p:par>
-        <p:cTn xmlns:p14="http://schemas.microsoft.com/office/powerpoint/2010/main" id="1" dur="indefinite" restart="never" nodeType="tmRoot"/>
-      </p:par>
-    </p:tnLst>
-  </p:timing>
-</p:sld>
-</file>
-
 <file path=ppt/slides/slide25.xml><?xml version="1.0" encoding="utf-8"?>
 <p:sld xmlns:a="http://schemas.openxmlformats.org/drawingml/2006/main" xmlns:r="http://schemas.openxmlformats.org/officeDocument/2006/relationships" xmlns:p="http://schemas.openxmlformats.org/presentationml/2006/main">
   <p:cSld>
@@ -10279,7 +10427,7 @@
           <a:p>
             <a:r>
               <a:rPr lang="en-US" dirty="0"/>
-              <a:t>Fort pillow</a:t>
+              <a:t>Charleston: submarine attack</a:t>
             </a:r>
           </a:p>
         </p:txBody>
@@ -10311,8 +10459,8 @@
         </p:nvSpPr>
         <p:spPr>
           <a:xfrm>
-            <a:off x="7313083" y="243417"/>
-            <a:ext cx="1555750" cy="369332"/>
+            <a:off x="7239000" y="285750"/>
+            <a:ext cx="1640417" cy="369332"/>
           </a:xfrm>
           <a:prstGeom prst="rect">
             <a:avLst/>
@@ -10327,7 +10475,7 @@
           <a:p>
             <a:r>
               <a:rPr lang="en-US" dirty="0" smtClean="0"/>
-              <a:t>-Rohan</a:t>
+              <a:t>-Neel</a:t>
             </a:r>
             <a:endParaRPr lang="en-US" dirty="0"/>
           </a:p>
@@ -10336,7 +10484,7 @@
     </p:spTree>
     <p:extLst>
       <p:ext uri="{BB962C8B-B14F-4D97-AF65-F5344CB8AC3E}">
-        <p14:creationId xmlns:p14="http://schemas.microsoft.com/office/powerpoint/2010/main" val="1032982681"/>
+        <p14:creationId xmlns:p14="http://schemas.microsoft.com/office/powerpoint/2010/main" val="129178598"/>
       </p:ext>
     </p:extLst>
   </p:cSld>
@@ -10386,29 +10534,64 @@
           <a:lstStyle/>
           <a:p>
             <a:r>
-              <a:rPr lang="en-US" sz="4800" dirty="0"/>
-              <a:t>Atlanta falls</a:t>
-            </a:r>
+              <a:rPr lang="en-US" dirty="0"/>
+              <a:t>Fort pillow</a:t>
+            </a:r>
+          </a:p>
+        </p:txBody>
+      </p:sp>
+      <p:sp>
+        <p:nvSpPr>
+          <p:cNvPr id="3" name="Content Placeholder 2"/>
+          <p:cNvSpPr>
+            <a:spLocks noGrp="1"/>
+          </p:cNvSpPr>
+          <p:nvPr>
+            <p:ph idx="1"/>
+          </p:nvPr>
+        </p:nvSpPr>
+        <p:spPr/>
+        <p:txBody>
+          <a:bodyPr>
+            <a:normAutofit fontScale="92500"/>
+          </a:bodyPr>
+          <a:lstStyle/>
+          <a:p>
+            <a:r>
+              <a:rPr lang="en-US" dirty="0"/>
+              <a:t>On April 12th Confederate General Nathan Bedford Forrest stormed into Fort Pillow in where a garrison of 300 African Americans were massacred. Both Union Commanders Lionel F. Booth and William F. Bradford were killed</a:t>
+            </a:r>
+          </a:p>
+          <a:p>
+            <a:r>
+              <a:rPr lang="en-US" dirty="0" smtClean="0"/>
+              <a:t>Rebels </a:t>
+            </a:r>
+            <a:r>
+              <a:rPr lang="en-US" dirty="0"/>
+              <a:t>involved: 2,500</a:t>
+            </a:r>
+          </a:p>
+          <a:p>
+            <a:r>
+              <a:rPr lang="en-US" dirty="0"/>
+              <a:t>Union Garrison: 600 </a:t>
+            </a:r>
+          </a:p>
+          <a:p>
+            <a:r>
+              <a:rPr lang="en-US" dirty="0"/>
+              <a:t>Rebels killed: 100</a:t>
+            </a:r>
+          </a:p>
+          <a:p>
+            <a:r>
+              <a:rPr lang="en-US" dirty="0"/>
+              <a:t>Union soldiers killed: 600 </a:t>
+            </a:r>
+          </a:p>
+          <a:p>
             <a:endParaRPr lang="en-US" dirty="0"/>
-          </a:p>
-        </p:txBody>
-      </p:sp>
-      <p:sp>
-        <p:nvSpPr>
-          <p:cNvPr id="3" name="Content Placeholder 2"/>
-          <p:cNvSpPr>
-            <a:spLocks noGrp="1"/>
-          </p:cNvSpPr>
-          <p:nvPr>
-            <p:ph idx="1"/>
-          </p:nvPr>
-        </p:nvSpPr>
-        <p:spPr/>
-        <p:txBody>
-          <a:bodyPr/>
-          <a:lstStyle/>
-          <a:p>
-            <a:endParaRPr lang="en-US"/>
           </a:p>
         </p:txBody>
       </p:sp>
@@ -10420,8 +10603,8 @@
         </p:nvSpPr>
         <p:spPr>
           <a:xfrm>
-            <a:off x="7778750" y="169333"/>
-            <a:ext cx="1195917" cy="369332"/>
+            <a:off x="7313083" y="243417"/>
+            <a:ext cx="1555750" cy="369332"/>
           </a:xfrm>
           <a:prstGeom prst="rect">
             <a:avLst/>
@@ -10436,7 +10619,7 @@
           <a:p>
             <a:r>
               <a:rPr lang="en-US" dirty="0" smtClean="0"/>
-              <a:t>-Vinay</a:t>
+              <a:t>-Rohan</a:t>
             </a:r>
             <a:endParaRPr lang="en-US" dirty="0"/>
           </a:p>
@@ -10445,7 +10628,7 @@
     </p:spTree>
     <p:extLst>
       <p:ext uri="{BB962C8B-B14F-4D97-AF65-F5344CB8AC3E}">
-        <p14:creationId xmlns:p14="http://schemas.microsoft.com/office/powerpoint/2010/main" val="3140450667"/>
+        <p14:creationId xmlns:p14="http://schemas.microsoft.com/office/powerpoint/2010/main" val="1032982681"/>
       </p:ext>
     </p:extLst>
   </p:cSld>
@@ -10496,7 +10679,7 @@
           <a:p>
             <a:r>
               <a:rPr lang="en-US" sz="4800" dirty="0"/>
-              <a:t>Nashville</a:t>
+              <a:t>Atlanta falls</a:t>
             </a:r>
             <a:endParaRPr lang="en-US" dirty="0"/>
           </a:p>
@@ -10523,14 +10706,14 @@
       </p:sp>
       <p:sp>
         <p:nvSpPr>
-          <p:cNvPr id="5" name="TextBox 4"/>
+          <p:cNvPr id="4" name="TextBox 3"/>
           <p:cNvSpPr txBox="1"/>
           <p:nvPr/>
         </p:nvSpPr>
         <p:spPr>
           <a:xfrm>
-            <a:off x="6847417" y="201083"/>
-            <a:ext cx="1852083" cy="369332"/>
+            <a:off x="7778750" y="169333"/>
+            <a:ext cx="1195917" cy="369332"/>
           </a:xfrm>
           <a:prstGeom prst="rect">
             <a:avLst/>
@@ -10545,7 +10728,7 @@
           <a:p>
             <a:r>
               <a:rPr lang="en-US" dirty="0" smtClean="0"/>
-              <a:t>-Rohan</a:t>
+              <a:t>-Vinay</a:t>
             </a:r>
             <a:endParaRPr lang="en-US" dirty="0"/>
           </a:p>
@@ -10554,7 +10737,7 @@
     </p:spTree>
     <p:extLst>
       <p:ext uri="{BB962C8B-B14F-4D97-AF65-F5344CB8AC3E}">
-        <p14:creationId xmlns:p14="http://schemas.microsoft.com/office/powerpoint/2010/main" val="446644899"/>
+        <p14:creationId xmlns:p14="http://schemas.microsoft.com/office/powerpoint/2010/main" val="3140450667"/>
       </p:ext>
     </p:extLst>
   </p:cSld>
@@ -10604,8 +10787,8 @@
           <a:lstStyle/>
           <a:p>
             <a:r>
-              <a:rPr lang="en-US" dirty="0" smtClean="0"/>
-              <a:t>Battles of 1865</a:t>
+              <a:rPr lang="en-US" sz="4800" dirty="0"/>
+              <a:t>Nashville</a:t>
             </a:r>
             <a:endParaRPr lang="en-US" dirty="0"/>
           </a:p>
@@ -10623,87 +10806,69 @@
         </p:nvSpPr>
         <p:spPr/>
         <p:txBody>
-          <a:bodyPr>
-            <a:normAutofit fontScale="92500" lnSpcReduction="20000"/>
+          <a:bodyPr/>
+          <a:lstStyle/>
+          <a:p>
+            <a:r>
+              <a:rPr lang="en-US" dirty="0"/>
+              <a:t>On December 16th Union General George Thomas approached Darrison County, Nashville, Tennessee. Confederate General John Bell Hood takes him head on although he is outnumbered.</a:t>
+            </a:r>
+          </a:p>
+          <a:p>
+            <a:r>
+              <a:rPr lang="en-US" dirty="0"/>
+              <a:t>Confederates Engaged: 30,000</a:t>
+            </a:r>
+          </a:p>
+          <a:p>
+            <a:r>
+              <a:rPr lang="en-US" dirty="0"/>
+              <a:t>Union Soldiers Engaged: 55,000</a:t>
+            </a:r>
+          </a:p>
+          <a:p>
+            <a:r>
+              <a:rPr lang="en-US" dirty="0"/>
+              <a:t>Confederate Casualties: 6,000</a:t>
+            </a:r>
+          </a:p>
+          <a:p>
+            <a:r>
+              <a:rPr lang="en-US" dirty="0"/>
+              <a:t>Union Casualties: 3,061</a:t>
+            </a:r>
+          </a:p>
+          <a:p>
+            <a:endParaRPr lang="en-US" dirty="0"/>
+          </a:p>
+        </p:txBody>
+      </p:sp>
+      <p:sp>
+        <p:nvSpPr>
+          <p:cNvPr id="5" name="TextBox 4"/>
+          <p:cNvSpPr txBox="1"/>
+          <p:nvPr/>
+        </p:nvSpPr>
+        <p:spPr>
+          <a:xfrm>
+            <a:off x="6847417" y="201083"/>
+            <a:ext cx="1852083" cy="369332"/>
+          </a:xfrm>
+          <a:prstGeom prst="rect">
+            <a:avLst/>
+          </a:prstGeom>
+          <a:noFill/>
+        </p:spPr>
+        <p:txBody>
+          <a:bodyPr wrap="square" rtlCol="0">
+            <a:spAutoFit/>
           </a:bodyPr>
           <a:lstStyle/>
           <a:p>
             <a:r>
-              <a:rPr lang="en-US" dirty="0"/>
-              <a:t>A</a:t>
-            </a:r>
-            <a:r>
-              <a:rPr lang="en-US" dirty="0" smtClean="0"/>
-              <a:t>ssault </a:t>
-            </a:r>
-            <a:r>
-              <a:rPr lang="en-US" dirty="0"/>
-              <a:t>of fort fisher</a:t>
-            </a:r>
-          </a:p>
-          <a:p>
-            <a:r>
-              <a:rPr lang="en-US" dirty="0"/>
-              <a:t>Columbia south Carolina</a:t>
-            </a:r>
-          </a:p>
-          <a:p>
-            <a:r>
-              <a:rPr lang="en-US" dirty="0" smtClean="0"/>
-              <a:t>Fall of Petersburg*</a:t>
-            </a:r>
-            <a:endParaRPr lang="en-US" dirty="0"/>
-          </a:p>
-          <a:p>
-            <a:r>
-              <a:rPr lang="en-US" dirty="0"/>
-              <a:t>Battle of five forks</a:t>
-            </a:r>
-          </a:p>
-          <a:p>
-            <a:r>
-              <a:rPr lang="en-US" dirty="0"/>
-              <a:t>Fall </a:t>
-            </a:r>
-            <a:r>
-              <a:rPr lang="en-US" dirty="0" smtClean="0"/>
-              <a:t>of Richmond*</a:t>
-            </a:r>
-            <a:endParaRPr lang="en-US" dirty="0"/>
-          </a:p>
-          <a:p>
-            <a:r>
-              <a:rPr lang="en-US" dirty="0"/>
-              <a:t>Lincoln </a:t>
-            </a:r>
-            <a:r>
-              <a:rPr lang="en-US" dirty="0" smtClean="0"/>
-              <a:t>assassinated*</a:t>
-            </a:r>
-            <a:endParaRPr lang="en-US" dirty="0"/>
-          </a:p>
-          <a:p>
-            <a:r>
-              <a:rPr lang="en-US" dirty="0"/>
-              <a:t>Jefferson </a:t>
-            </a:r>
-            <a:r>
-              <a:rPr lang="en-US" dirty="0" smtClean="0"/>
-              <a:t>Davis </a:t>
-            </a:r>
-            <a:r>
-              <a:rPr lang="en-US" dirty="0"/>
-              <a:t>captured</a:t>
-            </a:r>
-          </a:p>
-          <a:p>
-            <a:r>
-              <a:rPr lang="en-US" dirty="0" smtClean="0"/>
-              <a:t>Palmetto ranch*</a:t>
-            </a:r>
-            <a:endParaRPr lang="en-US" dirty="0"/>
-          </a:p>
-          <a:p>
+              <a:rPr lang="en-US" dirty="0" smtClean="0"/>
+              <a:t>-Rohan</a:t>
+            </a:r>
             <a:endParaRPr lang="en-US" dirty="0"/>
           </a:p>
         </p:txBody>
@@ -10711,7 +10876,7 @@
     </p:spTree>
     <p:extLst>
       <p:ext uri="{BB962C8B-B14F-4D97-AF65-F5344CB8AC3E}">
-        <p14:creationId xmlns:p14="http://schemas.microsoft.com/office/powerpoint/2010/main" val="616596551"/>
+        <p14:creationId xmlns:p14="http://schemas.microsoft.com/office/powerpoint/2010/main" val="446644899"/>
       </p:ext>
     </p:extLst>
   </p:cSld>
@@ -10761,57 +10926,106 @@
           <a:lstStyle/>
           <a:p>
             <a:r>
+              <a:rPr lang="en-US" dirty="0" smtClean="0"/>
+              <a:t>Battles of 1865</a:t>
+            </a:r>
+            <a:endParaRPr lang="en-US" dirty="0"/>
+          </a:p>
+        </p:txBody>
+      </p:sp>
+      <p:sp>
+        <p:nvSpPr>
+          <p:cNvPr id="3" name="Content Placeholder 2"/>
+          <p:cNvSpPr>
+            <a:spLocks noGrp="1"/>
+          </p:cNvSpPr>
+          <p:nvPr>
+            <p:ph idx="1"/>
+          </p:nvPr>
+        </p:nvSpPr>
+        <p:spPr/>
+        <p:txBody>
+          <a:bodyPr>
+            <a:normAutofit fontScale="92500" lnSpcReduction="20000"/>
+          </a:bodyPr>
+          <a:lstStyle/>
+          <a:p>
+            <a:r>
               <a:rPr lang="en-US" dirty="0"/>
-              <a:t>Fall of Petersburg</a:t>
-            </a:r>
-          </a:p>
-        </p:txBody>
-      </p:sp>
-      <p:sp>
-        <p:nvSpPr>
-          <p:cNvPr id="3" name="Content Placeholder 2"/>
-          <p:cNvSpPr>
-            <a:spLocks noGrp="1"/>
-          </p:cNvSpPr>
-          <p:nvPr>
-            <p:ph idx="1"/>
-          </p:nvPr>
-        </p:nvSpPr>
-        <p:spPr/>
-        <p:txBody>
-          <a:bodyPr/>
-          <a:lstStyle/>
-          <a:p>
-            <a:endParaRPr lang="en-US"/>
-          </a:p>
-        </p:txBody>
-      </p:sp>
-      <p:sp>
-        <p:nvSpPr>
-          <p:cNvPr id="4" name="TextBox 3"/>
-          <p:cNvSpPr txBox="1"/>
-          <p:nvPr/>
-        </p:nvSpPr>
-        <p:spPr>
-          <a:xfrm>
-            <a:off x="6879167" y="243417"/>
-            <a:ext cx="1428750" cy="369332"/>
-          </a:xfrm>
-          <a:prstGeom prst="rect">
-            <a:avLst/>
-          </a:prstGeom>
-          <a:noFill/>
-        </p:spPr>
-        <p:txBody>
-          <a:bodyPr wrap="square" rtlCol="0">
-            <a:spAutoFit/>
-          </a:bodyPr>
-          <a:lstStyle/>
-          <a:p>
-            <a:r>
-              <a:rPr lang="en-US" dirty="0" smtClean="0"/>
-              <a:t>-Rohan</a:t>
-            </a:r>
+              <a:t>A</a:t>
+            </a:r>
+            <a:r>
+              <a:rPr lang="en-US" dirty="0" smtClean="0"/>
+              <a:t>ssault </a:t>
+            </a:r>
+            <a:r>
+              <a:rPr lang="en-US" dirty="0"/>
+              <a:t>of fort fisher</a:t>
+            </a:r>
+          </a:p>
+          <a:p>
+            <a:r>
+              <a:rPr lang="en-US" dirty="0"/>
+              <a:t>Columbia south Carolina</a:t>
+            </a:r>
+          </a:p>
+          <a:p>
+            <a:r>
+              <a:rPr lang="en-US" dirty="0" smtClean="0"/>
+              <a:t>Fall of Petersburg*</a:t>
+            </a:r>
+            <a:endParaRPr lang="en-US" dirty="0"/>
+          </a:p>
+          <a:p>
+            <a:r>
+              <a:rPr lang="en-US" dirty="0"/>
+              <a:t>Battle of five forks</a:t>
+            </a:r>
+          </a:p>
+          <a:p>
+            <a:r>
+              <a:rPr lang="en-US" dirty="0"/>
+              <a:t>Fall </a:t>
+            </a:r>
+            <a:r>
+              <a:rPr lang="en-US" dirty="0" smtClean="0"/>
+              <a:t>of Richmond*</a:t>
+            </a:r>
+            <a:endParaRPr lang="en-US" dirty="0"/>
+          </a:p>
+          <a:p>
+            <a:r>
+              <a:rPr lang="en-US" dirty="0"/>
+              <a:t>Lincoln </a:t>
+            </a:r>
+            <a:r>
+              <a:rPr lang="en-US" dirty="0" smtClean="0"/>
+              <a:t>assassinated*</a:t>
+            </a:r>
+            <a:endParaRPr lang="en-US" dirty="0"/>
+          </a:p>
+          <a:p>
+            <a:r>
+              <a:rPr lang="en-US" dirty="0"/>
+              <a:t>Jefferson </a:t>
+            </a:r>
+            <a:r>
+              <a:rPr lang="en-US" dirty="0" smtClean="0"/>
+              <a:t>Davis </a:t>
+            </a:r>
+            <a:r>
+              <a:rPr lang="en-US" dirty="0"/>
+              <a:t>captured</a:t>
+            </a:r>
+          </a:p>
+          <a:p>
+            <a:r>
+              <a:rPr lang="en-US" dirty="0" smtClean="0"/>
+              <a:t>Palmetto ranch*</a:t>
+            </a:r>
+            <a:endParaRPr lang="en-US" dirty="0"/>
+          </a:p>
+          <a:p>
             <a:endParaRPr lang="en-US" dirty="0"/>
           </a:p>
         </p:txBody>
@@ -10819,7 +11033,7 @@
     </p:spTree>
     <p:extLst>
       <p:ext uri="{BB962C8B-B14F-4D97-AF65-F5344CB8AC3E}">
-        <p14:creationId xmlns:p14="http://schemas.microsoft.com/office/powerpoint/2010/main" val="256758823"/>
+        <p14:creationId xmlns:p14="http://schemas.microsoft.com/office/powerpoint/2010/main" val="616596551"/>
       </p:ext>
     </p:extLst>
   </p:cSld>
@@ -10995,7 +11209,7 @@
           <a:p>
             <a:r>
               <a:rPr lang="en-US" dirty="0"/>
-              <a:t>Fall of Richmond</a:t>
+              <a:t>Fall of Petersburg</a:t>
             </a:r>
           </a:p>
         </p:txBody>
@@ -11015,7 +11229,11 @@
           <a:bodyPr/>
           <a:lstStyle/>
           <a:p>
-            <a:endParaRPr lang="en-US"/>
+            <a:r>
+              <a:rPr lang="en-US" dirty="0"/>
+              <a:t>On April 2nd, 1864 Union General Ulysses S. Grant and his corps marched up to Petersburg, Virginia </a:t>
+            </a:r>
+            <a:endParaRPr lang="en-US" dirty="0"/>
           </a:p>
         </p:txBody>
       </p:sp>
@@ -11027,8 +11245,8 @@
         </p:nvSpPr>
         <p:spPr>
           <a:xfrm>
-            <a:off x="6858000" y="179917"/>
-            <a:ext cx="1502833" cy="369332"/>
+            <a:off x="6879167" y="243417"/>
+            <a:ext cx="1428750" cy="369332"/>
           </a:xfrm>
           <a:prstGeom prst="rect">
             <a:avLst/>
@@ -11043,7 +11261,7 @@
           <a:p>
             <a:r>
               <a:rPr lang="en-US" dirty="0" smtClean="0"/>
-              <a:t>-Vinay</a:t>
+              <a:t>-Rohan</a:t>
             </a:r>
             <a:endParaRPr lang="en-US" dirty="0"/>
           </a:p>
@@ -11052,7 +11270,7 @@
     </p:spTree>
     <p:extLst>
       <p:ext uri="{BB962C8B-B14F-4D97-AF65-F5344CB8AC3E}">
-        <p14:creationId xmlns:p14="http://schemas.microsoft.com/office/powerpoint/2010/main" val="3953403181"/>
+        <p14:creationId xmlns:p14="http://schemas.microsoft.com/office/powerpoint/2010/main" val="256758823"/>
       </p:ext>
     </p:extLst>
   </p:cSld>
@@ -11103,13 +11321,8 @@
           <a:p>
             <a:r>
               <a:rPr lang="en-US" dirty="0"/>
-              <a:t>Lincoln </a:t>
-            </a:r>
-            <a:r>
-              <a:rPr lang="en-US" dirty="0" smtClean="0"/>
-              <a:t>Assassinated</a:t>
-            </a:r>
-            <a:endParaRPr lang="en-US" dirty="0"/>
+              <a:t>Fall of Richmond</a:t>
+            </a:r>
           </a:p>
         </p:txBody>
       </p:sp>
@@ -11140,8 +11353,8 @@
         </p:nvSpPr>
         <p:spPr>
           <a:xfrm>
-            <a:off x="6879167" y="179917"/>
-            <a:ext cx="1524000" cy="369332"/>
+            <a:off x="6858000" y="179917"/>
+            <a:ext cx="1502833" cy="369332"/>
           </a:xfrm>
           <a:prstGeom prst="rect">
             <a:avLst/>
@@ -11156,7 +11369,7 @@
           <a:p>
             <a:r>
               <a:rPr lang="en-US" dirty="0" smtClean="0"/>
-              <a:t>-Neel</a:t>
+              <a:t>-Vinay</a:t>
             </a:r>
             <a:endParaRPr lang="en-US" dirty="0"/>
           </a:p>
@@ -11165,7 +11378,7 @@
     </p:spTree>
     <p:extLst>
       <p:ext uri="{BB962C8B-B14F-4D97-AF65-F5344CB8AC3E}">
-        <p14:creationId xmlns:p14="http://schemas.microsoft.com/office/powerpoint/2010/main" val="2522545022"/>
+        <p14:creationId xmlns:p14="http://schemas.microsoft.com/office/powerpoint/2010/main" val="3953403181"/>
       </p:ext>
     </p:extLst>
   </p:cSld>
@@ -11216,11 +11429,11 @@
           <a:p>
             <a:r>
               <a:rPr lang="en-US" dirty="0"/>
-              <a:t>Palmetto </a:t>
-            </a:r>
-            <a:r>
-              <a:rPr lang="en-US" dirty="0" smtClean="0"/>
-              <a:t>Ranch</a:t>
+              <a:t>Lincoln </a:t>
+            </a:r>
+            <a:r>
+              <a:rPr lang="en-US" dirty="0" smtClean="0"/>
+              <a:t>Assassinated</a:t>
             </a:r>
             <a:endParaRPr lang="en-US" dirty="0"/>
           </a:p>
@@ -11253,8 +11466,8 @@
         </p:nvSpPr>
         <p:spPr>
           <a:xfrm>
-            <a:off x="6985000" y="243417"/>
-            <a:ext cx="1333500" cy="369332"/>
+            <a:off x="6879167" y="179917"/>
+            <a:ext cx="1524000" cy="369332"/>
           </a:xfrm>
           <a:prstGeom prst="rect">
             <a:avLst/>
@@ -11269,7 +11482,7 @@
           <a:p>
             <a:r>
               <a:rPr lang="en-US" dirty="0" smtClean="0"/>
-              <a:t>-Vinay</a:t>
+              <a:t>-Neel</a:t>
             </a:r>
             <a:endParaRPr lang="en-US" dirty="0"/>
           </a:p>
@@ -11278,7 +11491,7 @@
     </p:spTree>
     <p:extLst>
       <p:ext uri="{BB962C8B-B14F-4D97-AF65-F5344CB8AC3E}">
-        <p14:creationId xmlns:p14="http://schemas.microsoft.com/office/powerpoint/2010/main" val="844406813"/>
+        <p14:creationId xmlns:p14="http://schemas.microsoft.com/office/powerpoint/2010/main" val="2522545022"/>
       </p:ext>
     </p:extLst>
   </p:cSld>
@@ -11328,8 +11541,12 @@
           <a:lstStyle/>
           <a:p>
             <a:r>
-              <a:rPr lang="en-US" dirty="0" smtClean="0"/>
-              <a:t>Modern Realization</a:t>
+              <a:rPr lang="en-US" dirty="0"/>
+              <a:t>Palmetto </a:t>
+            </a:r>
+            <a:r>
+              <a:rPr lang="en-US" dirty="0" smtClean="0"/>
+              <a:t>Ranch</a:t>
             </a:r>
             <a:endParaRPr lang="en-US" dirty="0"/>
           </a:p>
@@ -11362,8 +11579,8 @@
         </p:nvSpPr>
         <p:spPr>
           <a:xfrm>
-            <a:off x="7239000" y="232833"/>
-            <a:ext cx="1703917" cy="646331"/>
+            <a:off x="6985000" y="243417"/>
+            <a:ext cx="1333500" cy="369332"/>
           </a:xfrm>
           <a:prstGeom prst="rect">
             <a:avLst/>
@@ -11378,15 +11595,7 @@
           <a:p>
             <a:r>
               <a:rPr lang="en-US" dirty="0" smtClean="0"/>
-              <a:t>All 3 don</a:t>
-            </a:r>
-            <a:r>
-              <a:rPr lang="fr-FR" dirty="0" smtClean="0"/>
-              <a:t>’</a:t>
-            </a:r>
-            <a:r>
-              <a:rPr lang="en-US" dirty="0" smtClean="0"/>
-              <a:t>t talk about till later</a:t>
+              <a:t>-Vinay</a:t>
             </a:r>
             <a:endParaRPr lang="en-US" dirty="0"/>
           </a:p>
@@ -11395,7 +11604,7 @@
     </p:spTree>
     <p:extLst>
       <p:ext uri="{BB962C8B-B14F-4D97-AF65-F5344CB8AC3E}">
-        <p14:creationId xmlns:p14="http://schemas.microsoft.com/office/powerpoint/2010/main" val="1052876114"/>
+        <p14:creationId xmlns:p14="http://schemas.microsoft.com/office/powerpoint/2010/main" val="844406813"/>
       </p:ext>
     </p:extLst>
   </p:cSld>
@@ -11446,6 +11655,123 @@
           <a:p>
             <a:r>
               <a:rPr lang="en-US" dirty="0" smtClean="0"/>
+              <a:t>Modern Realization</a:t>
+            </a:r>
+            <a:endParaRPr lang="en-US" dirty="0"/>
+          </a:p>
+        </p:txBody>
+      </p:sp>
+      <p:sp>
+        <p:nvSpPr>
+          <p:cNvPr id="3" name="Content Placeholder 2"/>
+          <p:cNvSpPr>
+            <a:spLocks noGrp="1"/>
+          </p:cNvSpPr>
+          <p:nvPr>
+            <p:ph idx="1"/>
+          </p:nvPr>
+        </p:nvSpPr>
+        <p:spPr/>
+        <p:txBody>
+          <a:bodyPr/>
+          <a:lstStyle/>
+          <a:p>
+            <a:endParaRPr lang="en-US"/>
+          </a:p>
+        </p:txBody>
+      </p:sp>
+      <p:sp>
+        <p:nvSpPr>
+          <p:cNvPr id="4" name="TextBox 3"/>
+          <p:cNvSpPr txBox="1"/>
+          <p:nvPr/>
+        </p:nvSpPr>
+        <p:spPr>
+          <a:xfrm>
+            <a:off x="7239000" y="232833"/>
+            <a:ext cx="1703917" cy="646331"/>
+          </a:xfrm>
+          <a:prstGeom prst="rect">
+            <a:avLst/>
+          </a:prstGeom>
+          <a:noFill/>
+        </p:spPr>
+        <p:txBody>
+          <a:bodyPr wrap="square" rtlCol="0">
+            <a:spAutoFit/>
+          </a:bodyPr>
+          <a:lstStyle/>
+          <a:p>
+            <a:r>
+              <a:rPr lang="en-US" dirty="0" smtClean="0"/>
+              <a:t>All 3 don</a:t>
+            </a:r>
+            <a:r>
+              <a:rPr lang="fr-FR" dirty="0" smtClean="0"/>
+              <a:t>’</a:t>
+            </a:r>
+            <a:r>
+              <a:rPr lang="en-US" dirty="0" smtClean="0"/>
+              <a:t>t talk about till later</a:t>
+            </a:r>
+            <a:endParaRPr lang="en-US" dirty="0"/>
+          </a:p>
+        </p:txBody>
+      </p:sp>
+    </p:spTree>
+    <p:extLst>
+      <p:ext uri="{BB962C8B-B14F-4D97-AF65-F5344CB8AC3E}">
+        <p14:creationId xmlns:p14="http://schemas.microsoft.com/office/powerpoint/2010/main" val="1052876114"/>
+      </p:ext>
+    </p:extLst>
+  </p:cSld>
+  <p:clrMapOvr>
+    <a:masterClrMapping/>
+  </p:clrMapOvr>
+  <p:timing>
+    <p:tnLst>
+      <p:par>
+        <p:cTn xmlns:p14="http://schemas.microsoft.com/office/powerpoint/2010/main" id="1" dur="indefinite" restart="never" nodeType="tmRoot"/>
+      </p:par>
+    </p:tnLst>
+  </p:timing>
+</p:sld>
+</file>
+
+<file path=ppt/slides/slide35.xml><?xml version="1.0" encoding="utf-8"?>
+<p:sld xmlns:a="http://schemas.openxmlformats.org/drawingml/2006/main" xmlns:r="http://schemas.openxmlformats.org/officeDocument/2006/relationships" xmlns:p="http://schemas.openxmlformats.org/presentationml/2006/main">
+  <p:cSld>
+    <p:spTree>
+      <p:nvGrpSpPr>
+        <p:cNvPr id="1" name=""/>
+        <p:cNvGrpSpPr/>
+        <p:nvPr/>
+      </p:nvGrpSpPr>
+      <p:grpSpPr>
+        <a:xfrm>
+          <a:off x="0" y="0"/>
+          <a:ext cx="0" cy="0"/>
+          <a:chOff x="0" y="0"/>
+          <a:chExt cx="0" cy="0"/>
+        </a:xfrm>
+      </p:grpSpPr>
+      <p:sp>
+        <p:nvSpPr>
+          <p:cNvPr id="2" name="Title 1"/>
+          <p:cNvSpPr>
+            <a:spLocks noGrp="1"/>
+          </p:cNvSpPr>
+          <p:nvPr>
+            <p:ph type="title"/>
+          </p:nvPr>
+        </p:nvSpPr>
+        <p:spPr/>
+        <p:txBody>
+          <a:bodyPr/>
+          <a:lstStyle/>
+          <a:p>
+            <a:r>
+              <a:rPr lang="en-US" dirty="0" smtClean="0"/>
               <a:t>Citations</a:t>
             </a:r>
             <a:endParaRPr lang="en-US" dirty="0"/>
@@ -11589,7 +11915,7 @@
 </p:sld>
 </file>
 
-<file path=ppt/slides/slide35.xml><?xml version="1.0" encoding="utf-8"?>
+<file path=ppt/slides/slide36.xml><?xml version="1.0" encoding="utf-8"?>
 <p:sld xmlns:a="http://schemas.openxmlformats.org/drawingml/2006/main" xmlns:r="http://schemas.openxmlformats.org/officeDocument/2006/relationships" xmlns:p="http://schemas.openxmlformats.org/presentationml/2006/main">
   <p:cSld>
     <p:spTree>
@@ -12095,139 +12421,16 @@
           <a:chExt cx="0" cy="0"/>
         </a:xfrm>
       </p:grpSpPr>
-      <p:sp>
-        <p:nvSpPr>
-          <p:cNvPr id="2" name="Title 1"/>
-          <p:cNvSpPr>
-            <a:spLocks noGrp="1"/>
-          </p:cNvSpPr>
-          <p:nvPr>
-            <p:ph type="title"/>
-          </p:nvPr>
-        </p:nvSpPr>
-        <p:spPr/>
-        <p:txBody>
-          <a:bodyPr/>
-          <a:lstStyle/>
-          <a:p>
-            <a:r>
-              <a:rPr lang="en-US" dirty="0" smtClean="0"/>
-              <a:t>Lexington</a:t>
-            </a:r>
-            <a:endParaRPr lang="en-US" dirty="0"/>
-          </a:p>
-        </p:txBody>
-      </p:sp>
-      <p:sp>
-        <p:nvSpPr>
-          <p:cNvPr id="3" name="Content Placeholder 2"/>
-          <p:cNvSpPr>
-            <a:spLocks noGrp="1"/>
-          </p:cNvSpPr>
-          <p:nvPr>
-            <p:ph idx="1"/>
-          </p:nvPr>
-        </p:nvSpPr>
-        <p:spPr/>
-        <p:txBody>
-          <a:bodyPr>
-            <a:normAutofit lnSpcReduction="10000"/>
-          </a:bodyPr>
-          <a:lstStyle/>
-          <a:p>
-            <a:r>
-              <a:rPr lang="en-US" dirty="0" smtClean="0"/>
-              <a:t>September 12</a:t>
-            </a:r>
-            <a:r>
-              <a:rPr lang="en-US" baseline="30000" dirty="0" smtClean="0"/>
-              <a:t>th</a:t>
-            </a:r>
-            <a:r>
-              <a:rPr lang="en-US" dirty="0"/>
-              <a:t> </a:t>
-            </a:r>
-            <a:r>
-              <a:rPr lang="en-US" dirty="0" smtClean="0"/>
-              <a:t>– Confederate and Missouri state guard advance to Lexington after the Union defeat at Wilson Creek.</a:t>
-            </a:r>
-          </a:p>
-          <a:p>
-            <a:r>
-              <a:rPr lang="en-US" dirty="0" smtClean="0"/>
-              <a:t>Confederates: General Claiborne Fox Jackson and Sterling Price. Union General: James A. Mulligan and Robert T. Van Horn</a:t>
-            </a:r>
-          </a:p>
-          <a:p>
-            <a:r>
-              <a:rPr lang="en-US" dirty="0" smtClean="0"/>
-              <a:t>Confederates 20,000 and Union 3,500 battle soldiers led to casualties. 6-1 odds</a:t>
-            </a:r>
-          </a:p>
-          <a:p>
-            <a:pPr lvl="1"/>
-            <a:r>
-              <a:rPr lang="en-US" dirty="0" smtClean="0"/>
-              <a:t>100 confederate </a:t>
-            </a:r>
-          </a:p>
-          <a:p>
-            <a:pPr lvl="1"/>
-            <a:r>
-              <a:rPr lang="en-US" dirty="0" smtClean="0"/>
-              <a:t>1,774 union</a:t>
-            </a:r>
-            <a:endParaRPr lang="en-US" dirty="0"/>
-          </a:p>
-        </p:txBody>
-      </p:sp>
-      <p:sp>
-        <p:nvSpPr>
-          <p:cNvPr id="4" name="TextBox 3"/>
-          <p:cNvSpPr txBox="1"/>
-          <p:nvPr/>
-        </p:nvSpPr>
-        <p:spPr>
-          <a:xfrm>
-            <a:off x="7334638" y="207327"/>
-            <a:ext cx="1503212" cy="369332"/>
-          </a:xfrm>
-          <a:prstGeom prst="rect">
-            <a:avLst/>
-          </a:prstGeom>
-          <a:noFill/>
-        </p:spPr>
-        <p:txBody>
-          <a:bodyPr wrap="square" rtlCol="0">
-            <a:spAutoFit/>
-          </a:bodyPr>
-          <a:lstStyle/>
-          <a:p>
-            <a:r>
-              <a:rPr lang="en-US" dirty="0" smtClean="0"/>
-              <a:t>-Vinay</a:t>
-            </a:r>
-            <a:endParaRPr lang="en-US" dirty="0"/>
-          </a:p>
-        </p:txBody>
-      </p:sp>
     </p:spTree>
     <p:extLst>
       <p:ext uri="{BB962C8B-B14F-4D97-AF65-F5344CB8AC3E}">
-        <p14:creationId xmlns:p14="http://schemas.microsoft.com/office/powerpoint/2010/main" val="2900627398"/>
+        <p14:creationId xmlns:p14="http://schemas.microsoft.com/office/powerpoint/2010/main" val="2259474099"/>
       </p:ext>
     </p:extLst>
   </p:cSld>
   <p:clrMapOvr>
     <a:masterClrMapping/>
   </p:clrMapOvr>
-  <p:timing>
-    <p:tnLst>
-      <p:par>
-        <p:cTn xmlns:p14="http://schemas.microsoft.com/office/powerpoint/2010/main" id="1" dur="indefinite" restart="never" nodeType="tmRoot"/>
-      </p:par>
-    </p:tnLst>
-  </p:timing>
 </p:sld>
 </file>
 
@@ -12265,7 +12468,7 @@
           <a:p>
             <a:r>
               <a:rPr lang="en-US" dirty="0" smtClean="0"/>
-              <a:t>Battles 1862</a:t>
+              <a:t>Lexington</a:t>
             </a:r>
             <a:endParaRPr lang="en-US" dirty="0"/>
           </a:p>
@@ -12284,55 +12487,81 @@
         <p:spPr/>
         <p:txBody>
           <a:bodyPr>
-            <a:normAutofit fontScale="92500" lnSpcReduction="20000"/>
+            <a:normAutofit lnSpcReduction="10000"/>
           </a:bodyPr>
           <a:lstStyle/>
           <a:p>
             <a:r>
               <a:rPr lang="en-US" dirty="0" smtClean="0"/>
-              <a:t>Battle of Roanoke Island</a:t>
-            </a:r>
-          </a:p>
-          <a:p>
-            <a:r>
-              <a:rPr lang="en-US" dirty="0" smtClean="0"/>
-              <a:t>Fort Donelson* </a:t>
-            </a:r>
-          </a:p>
-          <a:p>
-            <a:r>
-              <a:rPr lang="en-US" dirty="0" smtClean="0"/>
-              <a:t>Battle of Pea Ridge</a:t>
-            </a:r>
-          </a:p>
-          <a:p>
-            <a:r>
-              <a:rPr lang="en-US" dirty="0" smtClean="0"/>
-              <a:t>Shiloh*</a:t>
-            </a:r>
-          </a:p>
-          <a:p>
-            <a:r>
-              <a:rPr lang="en-US" dirty="0" smtClean="0"/>
-              <a:t>Battle of seven Pines</a:t>
-            </a:r>
-          </a:p>
-          <a:p>
-            <a:r>
-              <a:rPr lang="en-US" dirty="0" smtClean="0"/>
-              <a:t>Second Bull Run*</a:t>
-            </a:r>
-          </a:p>
-          <a:p>
-            <a:r>
-              <a:rPr lang="en-US" dirty="0" smtClean="0"/>
-              <a:t>Antietam*</a:t>
-            </a:r>
-          </a:p>
-          <a:p>
-            <a:r>
-              <a:rPr lang="en-US" dirty="0" smtClean="0"/>
-              <a:t>Fredericksburg*</a:t>
+              <a:t>September 12</a:t>
+            </a:r>
+            <a:r>
+              <a:rPr lang="en-US" baseline="30000" dirty="0" smtClean="0"/>
+              <a:t>th</a:t>
+            </a:r>
+            <a:r>
+              <a:rPr lang="en-US" dirty="0"/>
+              <a:t> </a:t>
+            </a:r>
+            <a:r>
+              <a:rPr lang="en-US" dirty="0" smtClean="0"/>
+              <a:t>– Confederate and Missouri state guard advance to Lexington after the Union defeat at Wilson Creek.</a:t>
+            </a:r>
+          </a:p>
+          <a:p>
+            <a:r>
+              <a:rPr lang="en-US" dirty="0" smtClean="0"/>
+              <a:t>Confederates: General Claiborne Fox Jackson and Sterling Price. Union General: James A. Mulligan and Robert T. Van Horn</a:t>
+            </a:r>
+          </a:p>
+          <a:p>
+            <a:r>
+              <a:rPr lang="en-US" dirty="0" smtClean="0"/>
+              <a:t>Confederates 20,000 and Union 3,500 battle soldiers led to casualties. 6-1 odds</a:t>
+            </a:r>
+          </a:p>
+          <a:p>
+            <a:pPr lvl="1"/>
+            <a:r>
+              <a:rPr lang="en-US" dirty="0" smtClean="0"/>
+              <a:t>100 confederate </a:t>
+            </a:r>
+          </a:p>
+          <a:p>
+            <a:pPr lvl="1"/>
+            <a:r>
+              <a:rPr lang="en-US" dirty="0" smtClean="0"/>
+              <a:t>1,774 union</a:t>
+            </a:r>
+            <a:endParaRPr lang="en-US" dirty="0"/>
+          </a:p>
+        </p:txBody>
+      </p:sp>
+      <p:sp>
+        <p:nvSpPr>
+          <p:cNvPr id="4" name="TextBox 3"/>
+          <p:cNvSpPr txBox="1"/>
+          <p:nvPr/>
+        </p:nvSpPr>
+        <p:spPr>
+          <a:xfrm>
+            <a:off x="7334638" y="207327"/>
+            <a:ext cx="1503212" cy="369332"/>
+          </a:xfrm>
+          <a:prstGeom prst="rect">
+            <a:avLst/>
+          </a:prstGeom>
+          <a:noFill/>
+        </p:spPr>
+        <p:txBody>
+          <a:bodyPr wrap="square" rtlCol="0">
+            <a:spAutoFit/>
+          </a:bodyPr>
+          <a:lstStyle/>
+          <a:p>
+            <a:r>
+              <a:rPr lang="en-US" dirty="0" smtClean="0"/>
+              <a:t>-Vinay</a:t>
             </a:r>
             <a:endParaRPr lang="en-US" dirty="0"/>
           </a:p>
@@ -12341,7 +12570,7 @@
     </p:spTree>
     <p:extLst>
       <p:ext uri="{BB962C8B-B14F-4D97-AF65-F5344CB8AC3E}">
-        <p14:creationId xmlns:p14="http://schemas.microsoft.com/office/powerpoint/2010/main" val="2782731645"/>
+        <p14:creationId xmlns:p14="http://schemas.microsoft.com/office/powerpoint/2010/main" val="2900627398"/>
       </p:ext>
     </p:extLst>
   </p:cSld>
@@ -12391,12 +12620,8 @@
           <a:lstStyle/>
           <a:p>
             <a:r>
-              <a:rPr lang="en-US" dirty="0"/>
-              <a:t>Fort </a:t>
-            </a:r>
-            <a:r>
-              <a:rPr lang="en-US" dirty="0" smtClean="0"/>
-              <a:t>Donelson</a:t>
+              <a:rPr lang="en-US" dirty="0" smtClean="0"/>
+              <a:t>Battles 1862</a:t>
             </a:r>
             <a:endParaRPr lang="en-US" dirty="0"/>
           </a:p>
@@ -12414,83 +12639,56 @@
         </p:nvSpPr>
         <p:spPr/>
         <p:txBody>
-          <a:bodyPr/>
-          <a:lstStyle/>
-          <a:p>
-            <a:r>
-              <a:rPr lang="en-US" dirty="0" smtClean="0"/>
-              <a:t>February 11-16</a:t>
-            </a:r>
-            <a:r>
-              <a:rPr lang="en-US" baseline="30000" dirty="0" smtClean="0"/>
-              <a:t>th</a:t>
-            </a:r>
-            <a:r>
-              <a:rPr lang="en-US" dirty="0" smtClean="0"/>
-              <a:t>, 1862 Andrew Hull </a:t>
-            </a:r>
-            <a:r>
-              <a:rPr lang="en-US" dirty="0"/>
-              <a:t>F</a:t>
-            </a:r>
-            <a:r>
-              <a:rPr lang="en-US" dirty="0" smtClean="0"/>
-              <a:t>oote and Ulysses S. Grant for the Union and for the Confederates Gideon J. Pillow, John Buchman Floyd, and Simon Buckner.</a:t>
-            </a:r>
-          </a:p>
-          <a:p>
-            <a:r>
-              <a:rPr lang="en-US" dirty="0" smtClean="0"/>
-              <a:t>16,171 Confederates battling against 24,531 Union. 1-1.5 odds</a:t>
-            </a:r>
-          </a:p>
-          <a:p>
-            <a:r>
-              <a:rPr lang="en-US" dirty="0" smtClean="0"/>
-              <a:t> Casualties for </a:t>
-            </a:r>
-          </a:p>
-          <a:p>
-            <a:pPr lvl="1"/>
-            <a:r>
-              <a:rPr lang="en-US" dirty="0" smtClean="0"/>
-              <a:t>Confederates – 13,846</a:t>
-            </a:r>
-          </a:p>
-          <a:p>
-            <a:pPr lvl="1"/>
-            <a:r>
-              <a:rPr lang="en-US" dirty="0" smtClean="0"/>
-              <a:t>Union – 2,691</a:t>
-            </a:r>
-          </a:p>
-        </p:txBody>
-      </p:sp>
-      <p:sp>
-        <p:nvSpPr>
-          <p:cNvPr id="4" name="TextBox 3"/>
-          <p:cNvSpPr txBox="1"/>
-          <p:nvPr/>
-        </p:nvSpPr>
-        <p:spPr>
-          <a:xfrm>
-            <a:off x="6764454" y="233243"/>
-            <a:ext cx="1606882" cy="369332"/>
-          </a:xfrm>
-          <a:prstGeom prst="rect">
-            <a:avLst/>
-          </a:prstGeom>
-          <a:noFill/>
-        </p:spPr>
-        <p:txBody>
-          <a:bodyPr wrap="square" rtlCol="0">
-            <a:spAutoFit/>
+          <a:bodyPr>
+            <a:normAutofit fontScale="92500" lnSpcReduction="20000"/>
           </a:bodyPr>
           <a:lstStyle/>
           <a:p>
             <a:r>
               <a:rPr lang="en-US" dirty="0" smtClean="0"/>
-              <a:t>-Neel</a:t>
+              <a:t>Battle of Roanoke Island</a:t>
+            </a:r>
+          </a:p>
+          <a:p>
+            <a:r>
+              <a:rPr lang="en-US" dirty="0" smtClean="0"/>
+              <a:t>Fort Donelson* </a:t>
+            </a:r>
+          </a:p>
+          <a:p>
+            <a:r>
+              <a:rPr lang="en-US" dirty="0" smtClean="0"/>
+              <a:t>Battle of Pea Ridge</a:t>
+            </a:r>
+          </a:p>
+          <a:p>
+            <a:r>
+              <a:rPr lang="en-US" dirty="0" smtClean="0"/>
+              <a:t>Shiloh*</a:t>
+            </a:r>
+          </a:p>
+          <a:p>
+            <a:r>
+              <a:rPr lang="en-US" dirty="0" smtClean="0"/>
+              <a:t>Battle of seven Pines</a:t>
+            </a:r>
+          </a:p>
+          <a:p>
+            <a:r>
+              <a:rPr lang="en-US" dirty="0" smtClean="0"/>
+              <a:t>Second Bull Run*</a:t>
+            </a:r>
+          </a:p>
+          <a:p>
+            <a:r>
+              <a:rPr lang="en-US" dirty="0" smtClean="0"/>
+              <a:t>Antietam*</a:t>
+            </a:r>
+          </a:p>
+          <a:p>
+            <a:r>
+              <a:rPr lang="en-US" dirty="0" smtClean="0"/>
+              <a:t>Fredericksburg*</a:t>
             </a:r>
             <a:endParaRPr lang="en-US" dirty="0"/>
           </a:p>
@@ -12499,7 +12697,7 @@
     </p:spTree>
     <p:extLst>
       <p:ext uri="{BB962C8B-B14F-4D97-AF65-F5344CB8AC3E}">
-        <p14:creationId xmlns:p14="http://schemas.microsoft.com/office/powerpoint/2010/main" val="2253988221"/>
+        <p14:creationId xmlns:p14="http://schemas.microsoft.com/office/powerpoint/2010/main" val="2782731645"/>
       </p:ext>
     </p:extLst>
   </p:cSld>

</xml_diff>

<commit_message>
changed my stuff again
</commit_message>
<xml_diff>
--- a/Archive project.pptx
+++ b/Archive project.pptx
@@ -10311,20 +10311,157 @@
         <p:spPr/>
         <p:txBody>
           <a:bodyPr>
-            <a:normAutofit/>
+            <a:normAutofit fontScale="85000" lnSpcReduction="20000"/>
           </a:bodyPr>
           <a:lstStyle/>
           <a:p>
             <a:pPr>
               <a:lnSpc>
-                <a:spcPct val="200000"/>
+                <a:spcPct val="120000"/>
               </a:lnSpc>
             </a:pPr>
             <a:r>
               <a:rPr lang="en-US" sz="2800" dirty="0" smtClean="0"/>
-              <a:t>Captured July 4th</a:t>
+              <a:t>May 18 – July 4</a:t>
+            </a:r>
+            <a:r>
+              <a:rPr lang="en-US" sz="2800" baseline="30000" dirty="0" smtClean="0"/>
+              <a:t>th</a:t>
+            </a:r>
+            <a:r>
+              <a:rPr lang="en-US" sz="2800" dirty="0" smtClean="0"/>
+              <a:t> Total Forces: 110,000</a:t>
+            </a:r>
+          </a:p>
+          <a:p>
+            <a:pPr lvl="1">
+              <a:lnSpc>
+                <a:spcPct val="120000"/>
+              </a:lnSpc>
+            </a:pPr>
+            <a:r>
+              <a:rPr lang="en-US" dirty="0" smtClean="0"/>
+              <a:t>Confederates: 33,000</a:t>
+            </a:r>
+          </a:p>
+          <a:p>
+            <a:pPr lvl="1">
+              <a:lnSpc>
+                <a:spcPct val="120000"/>
+              </a:lnSpc>
+            </a:pPr>
+            <a:r>
+              <a:rPr lang="en-US" dirty="0" smtClean="0"/>
+              <a:t>Union: 77,000</a:t>
+            </a:r>
+          </a:p>
+          <a:p>
+            <a:pPr>
+              <a:lnSpc>
+                <a:spcPct val="120000"/>
+              </a:lnSpc>
+            </a:pPr>
+            <a:r>
+              <a:rPr lang="en-US" sz="2800" dirty="0" smtClean="0"/>
+              <a:t>Generals</a:t>
             </a:r>
             <a:endParaRPr lang="en-US" sz="2800" dirty="0"/>
+          </a:p>
+          <a:p>
+            <a:pPr lvl="1">
+              <a:lnSpc>
+                <a:spcPct val="120000"/>
+              </a:lnSpc>
+            </a:pPr>
+            <a:r>
+              <a:rPr lang="en-US" dirty="0"/>
+              <a:t>Confederates: </a:t>
+            </a:r>
+            <a:r>
+              <a:rPr lang="en-US" dirty="0" smtClean="0"/>
+              <a:t>John C. Pemberton</a:t>
+            </a:r>
+            <a:endParaRPr lang="en-US" dirty="0"/>
+          </a:p>
+          <a:p>
+            <a:pPr lvl="1">
+              <a:lnSpc>
+                <a:spcPct val="120000"/>
+              </a:lnSpc>
+            </a:pPr>
+            <a:r>
+              <a:rPr lang="en-US" dirty="0"/>
+              <a:t>Union: </a:t>
+            </a:r>
+            <a:r>
+              <a:rPr lang="en-US" dirty="0" smtClean="0"/>
+              <a:t>Ulysses S. Grant</a:t>
+            </a:r>
+            <a:endParaRPr lang="en-US" dirty="0"/>
+          </a:p>
+          <a:p>
+            <a:pPr>
+              <a:lnSpc>
+                <a:spcPct val="120000"/>
+              </a:lnSpc>
+            </a:pPr>
+            <a:r>
+              <a:rPr lang="en-US" sz="2800" smtClean="0"/>
+              <a:t>Casualties</a:t>
+            </a:r>
+            <a:endParaRPr lang="en-US" sz="2800" dirty="0"/>
+          </a:p>
+          <a:p>
+            <a:pPr lvl="1">
+              <a:lnSpc>
+                <a:spcPct val="120000"/>
+              </a:lnSpc>
+            </a:pPr>
+            <a:r>
+              <a:rPr lang="en-US" dirty="0"/>
+              <a:t>Confederates: </a:t>
+            </a:r>
+            <a:r>
+              <a:rPr lang="en-US" dirty="0" smtClean="0"/>
+              <a:t>32,492</a:t>
+            </a:r>
+          </a:p>
+          <a:p>
+            <a:pPr lvl="1">
+              <a:lnSpc>
+                <a:spcPct val="120000"/>
+              </a:lnSpc>
+            </a:pPr>
+            <a:r>
+              <a:rPr lang="en-US" dirty="0" smtClean="0"/>
+              <a:t>Union</a:t>
+            </a:r>
+            <a:r>
+              <a:rPr lang="en-US" dirty="0"/>
+              <a:t>: </a:t>
+            </a:r>
+            <a:r>
+              <a:rPr lang="en-US" dirty="0" smtClean="0"/>
+              <a:t>4,910</a:t>
+            </a:r>
+            <a:endParaRPr lang="en-US" dirty="0"/>
+          </a:p>
+          <a:p>
+            <a:pPr lvl="1">
+              <a:lnSpc>
+                <a:spcPct val="120000"/>
+              </a:lnSpc>
+            </a:pPr>
+            <a:endParaRPr lang="en-US" dirty="0"/>
+          </a:p>
+          <a:p>
+            <a:pPr marL="457200" lvl="1" indent="0">
+              <a:lnSpc>
+                <a:spcPct val="120000"/>
+              </a:lnSpc>
+              <a:buNone/>
+            </a:pPr>
+            <a:endParaRPr lang="en-US" dirty="0" smtClean="0"/>
           </a:p>
         </p:txBody>
       </p:sp>

</xml_diff>